<commit_message>
Live Lecture 19 C00/D00
</commit_message>
<xml_diff>
--- a/lectures/lecture-19/Lecture-Live C00/Lecture 19 - Lecture.pptx
+++ b/lectures/lecture-19/Lecture-Live C00/Lecture 19 - Lecture.pptx
@@ -151,6 +151,1196 @@
     </p:ext>
   </p:extLst>
 </p:presentation>
+</file>
+
+<file path=ppt/ink/ink1.xml><?xml version="1.0" encoding="utf-8"?>
+<inkml:ink xmlns:inkml="http://www.w3.org/2003/InkML">
+  <inkml:definitions>
+    <inkml:context xml:id="ctx0">
+      <inkml:inkSource xml:id="inkSrc0">
+        <inkml:traceFormat>
+          <inkml:channel name="X" type="integer" min="-2.14748E9" max="2.14748E9" units="cm"/>
+          <inkml:channel name="Y" type="integer" min="-2.14748E9" max="2.14748E9" units="cm"/>
+          <inkml:channel name="F" type="integer" max="32767" units="dev"/>
+          <inkml:channel name="OA" type="integer" max="360" units="deg"/>
+          <inkml:channel name="OE" type="integer" max="90" units="deg"/>
+        </inkml:traceFormat>
+        <inkml:channelProperties>
+          <inkml:channelProperty channel="X" name="resolution" value="1000" units="1/cm"/>
+          <inkml:channelProperty channel="Y" name="resolution" value="1000" units="1/cm"/>
+          <inkml:channelProperty channel="F" name="resolution" value="0" units="1/dev"/>
+          <inkml:channelProperty channel="OA" name="resolution" value="1000" units="1/deg"/>
+          <inkml:channelProperty channel="OE" name="resolution" value="1000" units="1/deg"/>
+        </inkml:channelProperties>
+      </inkml:inkSource>
+      <inkml:timestamp xml:id="ts0" timeString="2021-02-22T19:00:29.256"/>
+    </inkml:context>
+    <inkml:brush xml:id="br0">
+      <inkml:brushProperty name="width" value="0.05" units="cm"/>
+      <inkml:brushProperty name="height" value="0.05" units="cm"/>
+      <inkml:brushProperty name="color" value="#E71224"/>
+    </inkml:brush>
+  </inkml:definitions>
+  <inkml:trace contextRef="#ctx0" brushRef="#br0">156 28 2760 0 0,'-4'2'466'0'0,"-1"0"1"0"0,0-1-1 0 0,1 0 1 0 0,-1 0-1 0 0,0 0 1 0 0,0-1-1 0 0,0 1 0 0 0,0-1 1 0 0,0 0-1 0 0,0-1 1 0 0,1 1-1 0 0,-6-2 1 0 0,-24 3 1584 0 0,11 0 626 0 0,20-1-2316 0 0,1 1 1 0 0,-1-1-1 0 0,0 1 0 0 0,1 0 1 0 0,-1 0-1 0 0,1 0 1 0 0,0 0-1 0 0,-5 3 1 0 0,6-4 16 0 0,-2 4 2084 0 0,6-1-2684 0 0,0-1 284 0 0,-1 0 0 0 0,0 0-1 0 0,1-1 1 0 0,0 1-1 0 0,-1-1 1 0 0,1 0-1 0 0,0 0 1 0 0,0 0-1 0 0,0 0 1 0 0,4 1 0 0 0,34 2 1188 0 0,-5-1-715 0 0,575 74 3812 0 0,-512-77-3920 0 0,-35-2-158 0 0,337-8 1502 0 0,-289 4-1353 0 0,-37 1-129 0 0,-46 3-99 0 0,0-1-1 0 0,40-11 1 0 0,54-21 300 0 0,-54 14-277 0 0,-3 6 75 0 0,100-12 0 0 0,-138 25-191 0 0,-1 0-1 0 0,0 2 1 0 0,50 6 0 0 0,-69-5-66 0 0,15 2-9 0 0,-17-2-22 0 0,1-3 0 0 0,-1 0 0 0 0,5-10 963 0 0,-9 9-2494 0 0</inkml:trace>
+</inkml:ink>
+</file>
+
+<file path=ppt/ink/ink10.xml><?xml version="1.0" encoding="utf-8"?>
+<inkml:ink xmlns:inkml="http://www.w3.org/2003/InkML">
+  <inkml:definitions>
+    <inkml:context xml:id="ctx0">
+      <inkml:inkSource xml:id="inkSrc0">
+        <inkml:traceFormat>
+          <inkml:channel name="X" type="integer" min="-2.14748E9" max="2.14748E9" units="cm"/>
+          <inkml:channel name="Y" type="integer" min="-2.14748E9" max="2.14748E9" units="cm"/>
+          <inkml:channel name="F" type="integer" max="32767" units="dev"/>
+          <inkml:channel name="OA" type="integer" max="360" units="deg"/>
+          <inkml:channel name="OE" type="integer" max="90" units="deg"/>
+        </inkml:traceFormat>
+        <inkml:channelProperties>
+          <inkml:channelProperty channel="X" name="resolution" value="1000" units="1/cm"/>
+          <inkml:channelProperty channel="Y" name="resolution" value="1000" units="1/cm"/>
+          <inkml:channelProperty channel="F" name="resolution" value="0" units="1/dev"/>
+          <inkml:channelProperty channel="OA" name="resolution" value="1000" units="1/deg"/>
+          <inkml:channelProperty channel="OE" name="resolution" value="1000" units="1/deg"/>
+        </inkml:channelProperties>
+      </inkml:inkSource>
+      <inkml:timestamp xml:id="ts0" timeString="2021-02-22T19:00:51.627"/>
+    </inkml:context>
+    <inkml:brush xml:id="br0">
+      <inkml:brushProperty name="width" value="0.05" units="cm"/>
+      <inkml:brushProperty name="height" value="0.05" units="cm"/>
+      <inkml:brushProperty name="color" value="#E71224"/>
+    </inkml:brush>
+  </inkml:definitions>
+  <inkml:trace contextRef="#ctx0" brushRef="#br0">0 155 19295 0 0,'0'0'1744'0'0,"2"0"-1434"0"0,11-1-219 0 0,-1 0 0 0 0,0-1 0 0 0,0 0 0 0 0,1-1-1 0 0,11-4 1 0 0,57-27 973 0 0,-38 12-805 0 0,-15 8-8 0 0,0 1-1 0 0,54-18 1 0 0,13 10-995 0 0,-66 17-666 0 0</inkml:trace>
+</inkml:ink>
+</file>
+
+<file path=ppt/ink/ink11.xml><?xml version="1.0" encoding="utf-8"?>
+<inkml:ink xmlns:inkml="http://www.w3.org/2003/InkML">
+  <inkml:definitions>
+    <inkml:context xml:id="ctx0">
+      <inkml:inkSource xml:id="inkSrc0">
+        <inkml:traceFormat>
+          <inkml:channel name="X" type="integer" min="-2.14748E9" max="2.14748E9" units="cm"/>
+          <inkml:channel name="Y" type="integer" min="-2.14748E9" max="2.14748E9" units="cm"/>
+          <inkml:channel name="F" type="integer" max="32767" units="dev"/>
+          <inkml:channel name="OA" type="integer" max="360" units="deg"/>
+          <inkml:channel name="OE" type="integer" max="90" units="deg"/>
+        </inkml:traceFormat>
+        <inkml:channelProperties>
+          <inkml:channelProperty channel="X" name="resolution" value="1000" units="1/cm"/>
+          <inkml:channelProperty channel="Y" name="resolution" value="1000" units="1/cm"/>
+          <inkml:channelProperty channel="F" name="resolution" value="0" units="1/dev"/>
+          <inkml:channelProperty channel="OA" name="resolution" value="1000" units="1/deg"/>
+          <inkml:channelProperty channel="OE" name="resolution" value="1000" units="1/deg"/>
+        </inkml:channelProperties>
+      </inkml:inkSource>
+      <inkml:timestamp xml:id="ts0" timeString="2021-02-22T19:00:51.986"/>
+    </inkml:context>
+    <inkml:brush xml:id="br0">
+      <inkml:brushProperty name="width" value="0.05" units="cm"/>
+      <inkml:brushProperty name="height" value="0.05" units="cm"/>
+      <inkml:brushProperty name="color" value="#E71224"/>
+    </inkml:brush>
+  </inkml:definitions>
+  <inkml:trace contextRef="#ctx0" brushRef="#br0">0 218 9672 0 0,'1'-4'9267'0'0,"0"3"-9040"0"0,1 0 1 0 0,-1 0-1 0 0,0 1 0 0 0,1-1 0 0 0,-1 1 0 0 0,1-1 0 0 0,-1 1 0 0 0,1-1 0 0 0,0 1 0 0 0,-1 0 0 0 0,1 0 0 0 0,-1 0 0 0 0,1 0 0 0 0,-1 0 0 0 0,1 0 0 0 0,0 0 1 0 0,-1 0-1 0 0,3 1 0 0 0,-1 0-130 0 0,0 1 0 0 0,-1-1 1 0 0,1 0-1 0 0,-1 1 0 0 0,1-1 0 0 0,-1 1 1 0 0,0 0-1 0 0,0 0 0 0 0,4 4 0 0 0,-2-1-94 0 0,1 1-1 0 0,-2-1 0 0 0,1 1 1 0 0,-1 0-1 0 0,0 0 0 0 0,0 0 1 0 0,0 0-1 0 0,2 11 0 0 0,8 31 96 0 0,-7-29-102 0 0,-1 1-1 0 0,-1 0 1 0 0,3 33-1 0 0,-2 89-715 0 0,-10-107 720 0 0,5-35 6 0 0,0 0-1 0 0,0 0 1 0 0,0 1 0 0 0,0-1-1 0 0,0 0 1 0 0,0 0 0 0 0,0 0-1 0 0,0 1 1 0 0,0-1-1 0 0,0 0 1 0 0,0 0 0 0 0,0 0-1 0 0,0 1 1 0 0,0-1-1 0 0,0 0 1 0 0,0 0 0 0 0,0 0-1 0 0,0 1 1 0 0,0-1-1 0 0,0 0 1 0 0,-1 0 0 0 0,1 0-1 0 0,0 0 1 0 0,0 1-1 0 0,0-1 1 0 0,0 0 0 0 0,0 0-1 0 0,0 0 1 0 0,-1 0-1 0 0,1 0 1 0 0,0 0 0 0 0,0 1-1 0 0,0-1 1 0 0,0 0 0 0 0,-1 0-1 0 0,1 0 1 0 0,0 0-1 0 0,0 0 1 0 0,0 0 0 0 0,-1 0-1 0 0,1 0 1 0 0,0 0-1 0 0,0 0 1 0 0,0 0 0 0 0,-1 0-1 0 0,1 0 1 0 0,0 0-1 0 0,0 0 1 0 0,0 0 0 0 0,-1 0-1 0 0,1 0 1 0 0,0 0-1 0 0,0 0 1 0 0,0 0 0 0 0,0 0-1 0 0,-1 0 1 0 0,1-1 0 0 0,0 1-1 0 0,0 0 1 0 0,0 0-1 0 0,0 0 1 0 0,-1 0 0 0 0,1 0-1 0 0,0 0 1 0 0,0-1-1 0 0,0 1 1 0 0,-7-10 548 0 0,5 4-477 0 0,1 1 1 0 0,0-1-1 0 0,0 1 1 0 0,1-1-1 0 0,0 1 1 0 0,0-1-1 0 0,0 0 1 0 0,1 1-1 0 0,-1-1 1 0 0,3-8-1 0 0,3-8-2 0 0,11-26 0 0 0,-11 30-7 0 0,2-1 71 0 0,0 0 0 0 0,0 1 1 0 0,2 0-1 0 0,22-31 0 0 0,-27 41-313 0 0,1 1 0 0 0,0 0 1 0 0,0 0-1 0 0,1 1 0 0 0,0 0 1 0 0,0 0-1 0 0,1 1 0 0 0,-1 0 1 0 0,1 0-1 0 0,0 0 0 0 0,0 1 1 0 0,1 0-1 0 0,8-2 0 0 0,-6 4-1491 0 0,0 4-374 0 0</inkml:trace>
+  <inkml:trace contextRef="#ctx0" brushRef="#br0" timeOffset="1">527 349 17567 0 0,'-1'1'99'0'0,"1"0"-1"0"0,-1 0 1 0 0,0-1-1 0 0,1 1 1 0 0,-1 0-1 0 0,1 0 0 0 0,-1 0 1 0 0,1 0-1 0 0,0 0 1 0 0,-1 0-1 0 0,1 0 1 0 0,0 0-1 0 0,0 0 0 0 0,-1 0 1 0 0,1 0-1 0 0,0 0 1 0 0,0 0-1 0 0,0 1 1 0 0,4 23-73 0 0,-1-2 811 0 0,-3-15-385 0 0,1 13 217 0 0,-1 0 0 0 0,-2 1 0 0 0,0-1 0 0 0,-1 0 0 0 0,-7 25 0 0 0,9-42-644 0 0,1 0 1 0 0,-1 0-1 0 0,0 0 0 0 0,1-1 0 0 0,0 1 0 0 0,0 0 0 0 0,0 0 0 0 0,1 4 0 0 0,0 11-1552 0 0</inkml:trace>
+  <inkml:trace contextRef="#ctx0" brushRef="#br0" timeOffset="2">552 16 19351 0 0,'-3'-10'1888'0'0,"6"8"-1680"0"0,0-1-208 0 0,2 3 0 0 0,2 3 0 0 0,-2 1 448 0 0,-2 1 56 0 0,-1 6 8 0 0,4-4 0 0 0,0 5-1208 0 0,2 4-232 0 0,1-4-56 0 0</inkml:trace>
+</inkml:ink>
+</file>
+
+<file path=ppt/ink/ink12.xml><?xml version="1.0" encoding="utf-8"?>
+<inkml:ink xmlns:inkml="http://www.w3.org/2003/InkML">
+  <inkml:definitions>
+    <inkml:context xml:id="ctx0">
+      <inkml:inkSource xml:id="inkSrc0">
+        <inkml:traceFormat>
+          <inkml:channel name="X" type="integer" min="-2.14748E9" max="2.14748E9" units="cm"/>
+          <inkml:channel name="Y" type="integer" min="-2.14748E9" max="2.14748E9" units="cm"/>
+          <inkml:channel name="F" type="integer" max="32767" units="dev"/>
+          <inkml:channel name="OA" type="integer" max="360" units="deg"/>
+          <inkml:channel name="OE" type="integer" max="90" units="deg"/>
+        </inkml:traceFormat>
+        <inkml:channelProperties>
+          <inkml:channelProperty channel="X" name="resolution" value="1000" units="1/cm"/>
+          <inkml:channelProperty channel="Y" name="resolution" value="1000" units="1/cm"/>
+          <inkml:channelProperty channel="F" name="resolution" value="0" units="1/dev"/>
+          <inkml:channelProperty channel="OA" name="resolution" value="1000" units="1/deg"/>
+          <inkml:channelProperty channel="OE" name="resolution" value="1000" units="1/deg"/>
+        </inkml:channelProperties>
+      </inkml:inkSource>
+      <inkml:timestamp xml:id="ts0" timeString="2021-02-22T19:00:52.358"/>
+    </inkml:context>
+    <inkml:brush xml:id="br0">
+      <inkml:brushProperty name="width" value="0.05" units="cm"/>
+      <inkml:brushProperty name="height" value="0.05" units="cm"/>
+      <inkml:brushProperty name="color" value="#E71224"/>
+    </inkml:brush>
+  </inkml:definitions>
+  <inkml:trace contextRef="#ctx0" brushRef="#br0">245 416 17247 0 0,'-14'3'331'0'0,"0"1"-1"0"0,0 1 0 0 0,0 0 0 0 0,1 0 0 0 0,-1 2 1 0 0,1 0-1 0 0,1 0 0 0 0,0 1 0 0 0,0 0 0 0 0,0 1 0 0 0,1 1 1 0 0,0 0-1 0 0,-11 14 0 0 0,16-17-121 0 0,1 0 0 0 0,1 1 0 0 0,-1-1-1 0 0,1 1 1 0 0,0 0 0 0 0,-4 14 0 0 0,2-2 389 0 0,-6 36-1 0 0,11-39-377 0 0,0 0 0 0 0,1 0-1 0 0,2 19 1 0 0,-2-33-212 0 0,0-1 0 0 0,1 0 0 0 0,-1 0 0 0 0,1 0 0 0 0,-1 0 0 0 0,1 0 0 0 0,0 0 0 0 0,0 0 0 0 0,0 0 0 0 0,0 0 0 0 0,0 0 0 0 0,0-1 0 0 0,0 1 0 0 0,1 0 0 0 0,-1-1 0 0 0,3 3 0 0 0,-3-3 8 0 0,0 0 0 0 0,1-1 0 0 0,-1 1 0 0 0,1 0 0 0 0,-1 0 0 0 0,1-1 0 0 0,-1 1 0 0 0,1-1 0 0 0,-1 1 0 0 0,1-1 0 0 0,0 0 0 0 0,-1 0 0 0 0,1 1 0 0 0,0-1 0 0 0,-1 0 0 0 0,1 0 0 0 0,0-1 0 0 0,-1 1 0 0 0,1 0 0 0 0,-1-1 0 0 0,4 0 0 0 0,2-2 93 0 0,1-1 0 0 0,-1 1 0 0 0,0-1 0 0 0,0-1 0 0 0,-1 1 0 0 0,1-1 0 0 0,-1 0 0 0 0,0-1 0 0 0,0 1 0 0 0,-1-1 0 0 0,0-1 0 0 0,6-8 0 0 0,1-3-35 0 0,-1 0 0 0 0,-1-1 0 0 0,12-29 0 0 0,-10 17-74 0 0,-1 1 0 0 0,-2-2 0 0 0,-1 1 0 0 0,-1-1 0 0 0,2-38 0 0 0,1-32-25 0 0,1-32 499 0 0,-10 114-20 0 0,2 0-1 0 0,5-22 1 0 0,-2 11-156 0 0,-5 27-272 0 0,0 0 0 0 0,0 0 0 0 0,0-1 0 0 0,0 1-1 0 0,0 0 1 0 0,1 0 0 0 0,0 0 0 0 0,0 0 0 0 0,3-4 0 0 0,-5 8-16 0 0,0 0-1 0 0,0 0 1 0 0,0 0 0 0 0,0-1 0 0 0,0 1 0 0 0,0 0-1 0 0,0 0 1 0 0,0 0 0 0 0,0 0 0 0 0,0 0 0 0 0,1 0-1 0 0,-1 0 1 0 0,0 0 0 0 0,0-1 0 0 0,0 1 0 0 0,0 0-1 0 0,0 0 1 0 0,0 0 0 0 0,0 0 0 0 0,1 0 0 0 0,-1 0-1 0 0,0 0 1 0 0,0 0 0 0 0,0 0 0 0 0,0 0 0 0 0,0 0-1 0 0,0 0 1 0 0,1 0 0 0 0,-1 0 0 0 0,0 0 0 0 0,0 0-1 0 0,0 0 1 0 0,0 0 0 0 0,0 0 0 0 0,0 0 0 0 0,1 0-1 0 0,-1 0 1 0 0,0 0 0 0 0,0 0 0 0 0,0 0-1 0 0,0 0 1 0 0,0 0 0 0 0,0 0 0 0 0,1 0 0 0 0,-1 0-1 0 0,0 0 1 0 0,0 1 0 0 0,0-1 0 0 0,0 0 0 0 0,0 0-1 0 0,0 0 1 0 0,0 0 0 0 0,0 0 0 0 0,0 0 0 0 0,1 0-1 0 0,-1 1 1 0 0,4 12 266 0 0,0 20 13 0 0,-4-31-242 0 0,3 58 204 0 0,-9 105-1 0 0,1-91-224 0 0,-1 17-61 0 0,-1 145-731 0 0,7-227 157 0 0,1-1 1 0 0,3 16 0 0 0,4 1-7594 0 0,-2-10-785 0 0</inkml:trace>
+</inkml:ink>
+</file>
+
+<file path=ppt/ink/ink13.xml><?xml version="1.0" encoding="utf-8"?>
+<inkml:ink xmlns:inkml="http://www.w3.org/2003/InkML">
+  <inkml:definitions>
+    <inkml:context xml:id="ctx0">
+      <inkml:inkSource xml:id="inkSrc0">
+        <inkml:traceFormat>
+          <inkml:channel name="X" type="integer" min="-2.14748E9" max="2.14748E9" units="cm"/>
+          <inkml:channel name="Y" type="integer" min="-2.14748E9" max="2.14748E9" units="cm"/>
+          <inkml:channel name="F" type="integer" max="32767" units="dev"/>
+          <inkml:channel name="OA" type="integer" max="360" units="deg"/>
+          <inkml:channel name="OE" type="integer" max="90" units="deg"/>
+        </inkml:traceFormat>
+        <inkml:channelProperties>
+          <inkml:channelProperty channel="X" name="resolution" value="1000" units="1/cm"/>
+          <inkml:channelProperty channel="Y" name="resolution" value="1000" units="1/cm"/>
+          <inkml:channelProperty channel="F" name="resolution" value="0" units="1/dev"/>
+          <inkml:channelProperty channel="OA" name="resolution" value="1000" units="1/deg"/>
+          <inkml:channelProperty channel="OE" name="resolution" value="1000" units="1/deg"/>
+        </inkml:channelProperties>
+      </inkml:inkSource>
+      <inkml:timestamp xml:id="ts0" timeString="2021-02-22T19:00:52.750"/>
+    </inkml:context>
+    <inkml:brush xml:id="br0">
+      <inkml:brushProperty name="width" value="0.05" units="cm"/>
+      <inkml:brushProperty name="height" value="0.05" units="cm"/>
+      <inkml:brushProperty name="color" value="#E71224"/>
+    </inkml:brush>
+  </inkml:definitions>
+  <inkml:trace contextRef="#ctx0" brushRef="#br0">191 4 13824 0 0,'-3'-1'380'0'0,"0"0"0"0"0,0 1 0 0 0,0-1 0 0 0,0 1 0 0 0,0 0 0 0 0,0 0 0 0 0,0 0 0 0 0,0 0 0 0 0,0 1 0 0 0,0-1 0 0 0,0 1 0 0 0,0-1 0 0 0,0 1 0 0 0,0 0 0 0 0,0 0 0 0 0,0 1 0 0 0,1-1 0 0 0,-1 0 0 0 0,-4 4 0 0 0,-20 15 2345 0 0,4 2-3291 0 0,12-10 1255 0 0,-19 25 0 0 0,26-31-564 0 0,1 0-1 0 0,-1-1 1 0 0,1 1 0 0 0,0 0 0 0 0,1 1 0 0 0,0-1-1 0 0,-3 10 1 0 0,2 0 53 0 0,1-7-79 0 0,0 1-1 0 0,0 0 0 0 0,1 0 0 0 0,0 0 0 0 0,1 0 0 0 0,0 0 0 0 0,1 0 0 0 0,3 18 1 0 0,-3-24-77 0 0,0 0 1 0 0,0 0 0 0 0,1 0 0 0 0,0 0 0 0 0,0 0 0 0 0,0 0 0 0 0,3 4 0 0 0,-4-7-11 0 0,0 0 0 0 0,0 0 0 0 0,-1 0 1 0 0,1 0-1 0 0,1 0 0 0 0,-1 0 1 0 0,0 0-1 0 0,0-1 0 0 0,0 1 0 0 0,0 0 1 0 0,0-1-1 0 0,1 1 0 0 0,-1-1 0 0 0,0 1 1 0 0,1-1-1 0 0,-1 1 0 0 0,0-1 1 0 0,1 0-1 0 0,-1 0 0 0 0,0 0 0 0 0,1 0 1 0 0,-1 0-1 0 0,1 0 0 0 0,-1 0 1 0 0,0 0-1 0 0,3-1 0 0 0,1-1 40 0 0,1 0 0 0 0,-1 0 0 0 0,0 0 0 0 0,0-1 0 0 0,0 0 0 0 0,0 0 0 0 0,-1 0 0 0 0,1-1 0 0 0,-1 1 0 0 0,0-1 0 0 0,0 0 0 0 0,0 0 0 0 0,-1-1 0 0 0,1 1 0 0 0,-1-1 0 0 0,0 0 0 0 0,4-8 0 0 0,47-112 1261 0 0,-52 121-1141 0 0,0 1 0 0 0,0-1 0 0 0,0 0-1 0 0,0 1 1 0 0,4-5 0 0 0,-5 8-154 0 0,-1-1 1 0 0,0 1-1 0 0,1-1 1 0 0,-1 1-1 0 0,1-1 0 0 0,-1 1 1 0 0,1 0-1 0 0,-1-1 1 0 0,1 1-1 0 0,0 0 1 0 0,-1-1-1 0 0,1 1 1 0 0,-1 0-1 0 0,1 0 1 0 0,0 0-1 0 0,-1-1 0 0 0,1 1 1 0 0,-1 0-1 0 0,1 0 1 0 0,0 0-1 0 0,-1 0 1 0 0,1 0-1 0 0,0 0 1 0 0,-1 0-1 0 0,1 0 1 0 0,0 1-1 0 0,-1-1 0 0 0,1 0 1 0 0,-1 0-1 0 0,1 0 1 0 0,-1 1-1 0 0,1-1 1 0 0,0 0-1 0 0,-1 1 1 0 0,1-1-1 0 0,-1 0 1 0 0,1 1-1 0 0,-1-1 0 0 0,1 1 1 0 0,-1-1-1 0 0,0 1 1 0 0,1-1-1 0 0,-1 1 1 0 0,1-1-1 0 0,-1 1 1 0 0,0-1-1 0 0,0 1 1 0 0,1 0-1 0 0,7 11-92 0 0,-1 0-1 0 0,0 1 1 0 0,8 20 0 0 0,-8-15-17 0 0,3 8-73 0 0,-10-25 44 0 0,0 1 1 0 0,0-1-1 0 0,1 0 0 0 0,-1 0 1 0 0,0 0-1 0 0,1 0 1 0 0,-1 0-1 0 0,1 0 0 0 0,-1 0 1 0 0,1 0-1 0 0,0 0 0 0 0,-1 0 1 0 0,1 0-1 0 0,0 0 0 0 0,-1-1 1 0 0,1 1-1 0 0,0 0 0 0 0,0 0 1 0 0,0-1-1 0 0,2 2 0 0 0,-3-2-33 0 0,1 0-1 0 0,0 0 1 0 0,0 0-1 0 0,0 0 1 0 0,0 0-1 0 0,0 0 1 0 0,0 0-1 0 0,0 0 0 0 0,0 0 1 0 0,0 0-1 0 0,0 0 1 0 0,0-1-1 0 0,-1 1 1 0 0,1 0-1 0 0,0-1 0 0 0,0 1 1 0 0,0 0-1 0 0,0-1 1 0 0,-1 1-1 0 0,1-1 1 0 0,0 0-1 0 0,0 1 1 0 0,-1-1-1 0 0,1 0 0 0 0,0 0 1 0 0,8-9-1198 0 0</inkml:trace>
+</inkml:ink>
+</file>
+
+<file path=ppt/ink/ink14.xml><?xml version="1.0" encoding="utf-8"?>
+<inkml:ink xmlns:inkml="http://www.w3.org/2003/InkML">
+  <inkml:definitions>
+    <inkml:context xml:id="ctx0">
+      <inkml:inkSource xml:id="inkSrc0">
+        <inkml:traceFormat>
+          <inkml:channel name="X" type="integer" min="-2.14748E9" max="2.14748E9" units="cm"/>
+          <inkml:channel name="Y" type="integer" min="-2.14748E9" max="2.14748E9" units="cm"/>
+          <inkml:channel name="F" type="integer" max="32767" units="dev"/>
+          <inkml:channel name="OA" type="integer" max="360" units="deg"/>
+          <inkml:channel name="OE" type="integer" max="90" units="deg"/>
+        </inkml:traceFormat>
+        <inkml:channelProperties>
+          <inkml:channelProperty channel="X" name="resolution" value="1000" units="1/cm"/>
+          <inkml:channelProperty channel="Y" name="resolution" value="1000" units="1/cm"/>
+          <inkml:channelProperty channel="F" name="resolution" value="0" units="1/dev"/>
+          <inkml:channelProperty channel="OA" name="resolution" value="1000" units="1/deg"/>
+          <inkml:channelProperty channel="OE" name="resolution" value="1000" units="1/deg"/>
+        </inkml:channelProperties>
+      </inkml:inkSource>
+      <inkml:timestamp xml:id="ts0" timeString="2021-02-22T19:00:53.190"/>
+    </inkml:context>
+    <inkml:brush xml:id="br0">
+      <inkml:brushProperty name="width" value="0.05" units="cm"/>
+      <inkml:brushProperty name="height" value="0.05" units="cm"/>
+      <inkml:brushProperty name="color" value="#E71224"/>
+    </inkml:brush>
+  </inkml:definitions>
+  <inkml:trace contextRef="#ctx0" brushRef="#br0">170 0 13824 0 0,'0'0'629'0'0,"-4"7"212"0"0,-3 6-1242 0 0,2 12 3976 0 0,3 19 3850 0 0,2-38-7043 0 0,7 190 3606 0 0,-7-186-3966 0 0,1-2-4 0 0,-1 0 0 0 0,3 15 0 0 0,-2-21-32 0 0,-1 0-1 0 0,1 0 1 0 0,0 0 0 0 0,0 0-1 0 0,0 0 1 0 0,0 0-1 0 0,0 0 1 0 0,0 0 0 0 0,0-1-1 0 0,1 1 1 0 0,-1 0-1 0 0,1-1 1 0 0,-1 1-1 0 0,4 2 1 0 0,-4-4-85 0 0,0 1-1 0 0,1-1 1 0 0,-1 0-1 0 0,0 1 1 0 0,0-1 0 0 0,0 0-1 0 0,1 0 1 0 0,-1 0-1 0 0,0 0 1 0 0,0 0-1 0 0,1 0 1 0 0,-1 0 0 0 0,0 0-1 0 0,0-1 1 0 0,1 1-1 0 0,-1 0 1 0 0,0-1-1 0 0,0 1 1 0 0,0-1 0 0 0,0 1-1 0 0,1-1 1 0 0,0-1-1 0 0,2 0-407 0 0,0-1 1 0 0,0 0-1 0 0,0 0 0 0 0,5-5 0 0 0,2-4-1252 0 0</inkml:trace>
+  <inkml:trace contextRef="#ctx0" brushRef="#br0" timeOffset="1">513 0 12896 0 0,'0'0'997'0'0,"-8"3"1514"0"0,-20 35 5314 0 0,0 0-4221 0 0,-63 88-1217 0 0,57-75-1915 0 0,-19 28 25 0 0,-49 98 1 0 0,61-102-1152 0 0,-60 85 0 0 0,74-123-606 0 0</inkml:trace>
+</inkml:ink>
+</file>
+
+<file path=ppt/ink/ink15.xml><?xml version="1.0" encoding="utf-8"?>
+<inkml:ink xmlns:inkml="http://www.w3.org/2003/InkML">
+  <inkml:definitions>
+    <inkml:context xml:id="ctx0">
+      <inkml:inkSource xml:id="inkSrc0">
+        <inkml:traceFormat>
+          <inkml:channel name="X" type="integer" min="-2.14748E9" max="2.14748E9" units="cm"/>
+          <inkml:channel name="Y" type="integer" min="-2.14748E9" max="2.14748E9" units="cm"/>
+          <inkml:channel name="F" type="integer" max="32767" units="dev"/>
+          <inkml:channel name="OA" type="integer" max="360" units="deg"/>
+          <inkml:channel name="OE" type="integer" max="90" units="deg"/>
+        </inkml:traceFormat>
+        <inkml:channelProperties>
+          <inkml:channelProperty channel="X" name="resolution" value="1000" units="1/cm"/>
+          <inkml:channelProperty channel="Y" name="resolution" value="1000" units="1/cm"/>
+          <inkml:channelProperty channel="F" name="resolution" value="0" units="1/dev"/>
+          <inkml:channelProperty channel="OA" name="resolution" value="1000" units="1/deg"/>
+          <inkml:channelProperty channel="OE" name="resolution" value="1000" units="1/deg"/>
+        </inkml:channelProperties>
+      </inkml:inkSource>
+      <inkml:timestamp xml:id="ts0" timeString="2021-02-22T19:00:54.016"/>
+    </inkml:context>
+    <inkml:brush xml:id="br0">
+      <inkml:brushProperty name="width" value="0.05" units="cm"/>
+      <inkml:brushProperty name="height" value="0.05" units="cm"/>
+      <inkml:brushProperty name="color" value="#E71224"/>
+    </inkml:brush>
+  </inkml:definitions>
+  <inkml:trace contextRef="#ctx0" brushRef="#br0">394 127 7368 0 0,'0'0'568'0'0,"2"-6"-352"0"0,-1-8 2323 0 0,0 0 0 0 0,-3-21 0 0 0,1 32-2204 0 0,0-1 1 0 0,0 1 0 0 0,0 0-1 0 0,0 0 1 0 0,0 0-1 0 0,-1 0 1 0 0,0 0-1 0 0,1 1 1 0 0,-1-1 0 0 0,0 0-1 0 0,0 1 1 0 0,-1-1-1 0 0,1 1 1 0 0,-1 0-1 0 0,1 0 1 0 0,-1 0-1 0 0,1 0 1 0 0,-1 0 0 0 0,0 1-1 0 0,0-1 1 0 0,-4-1-1 0 0,0 2-255 0 0,-1 1 0 0 0,1 0 0 0 0,0 0 0 0 0,-1 0 0 0 0,1 1-1 0 0,0 0 1 0 0,-1 0 0 0 0,1 1 0 0 0,0 0 0 0 0,0 0 0 0 0,0 1 0 0 0,0 0-1 0 0,1 0 1 0 0,-9 5 0 0 0,-10 8 223 0 0,1 1 0 0 0,-26 22 0 0 0,46-36-322 0 0,-10 10 109 0 0,1 1 1 0 0,-15 18-1 0 0,10-10-9 0 0,11-15-74 0 0,1 1 0 0 0,0-1-1 0 0,1 2 1 0 0,0-1 0 0 0,0 0-1 0 0,1 1 1 0 0,0 0 0 0 0,0 0-1 0 0,1 0 1 0 0,0 1 0 0 0,-1 11-1 0 0,4-19-2 0 0,-1 0-1 0 0,1 1 1 0 0,1-1 0 0 0,-1 0-1 0 0,0 0 1 0 0,0 1-1 0 0,1-1 1 0 0,0 0 0 0 0,-1 0-1 0 0,1 1 1 0 0,0-1-1 0 0,0 0 1 0 0,0 0 0 0 0,0 0-1 0 0,0 0 1 0 0,1 0-1 0 0,-1-1 1 0 0,1 1 0 0 0,-1 0-1 0 0,1-1 1 0 0,-1 1-1 0 0,1-1 1 0 0,0 1 0 0 0,0-1-1 0 0,0 0 1 0 0,3 2-1 0 0,7 3 87 0 0,-1 0 0 0 0,1-2 0 0 0,19 7 0 0 0,-21-8-32 0 0,9 2 7 0 0,12 5 8 0 0,0 1 0 0 0,55 26 0 0 0,-78-32-73 0 0,0-1 1 0 0,0 1-1 0 0,-1 1 0 0 0,0-1 0 0 0,0 1 0 0 0,0 0 0 0 0,-1 1 0 0 0,0 0 0 0 0,0 0 0 0 0,-1 0 0 0 0,1 0 0 0 0,-2 1 0 0 0,1 0 0 0 0,-1 0 0 0 0,4 11 0 0 0,-5-10 9 0 0,-1 1 1 0 0,0 0-1 0 0,-1-1 0 0 0,0 1 1 0 0,0 0-1 0 0,-1-1 0 0 0,-1 1 0 0 0,1 0 1 0 0,-1-1-1 0 0,-1 1 0 0 0,0 0 1 0 0,0-1-1 0 0,-6 14 0 0 0,5-16-2 0 0,1-1 1 0 0,-1 1-1 0 0,-1-1 1 0 0,1 0-1 0 0,-1 0 0 0 0,0 0 1 0 0,-1-1-1 0 0,1 1 0 0 0,-1-1 1 0 0,0 0-1 0 0,0 0 1 0 0,-1-1-1 0 0,0 1 0 0 0,1-1 1 0 0,-1 0-1 0 0,-1-1 0 0 0,1 0 1 0 0,0 0-1 0 0,-8 3 1 0 0,9-5 5 0 0,1 0 0 0 0,-1 0 1 0 0,0-1-1 0 0,1 1 0 0 0,-1-1 1 0 0,0 0-1 0 0,0 0 0 0 0,1 0 1 0 0,-1-1-1 0 0,0 0 0 0 0,1 0 1 0 0,-1 0-1 0 0,1 0 0 0 0,-1-1 1 0 0,1 0-1 0 0,0 1 0 0 0,-1-2 1 0 0,1 1-1 0 0,0 0 0 0 0,0-1 1 0 0,1 0-1 0 0,-1 0 0 0 0,-3-4 1 0 0,2 2 20 0 0,0 0 0 0 0,0-1 1 0 0,1 0-1 0 0,0 0 0 0 0,0 0 0 0 0,1 0 1 0 0,0-1-1 0 0,0 1 0 0 0,0-1 1 0 0,1 0-1 0 0,0 0 0 0 0,0 0 1 0 0,1 0-1 0 0,-1-12 0 0 0,1 0 65 0 0,2-1 0 0 0,0 1 0 0 0,2-1-1 0 0,0 1 1 0 0,10-33 0 0 0,40-91 300 0 0,-42 117-271 0 0,2 0 0 0 0,30-47 0 0 0,-37 64-336 0 0,0 1 0 0 0,1 0 0 0 0,0 0 0 0 0,1 0 0 0 0,0 1 0 0 0,0 0 0 0 0,0 1 0 0 0,1-1 0 0 0,0 2 0 0 0,0-1 0 0 0,13-4 0 0 0,4 1-1080 0 0</inkml:trace>
+</inkml:ink>
+</file>
+
+<file path=ppt/ink/ink16.xml><?xml version="1.0" encoding="utf-8"?>
+<inkml:ink xmlns:inkml="http://www.w3.org/2003/InkML">
+  <inkml:definitions>
+    <inkml:context xml:id="ctx0">
+      <inkml:inkSource xml:id="inkSrc0">
+        <inkml:traceFormat>
+          <inkml:channel name="X" type="integer" min="-2.14748E9" max="2.14748E9" units="cm"/>
+          <inkml:channel name="Y" type="integer" min="-2.14748E9" max="2.14748E9" units="cm"/>
+          <inkml:channel name="F" type="integer" max="32767" units="dev"/>
+          <inkml:channel name="OA" type="integer" max="360" units="deg"/>
+          <inkml:channel name="OE" type="integer" max="90" units="deg"/>
+        </inkml:traceFormat>
+        <inkml:channelProperties>
+          <inkml:channelProperty channel="X" name="resolution" value="1000" units="1/cm"/>
+          <inkml:channelProperty channel="Y" name="resolution" value="1000" units="1/cm"/>
+          <inkml:channelProperty channel="F" name="resolution" value="0" units="1/dev"/>
+          <inkml:channelProperty channel="OA" name="resolution" value="1000" units="1/deg"/>
+          <inkml:channelProperty channel="OE" name="resolution" value="1000" units="1/deg"/>
+        </inkml:channelProperties>
+      </inkml:inkSource>
+      <inkml:timestamp xml:id="ts0" timeString="2021-02-22T19:00:54.405"/>
+    </inkml:context>
+    <inkml:brush xml:id="br0">
+      <inkml:brushProperty name="width" value="0.05" units="cm"/>
+      <inkml:brushProperty name="height" value="0.05" units="cm"/>
+      <inkml:brushProperty name="color" value="#E71224"/>
+    </inkml:brush>
+  </inkml:definitions>
+  <inkml:trace contextRef="#ctx0" brushRef="#br0">343 1 15664 0 0,'-22'3'494'0'0,"1"1"0"0"0,0 1 0 0 0,0 1 0 0 0,1 0 0 0 0,0 2 1 0 0,-34 18-1 0 0,42-19-200 0 0,0 0 0 0 0,1 2 0 0 0,-1-1 0 0 0,2 2 1 0 0,-1-1-1 0 0,1 1 0 0 0,1 1 0 0 0,0 0 0 0 0,0 0 0 0 0,1 1 0 0 0,-8 15 1 0 0,14-23-250 0 0,-5 9 94 0 0,1-1 1 0 0,1 1 0 0 0,-5 16 0 0 0,9-26-117 0 0,0-1 0 0 0,0 1 0 0 0,1 0 1 0 0,-1 0-1 0 0,1 0 0 0 0,0 0 0 0 0,-1-1 1 0 0,1 1-1 0 0,1 0 0 0 0,-1 0 0 0 0,0 0 1 0 0,1 0-1 0 0,0 0 0 0 0,-1-1 0 0 0,1 1 1 0 0,0 0-1 0 0,0-1 0 0 0,1 1 0 0 0,-1-1 1 0 0,0 1-1 0 0,1-1 0 0 0,2 4 0 0 0,-2-5-26 0 0,-1 0-1 0 0,0 0 0 0 0,1 0 0 0 0,-1 0 1 0 0,1 0-1 0 0,-1 0 0 0 0,1 0 1 0 0,0-1-1 0 0,-1 1 0 0 0,1 0 1 0 0,0-1-1 0 0,0 0 0 0 0,-1 1 0 0 0,1-1 1 0 0,0 0-1 0 0,0 0 0 0 0,-1 0 1 0 0,1 0-1 0 0,0 0 0 0 0,0 0 1 0 0,0-1-1 0 0,-1 1 0 0 0,1-1 0 0 0,0 1 1 0 0,-1-1-1 0 0,4-1 0 0 0,3-2 147 0 0,0-1-1 0 0,0 1 0 0 0,14-13 0 0 0,-15 12 5 0 0,8-7 83 0 0,0-1 0 0 0,-1-1-1 0 0,16-20 1 0 0,32-50 106 0 0,-18 23 641 0 0,-28 45-282 0 0,-14 14-374 0 0,5 3 286 0 0,-5 0-597 0 0,0-1 0 0 0,-1 1 0 0 0,1 0 0 0 0,-1 0 0 0 0,0 0 0 0 0,1 0 0 0 0,-1 0 0 0 0,0 1 0 0 0,0-1 0 0 0,1 0 0 0 0,-1 0 0 0 0,0 1 0 0 0,0-1 1 0 0,0 1-1 0 0,-1-1 0 0 0,1 1 0 0 0,0-1 0 0 0,0 3 0 0 0,1 3 34 0 0,0 0 1 0 0,-1 1 0 0 0,1 8-1 0 0,3 10 12 0 0,-1-10-218 0 0,19 55-2993 0 0,-19-62 2592 0 0,0 0 0 0 0,0-1 0 0 0,1 1 0 0 0,0-1-1 0 0,10 12 1 0 0,-6-9-1469 0 0</inkml:trace>
+</inkml:ink>
+</file>
+
+<file path=ppt/ink/ink17.xml><?xml version="1.0" encoding="utf-8"?>
+<inkml:ink xmlns:inkml="http://www.w3.org/2003/InkML">
+  <inkml:definitions>
+    <inkml:context xml:id="ctx0">
+      <inkml:inkSource xml:id="inkSrc0">
+        <inkml:traceFormat>
+          <inkml:channel name="X" type="integer" min="-2.14748E9" max="2.14748E9" units="cm"/>
+          <inkml:channel name="Y" type="integer" min="-2.14748E9" max="2.14748E9" units="cm"/>
+          <inkml:channel name="F" type="integer" max="32767" units="dev"/>
+          <inkml:channel name="OA" type="integer" max="360" units="deg"/>
+          <inkml:channel name="OE" type="integer" max="90" units="deg"/>
+        </inkml:traceFormat>
+        <inkml:channelProperties>
+          <inkml:channelProperty channel="X" name="resolution" value="1000" units="1/cm"/>
+          <inkml:channelProperty channel="Y" name="resolution" value="1000" units="1/cm"/>
+          <inkml:channelProperty channel="F" name="resolution" value="0" units="1/dev"/>
+          <inkml:channelProperty channel="OA" name="resolution" value="1000" units="1/deg"/>
+          <inkml:channelProperty channel="OE" name="resolution" value="1000" units="1/deg"/>
+        </inkml:channelProperties>
+      </inkml:inkSource>
+      <inkml:timestamp xml:id="ts0" timeString="2021-02-22T19:00:54.775"/>
+    </inkml:context>
+    <inkml:brush xml:id="br0">
+      <inkml:brushProperty name="width" value="0.05" units="cm"/>
+      <inkml:brushProperty name="height" value="0.05" units="cm"/>
+      <inkml:brushProperty name="color" value="#E71224"/>
+    </inkml:brush>
+  </inkml:definitions>
+  <inkml:trace contextRef="#ctx0" brushRef="#br0">2 220 13448 0 0,'0'0'613'0'0,"0"-13"230"0"0,-1 6-244 0 0,0 1 1 0 0,1-1 0 0 0,0 0 0 0 0,1 1 0 0 0,-1-1 0 0 0,1 1-1 0 0,0-1 1 0 0,1 1 0 0 0,0 0 0 0 0,0-1 0 0 0,0 1 0 0 0,1 0-1 0 0,0 0 1 0 0,0 0 0 0 0,0 1 0 0 0,1-1 0 0 0,0 1 0 0 0,7-8 0 0 0,-10 12-563 0 0,0 0 0 0 0,0 0 0 0 0,0 0 0 0 0,1 0 1 0 0,-1 0-1 0 0,0 0 0 0 0,1 0 0 0 0,-1 0 0 0 0,1 1 1 0 0,-1-1-1 0 0,1 0 0 0 0,0 1 0 0 0,-1 0 0 0 0,1-1 1 0 0,0 1-1 0 0,-1 0 0 0 0,1 0 0 0 0,0 0 0 0 0,-1 0 1 0 0,1 0-1 0 0,-1 0 0 0 0,1 0 0 0 0,0 0 0 0 0,-1 1 1 0 0,1-1-1 0 0,0 1 0 0 0,-1-1 0 0 0,1 1 0 0 0,-1 0 1 0 0,1 0-1 0 0,-1-1 0 0 0,0 1 0 0 0,1 0 0 0 0,1 2 1 0 0,4 4-51 0 0,-1 0 0 0 0,1 0 1 0 0,-2 1-1 0 0,1 0 1 0 0,4 9-1 0 0,5 6 69 0 0,-1-6-56 0 0,-6-12 0 0 0,-7-5 0 0 0,1 0 0 0 0,-1 0 0 0 0,1 0 0 0 0,-1 0 0 0 0,0-1 0 0 0,1 1 0 0 0,-1 0 0 0 0,1-1 0 0 0,-1 1 0 0 0,0-1 0 0 0,1 1 0 0 0,-1-1 0 0 0,0 0 0 0 0,1 0 0 0 0,-1 1 0 0 0,0-1 0 0 0,0 0 0 0 0,0 0 0 0 0,0 0 0 0 0,0 0 0 0 0,0 0 0 0 0,0-1 0 0 0,1 0 0 0 0,3-5 0 0 0,0 0 0 0 0,6-14 0 0 0,-7 13 0 0 0,14-28 2 0 0,-12 23 17 0 0,0 1-1 0 0,0 0 0 0 0,1 0 0 0 0,15-18 0 0 0,-21 30-12 0 0,-1 0-1 0 0,1-1 1 0 0,-1 1-1 0 0,0-1 0 0 0,1 1 1 0 0,-1 0-1 0 0,1-1 1 0 0,0 1-1 0 0,-1 0 0 0 0,1 0 1 0 0,-1-1-1 0 0,1 1 0 0 0,-1 0 1 0 0,1 0-1 0 0,0 0 1 0 0,-1 0-1 0 0,1 0 0 0 0,-1 0 1 0 0,1 0-1 0 0,0 0 1 0 0,-1 0-1 0 0,1 0 0 0 0,-1 0 1 0 0,1 0-1 0 0,0 0 0 0 0,-1 0 1 0 0,1 0-1 0 0,-1 1 1 0 0,1-1-1 0 0,-1 0 0 0 0,1 0 1 0 0,-1 1-1 0 0,1-1 1 0 0,-1 1-1 0 0,1-1 0 0 0,-1 0 1 0 0,1 1-1 0 0,0 0 6 0 0,1 0-3 0 0,-1 1 0 0 0,1-1 0 0 0,-1 1 0 0 0,0 0 0 0 0,1 0 0 0 0,-1-1 0 0 0,0 1 0 0 0,0 0 1 0 0,0 0-1 0 0,0 0 0 0 0,1 4 0 0 0,5 27 24 0 0,-4-22-1 0 0,0 7-15 0 0,-1-1-1 0 0,0 19 0 0 0,-2-21-476 0 0,1 0-1 0 0,1 0 1 0 0,6 26 0 0 0,-1-23-465 0 0</inkml:trace>
+</inkml:ink>
+</file>
+
+<file path=ppt/ink/ink18.xml><?xml version="1.0" encoding="utf-8"?>
+<inkml:ink xmlns:inkml="http://www.w3.org/2003/InkML">
+  <inkml:definitions>
+    <inkml:context xml:id="ctx0">
+      <inkml:inkSource xml:id="inkSrc0">
+        <inkml:traceFormat>
+          <inkml:channel name="X" type="integer" min="-2.14748E9" max="2.14748E9" units="cm"/>
+          <inkml:channel name="Y" type="integer" min="-2.14748E9" max="2.14748E9" units="cm"/>
+          <inkml:channel name="F" type="integer" max="32767" units="dev"/>
+          <inkml:channel name="OA" type="integer" max="360" units="deg"/>
+          <inkml:channel name="OE" type="integer" max="90" units="deg"/>
+        </inkml:traceFormat>
+        <inkml:channelProperties>
+          <inkml:channelProperty channel="X" name="resolution" value="1000" units="1/cm"/>
+          <inkml:channelProperty channel="Y" name="resolution" value="1000" units="1/cm"/>
+          <inkml:channelProperty channel="F" name="resolution" value="0" units="1/dev"/>
+          <inkml:channelProperty channel="OA" name="resolution" value="1000" units="1/deg"/>
+          <inkml:channelProperty channel="OE" name="resolution" value="1000" units="1/deg"/>
+        </inkml:channelProperties>
+      </inkml:inkSource>
+      <inkml:timestamp xml:id="ts0" timeString="2021-02-22T19:00:55.289"/>
+    </inkml:context>
+    <inkml:brush xml:id="br0">
+      <inkml:brushProperty name="width" value="0.05" units="cm"/>
+      <inkml:brushProperty name="height" value="0.05" units="cm"/>
+      <inkml:brushProperty name="color" value="#E71224"/>
+    </inkml:brush>
+  </inkml:definitions>
+  <inkml:trace contextRef="#ctx0" brushRef="#br0">24 322 18943 0 0,'-3'-3'260'0'0,"0"0"1"0"0,0-1-1 0 0,0 1 0 0 0,0-1 0 0 0,1 0 0 0 0,-3-5 0 0 0,5 8-210 0 0,0 0-1 0 0,-1 0 1 0 0,1 0 0 0 0,0 0-1 0 0,0 0 1 0 0,-1 0 0 0 0,1 0-1 0 0,0 0 1 0 0,0 0 0 0 0,0 0-1 0 0,0-1 1 0 0,1 1 0 0 0,-1 0-1 0 0,0 0 1 0 0,0 0 0 0 0,1 0-1 0 0,-1 0 1 0 0,0 0 0 0 0,1 0-1 0 0,-1 0 1 0 0,1 0 0 0 0,-1 0 0 0 0,1 0-1 0 0,0 1 1 0 0,-1-1 0 0 0,1 0-1 0 0,0 0 1 0 0,0 0 0 0 0,0 1-1 0 0,-1-1 1 0 0,1 0 0 0 0,1 0-1 0 0,2-1 171 0 0,0 0 0 0 0,1 0-1 0 0,-1 0 1 0 0,0 0-1 0 0,1 1 1 0 0,-1-1 0 0 0,1 1-1 0 0,-1 0 1 0 0,6 0 0 0 0,44-1 368 0 0,-31 2-322 0 0,217 3 1096 0 0,-63 2 132 0 0,-131-5-1295 0 0,133-3 655 0 0,-167 3-927 0 0,0-1 1 0 0,0-1-1 0 0,0 0 0 0 0,18-6 0 0 0,-29 8 76 0 0,0 0 1 0 0,-1 0-1 0 0,1 0 1 0 0,0-1-1 0 0,0 1 0 0 0,0 0 1 0 0,-1-1-1 0 0,1 1 0 0 0,0-1 1 0 0,-1 1-1 0 0,1-1 0 0 0,0 1 1 0 0,-1-1-1 0 0,1 1 0 0 0,0-1 1 0 0,-1 0-1 0 0,1 1 0 0 0,-1-1 1 0 0,1 0-1 0 0,-1 1 0 0 0,0-1 1 0 0,1 0-1 0 0,-1 0 0 0 0,0 1 1 0 0,1-1-1 0 0,-1 0 0 0 0,0 0 1 0 0,0 0-1 0 0,0 1 1 0 0,0-1-1 0 0,0 0 0 0 0,0 0 1 0 0,0 0-1 0 0,0 0 0 0 0,0 1 1 0 0,0-1-1 0 0,0 0 0 0 0,0 0 1 0 0,-1 0-1 0 0,1 0 0 0 0,0 1 1 0 0,-1-1-1 0 0,1 0 0 0 0,0 0 1 0 0,-1 1-1 0 0,1-1 0 0 0,-2-1 1 0 0,-2-4 37 0 0,-1 1 1 0 0,0-1-1 0 0,0 1 1 0 0,-8-6 0 0 0,9 7-32 0 0,-4-3 1 0 0,-1 1 1 0 0,0 0 0 0 0,-1 0-1 0 0,1 1 1 0 0,-17-7-1 0 0,-53-15 76 0 0,74 26-78 0 0,-45-12-94 0 0,-88-12-1 0 0,126 24 191 0 0,18 3 58 0 0,23 0-25 0 0,37-12 524 0 0,89-26 1 0 0,-142 33-659 0 0,1-1 0 0 0,-1 2-1 0 0,0 0 1 0 0,1 0 0 0 0,21 1 0 0 0,-34 1 10 0 0,0 0 0 0 0,0 0 0 0 0,0 0 0 0 0,0 0-1 0 0,0 1 1 0 0,0-1 0 0 0,0 0 0 0 0,0 1 0 0 0,-1-1 0 0 0,1 0 0 0 0,0 1 0 0 0,0-1 0 0 0,0 1 0 0 0,0-1 0 0 0,-1 1 0 0 0,1 0 0 0 0,0-1 0 0 0,0 1 0 0 0,-1 0 0 0 0,1-1 0 0 0,-1 1 0 0 0,1 0-1 0 0,0 0 1 0 0,0 1 0 0 0,-1 0 2 0 0,1 0-1 0 0,-1 0 0 0 0,1 0 0 0 0,-1-1 0 0 0,0 1 1 0 0,0 0-1 0 0,0 0 0 0 0,0 0 0 0 0,0 0 0 0 0,-1 0 0 0 0,0 3 1 0 0,-2 6-6 0 0,0-1 1 0 0,-1 0-1 0 0,-7 14 1 0 0,10-23-15 0 0,-23 40-55 0 0,-1-2-1 0 0,-2-1 1 0 0,-36 39 0 0 0,33-41-520 0 0,-86 93-4082 0 0,89-101 2898 0 0</inkml:trace>
+</inkml:ink>
+</file>
+
+<file path=ppt/ink/ink19.xml><?xml version="1.0" encoding="utf-8"?>
+<inkml:ink xmlns:inkml="http://www.w3.org/2003/InkML">
+  <inkml:definitions>
+    <inkml:context xml:id="ctx0">
+      <inkml:inkSource xml:id="inkSrc0">
+        <inkml:traceFormat>
+          <inkml:channel name="X" type="integer" min="-2.14748E9" max="2.14748E9" units="cm"/>
+          <inkml:channel name="Y" type="integer" min="-2.14748E9" max="2.14748E9" units="cm"/>
+          <inkml:channel name="F" type="integer" max="32767" units="dev"/>
+          <inkml:channel name="OA" type="integer" max="360" units="deg"/>
+          <inkml:channel name="OE" type="integer" max="90" units="deg"/>
+        </inkml:traceFormat>
+        <inkml:channelProperties>
+          <inkml:channelProperty channel="X" name="resolution" value="1000" units="1/cm"/>
+          <inkml:channelProperty channel="Y" name="resolution" value="1000" units="1/cm"/>
+          <inkml:channelProperty channel="F" name="resolution" value="0" units="1/dev"/>
+          <inkml:channelProperty channel="OA" name="resolution" value="1000" units="1/deg"/>
+          <inkml:channelProperty channel="OE" name="resolution" value="1000" units="1/deg"/>
+        </inkml:channelProperties>
+      </inkml:inkSource>
+      <inkml:timestamp xml:id="ts0" timeString="2021-02-22T19:00:55.716"/>
+    </inkml:context>
+    <inkml:brush xml:id="br0">
+      <inkml:brushProperty name="width" value="0.05" units="cm"/>
+      <inkml:brushProperty name="height" value="0.05" units="cm"/>
+      <inkml:brushProperty name="color" value="#E71224"/>
+    </inkml:brush>
+  </inkml:definitions>
+  <inkml:trace contextRef="#ctx0" brushRef="#br0">360 1 20879 0 0,'-17'1'374'0'0,"0"0"-1"0"0,0 1 1 0 0,1 1-1 0 0,-1 0 0 0 0,0 1 1 0 0,1 1-1 0 0,0 1 1 0 0,0 0-1 0 0,-18 11 0 0 0,14-6-31 0 0,1 1 0 0 0,0 1 0 0 0,1 1 0 0 0,0 1 0 0 0,1 0 0 0 0,-20 24 0 0 0,34-36-311 0 0,0 1 0 0 0,0 0 0 0 0,1 0 0 0 0,-1 0-1 0 0,1 0 1 0 0,0 0 0 0 0,0 0 0 0 0,0 1 0 0 0,0-1 0 0 0,1 1 0 0 0,0-1-1 0 0,0 1 1 0 0,-1 8 0 0 0,2-10-23 0 0,0 0 0 0 0,1 0 0 0 0,-1 0 0 0 0,1 0 0 0 0,-1 0 0 0 0,1 0 0 0 0,0 0 0 0 0,0 0 0 0 0,1 0 0 0 0,-1 0 0 0 0,0-1 0 0 0,1 1 0 0 0,0 0 0 0 0,0-1 0 0 0,0 1 0 0 0,0-1 0 0 0,0 0 0 0 0,0 0 0 0 0,0 0 0 0 0,1 0 0 0 0,4 3 0 0 0,4 1 31 0 0,1 0-1 0 0,0-1 1 0 0,1 0-1 0 0,-1-1 1 0 0,1 0-1 0 0,0-1 0 0 0,21 2 1 0 0,27 8 174 0 0,-53-11-106 0 0,0 0 0 0 0,0 1-1 0 0,0 0 1 0 0,-1 0-1 0 0,1 1 1 0 0,6 4-1 0 0,-12-6-85 0 0,0-1 1 0 0,0 1-1 0 0,0 0 0 0 0,0-1 1 0 0,-1 1-1 0 0,1 0 0 0 0,-1 0 1 0 0,1 0-1 0 0,-1 1 0 0 0,0-1 1 0 0,0 0-1 0 0,0 0 0 0 0,0 1 1 0 0,0-1-1 0 0,0 1 0 0 0,-1-1 1 0 0,1 0-1 0 0,-1 1 0 0 0,0-1 1 0 0,0 1-1 0 0,0-1 0 0 0,0 1 0 0 0,0-1 1 0 0,-1 4-1 0 0,-1 3 10 0 0,0-1-1 0 0,0 0 1 0 0,-1 1-1 0 0,0-1 1 0 0,0-1-1 0 0,-1 1 1 0 0,0 0-1 0 0,-1-1 0 0 0,0 0 1 0 0,0 0-1 0 0,0 0 1 0 0,-1-1-1 0 0,0 0 1 0 0,0 0-1 0 0,-10 7 1 0 0,-3 1-95 0 0,-1 0 0 0 0,0-2 0 0 0,-1 0 0 0 0,-28 11 0 0 0,-38 15-3813 0 0,81-34 2117 0 0</inkml:trace>
+</inkml:ink>
+</file>
+
+<file path=ppt/ink/ink2.xml><?xml version="1.0" encoding="utf-8"?>
+<inkml:ink xmlns:inkml="http://www.w3.org/2003/InkML">
+  <inkml:definitions>
+    <inkml:context xml:id="ctx0">
+      <inkml:inkSource xml:id="inkSrc0">
+        <inkml:traceFormat>
+          <inkml:channel name="X" type="integer" min="-2.14748E9" max="2.14748E9" units="cm"/>
+          <inkml:channel name="Y" type="integer" min="-2.14748E9" max="2.14748E9" units="cm"/>
+          <inkml:channel name="F" type="integer" max="32767" units="dev"/>
+          <inkml:channel name="OA" type="integer" max="360" units="deg"/>
+          <inkml:channel name="OE" type="integer" max="90" units="deg"/>
+        </inkml:traceFormat>
+        <inkml:channelProperties>
+          <inkml:channelProperty channel="X" name="resolution" value="1000" units="1/cm"/>
+          <inkml:channelProperty channel="Y" name="resolution" value="1000" units="1/cm"/>
+          <inkml:channelProperty channel="F" name="resolution" value="0" units="1/dev"/>
+          <inkml:channelProperty channel="OA" name="resolution" value="1000" units="1/deg"/>
+          <inkml:channelProperty channel="OE" name="resolution" value="1000" units="1/deg"/>
+        </inkml:channelProperties>
+      </inkml:inkSource>
+      <inkml:timestamp xml:id="ts0" timeString="2021-02-22T19:00:31.863"/>
+    </inkml:context>
+    <inkml:brush xml:id="br0">
+      <inkml:brushProperty name="width" value="0.05" units="cm"/>
+      <inkml:brushProperty name="height" value="0.05" units="cm"/>
+      <inkml:brushProperty name="color" value="#E71224"/>
+    </inkml:brush>
+  </inkml:definitions>
+  <inkml:trace contextRef="#ctx0" brushRef="#br0">68 60 5528 0 0,'-4'-1'-91'0'0,"-32"-14"3242"0"0,33 14-2787 0 0,1 0 0 0 0,0 0 0 0 0,0-1 0 0 0,0 1-1 0 0,0 0 1 0 0,1-1 0 0 0,-1 0 0 0 0,0 1 0 0 0,0-1 0 0 0,1 0 0 0 0,-1 0 0 0 0,1 0-1 0 0,-2-4 1 0 0,2 5 154 0 0,4-4 628 0 0,-3 5-1081 0 0,0-1-1 0 0,0 1 0 0 0,0-1 0 0 0,1 1 0 0 0,-1-1 1 0 0,0 1-1 0 0,0-1 0 0 0,0 1 0 0 0,1-1 1 0 0,-1 1-1 0 0,0-1 0 0 0,1 1 0 0 0,-1 0 1 0 0,0-1-1 0 0,1 1 0 0 0,-1-1 0 0 0,0 1 1 0 0,1 0-1 0 0,-1-1 0 0 0,1 1 0 0 0,0 0 0 0 0,12-1 1174 0 0,-8 0-938 0 0,-1 1 0 0 0,0 0 0 0 0,0 0 0 0 0,0 0 0 0 0,5 1 0 0 0,9 5 255 0 0,0 0 0 0 0,-1 1 0 0 0,0 1 0 0 0,25 15 0 0 0,-22-12-258 0 0,0-1 0 0 0,31 12 0 0 0,-3-9 431 0 0,0-3 1 0 0,85 8-1 0 0,-83-12-675 0 0,392 34 1237 0 0,-270-32-805 0 0,239-21 1 0 0,-143-20 1052 0 0,-190 22-1327 0 0,37-12 227 0 0,-69 13 265 0 0,76-7 0 0 0,-106 16-835 0 0,-2 1 159 0 0,0-1-1 0 0,26-5 1 0 0,47-7 165 0 0,-84 12-184 0 0,-1 0 0 0 0,1 0 0 0 0,0-1 0 0 0,0 1 0 0 0,-1-1 0 0 0,4-2 0 0 0,6-3 88 0 0,-12 6-95 0 0,1 1-1 0 0,0 0 1 0 0,-1-1-1 0 0,1 1 1 0 0,0 0 0 0 0,-1-1-1 0 0,1 1 1 0 0,-1-1 0 0 0,1 1-1 0 0,-1-1 1 0 0,1 1-1 0 0,-1-1 1 0 0,1 1 0 0 0,-1-1-1 0 0,1 0 1 0 0,-1 1-1 0 0,0-1 1 0 0,1 0 0 0 0,-1 1-1 0 0,0-1 1 0 0,0 0-1 0 0,1 0 1 0 0,-1 0 0 0 0,1-3 0 0 0,-1-3 0 0 0,0 6-2 0 0,0 1 1 0 0,0 0-1 0 0,-1-1 1 0 0,1 1-1 0 0,0-1 0 0 0,0 1 1 0 0,0-1-1 0 0,0 1 1 0 0,0-1-1 0 0,0 1 0 0 0,0-1 1 0 0,0 1-1 0 0,1 0 1 0 0,-1-1-1 0 0,0 1 1 0 0,0-1-1 0 0,0 1 0 0 0,0-1 1 0 0,1 1-1 0 0,-1 0 1 0 0,0-1-1 0 0,1 0-68 0 0,-11-3-1927 0 0,6 8 1381 0 0,0-1 0 0 0,0 1 0 0 0,0-1 0 0 0,1 1 0 0 0,-1 0 0 0 0,1 1 0 0 0,0-1 0 0 0,0 0 0 0 0,-2 6 1 0 0,0-1-113 0 0,-5 8-1120 0 0</inkml:trace>
+</inkml:ink>
+</file>
+
+<file path=ppt/ink/ink20.xml><?xml version="1.0" encoding="utf-8"?>
+<inkml:ink xmlns:inkml="http://www.w3.org/2003/InkML">
+  <inkml:definitions>
+    <inkml:context xml:id="ctx0">
+      <inkml:inkSource xml:id="inkSrc0">
+        <inkml:traceFormat>
+          <inkml:channel name="X" type="integer" min="-2.14748E9" max="2.14748E9" units="cm"/>
+          <inkml:channel name="Y" type="integer" min="-2.14748E9" max="2.14748E9" units="cm"/>
+          <inkml:channel name="F" type="integer" max="32767" units="dev"/>
+          <inkml:channel name="OA" type="integer" max="360" units="deg"/>
+          <inkml:channel name="OE" type="integer" max="90" units="deg"/>
+        </inkml:traceFormat>
+        <inkml:channelProperties>
+          <inkml:channelProperty channel="X" name="resolution" value="1000" units="1/cm"/>
+          <inkml:channelProperty channel="Y" name="resolution" value="1000" units="1/cm"/>
+          <inkml:channelProperty channel="F" name="resolution" value="0" units="1/dev"/>
+          <inkml:channelProperty channel="OA" name="resolution" value="1000" units="1/deg"/>
+          <inkml:channelProperty channel="OE" name="resolution" value="1000" units="1/deg"/>
+        </inkml:channelProperties>
+      </inkml:inkSource>
+      <inkml:timestamp xml:id="ts0" timeString="2021-02-22T19:00:56.119"/>
+    </inkml:context>
+    <inkml:brush xml:id="br0">
+      <inkml:brushProperty name="width" value="0.05" units="cm"/>
+      <inkml:brushProperty name="height" value="0.05" units="cm"/>
+      <inkml:brushProperty name="color" value="#E71224"/>
+    </inkml:brush>
+  </inkml:definitions>
+  <inkml:trace contextRef="#ctx0" brushRef="#br0">261 1 10136 0 0,'-1'2'171'0'0,"-1"1"0"0"0,1-1 1 0 0,-1 1-1 0 0,0-1 0 0 0,0 0 1 0 0,1 0-1 0 0,-2 0 0 0 0,1 0 0 0 0,0 0 1 0 0,0 0-1 0 0,-5 2 0 0 0,-34 17 4286 0 0,19-11-1799 0 0,3 1-1509 0 0,0 1 0 0 0,1 0 0 0 0,-28 25 0 0 0,41-32-965 0 0,-2 0 55 0 0,1 0 1 0 0,0 1-1 0 0,0-1 0 0 0,1 1 1 0 0,0 0-1 0 0,0 1 1 0 0,0-1-1 0 0,1 1 0 0 0,0 0 1 0 0,-5 11-1 0 0,9-17-231 0 0,0-1 0 0 0,-1 1 0 0 0,1-1 0 0 0,0 1 0 0 0,0 0 0 0 0,-1-1 0 0 0,1 1 0 0 0,0-1 0 0 0,0 1 0 0 0,0 0 0 0 0,0-1 0 0 0,0 1 0 0 0,0-1 0 0 0,0 1 0 0 0,0 0 0 0 0,0-1 0 0 0,0 1-1 0 0,1-1 1 0 0,-1 1 0 0 0,0 0 0 0 0,0-1 0 0 0,0 1 0 0 0,1-1 0 0 0,-1 1 0 0 0,0-1 0 0 0,1 1 0 0 0,-1-1 0 0 0,0 1 0 0 0,1-1 0 0 0,-1 1 0 0 0,1 0 0 0 0,1-1 13 0 0,-1 0 0 0 0,0 1 0 0 0,0-1 0 0 0,1 0 0 0 0,-1 0 0 0 0,0 1 1 0 0,1-1-1 0 0,-1 0 0 0 0,0 0 0 0 0,1-1 0 0 0,-1 1 0 0 0,0 0 0 0 0,3-1 0 0 0,5-1 95 0 0,0-2-1 0 0,16-6 0 0 0,-13 3-33 0 0,0 0 0 0 0,-1 0 0 0 0,1-1 0 0 0,15-15 0 0 0,35-42 660 0 0,-12 12-398 0 0,-47 50-305 0 0,1 0 1 0 0,-1 0-1 0 0,0 1 0 0 0,1-1 1 0 0,0 1-1 0 0,-1 0 0 0 0,9-4 0 0 0,-11 6-33 0 0,0-1 0 0 0,0 1 0 0 0,0 0 0 0 0,0 0 0 0 0,0 0 0 0 0,0 0 0 0 0,1 0 0 0 0,-1 0 0 0 0,0 0 0 0 0,0 0 0 0 0,0 0 0 0 0,0 0 0 0 0,0 0 0 0 0,0 1-1 0 0,0-1 1 0 0,0 0 0 0 0,0 1 0 0 0,0-1 0 0 0,0 1 0 0 0,0-1 0 0 0,0 1 0 0 0,0 0 0 0 0,0-1 0 0 0,-1 1 0 0 0,1 0 0 0 0,0 0 0 0 0,0-1 0 0 0,-1 1 0 0 0,1 0 0 0 0,0 0-1 0 0,-1 0 1 0 0,1 0 0 0 0,-1 0 0 0 0,1 0 0 0 0,0 2 0 0 0,1 3 27 0 0,0 1 0 0 0,0 0-1 0 0,0 0 1 0 0,-1 0 0 0 0,1 0 0 0 0,-2 0 0 0 0,1 0-1 0 0,-1 8 1 0 0,-8 61 203 0 0,4-42-110 0 0,1-10-306 0 0,2 0 0 0 0,2 44-1 0 0,3-55-340 0 0,-4-13 489 0 0,0 0 0 0 0,0 0 0 0 0,1 1-1 0 0,-1-1 1 0 0,0 0 0 0 0,0 0 0 0 0,0 0 0 0 0,0 0-1 0 0,1 0 1 0 0,-1 1 0 0 0,0-1 0 0 0,0 0 0 0 0,0 0 0 0 0,1 0-1 0 0,-1 0 1 0 0,0 0 0 0 0,0 0 0 0 0,0 0 0 0 0,1 0 0 0 0,-1 0-1 0 0,0 0 1 0 0,0 0 0 0 0,0 0 0 0 0,1 0 0 0 0,-1 0-1 0 0,0 0 1 0 0,0 0 0 0 0,1 0 0 0 0,-1 0 0 0 0,0 0 0 0 0,2-2-321 0 0,-1 1 1 0 0,1 0 0 0 0,-1 0 0 0 0,1 0 0 0 0,-1-1 0 0 0,0 1 0 0 0,0-1 0 0 0,1 1-1 0 0,0-3 1 0 0,9-12-8667 0 0</inkml:trace>
+</inkml:ink>
+</file>
+
+<file path=ppt/ink/ink21.xml><?xml version="1.0" encoding="utf-8"?>
+<inkml:ink xmlns:inkml="http://www.w3.org/2003/InkML">
+  <inkml:definitions>
+    <inkml:context xml:id="ctx0">
+      <inkml:inkSource xml:id="inkSrc0">
+        <inkml:traceFormat>
+          <inkml:channel name="X" type="integer" min="-2.14748E9" max="2.14748E9" units="cm"/>
+          <inkml:channel name="Y" type="integer" min="-2.14748E9" max="2.14748E9" units="cm"/>
+          <inkml:channel name="F" type="integer" max="32767" units="dev"/>
+          <inkml:channel name="OA" type="integer" max="360" units="deg"/>
+          <inkml:channel name="OE" type="integer" max="90" units="deg"/>
+        </inkml:traceFormat>
+        <inkml:channelProperties>
+          <inkml:channelProperty channel="X" name="resolution" value="1000" units="1/cm"/>
+          <inkml:channelProperty channel="Y" name="resolution" value="1000" units="1/cm"/>
+          <inkml:channelProperty channel="F" name="resolution" value="0" units="1/dev"/>
+          <inkml:channelProperty channel="OA" name="resolution" value="1000" units="1/deg"/>
+          <inkml:channelProperty channel="OE" name="resolution" value="1000" units="1/deg"/>
+        </inkml:channelProperties>
+      </inkml:inkSource>
+      <inkml:timestamp xml:id="ts0" timeString="2021-02-22T19:00:56.485"/>
+    </inkml:context>
+    <inkml:brush xml:id="br0">
+      <inkml:brushProperty name="width" value="0.05" units="cm"/>
+      <inkml:brushProperty name="height" value="0.05" units="cm"/>
+      <inkml:brushProperty name="color" value="#E71224"/>
+    </inkml:brush>
+  </inkml:definitions>
+  <inkml:trace contextRef="#ctx0" brushRef="#br0">235 0 16128 0 0,'0'0'1459'0'0,"0"2"-1203"0"0,2 94 6516 0 0,1 5-4462 0 0,3 223-545 0 0,7-103-1879 0 0,-10-176-1867 0 0,-5-27 817 0 0</inkml:trace>
+  <inkml:trace contextRef="#ctx0" brushRef="#br0" timeOffset="1">0 437 23039 0 0,'2'-2'157'0'0,"0"1"-1"0"0,0 0 1 0 0,0-1 0 0 0,0 1-1 0 0,0 0 1 0 0,0 0-1 0 0,1 1 1 0 0,-1-1 0 0 0,0 0-1 0 0,0 1 1 0 0,3-1-1 0 0,29-2 480 0 0,-27 2-644 0 0,52 1 202 0 0,111 13 0 0 0,-78-4-905 0 0,-31-6-724 0 0,0-3 0 0 0,64-9 0 0 0,-32-4 28 0 0</inkml:trace>
+</inkml:ink>
+</file>
+
+<file path=ppt/ink/ink22.xml><?xml version="1.0" encoding="utf-8"?>
+<inkml:ink xmlns:inkml="http://www.w3.org/2003/InkML">
+  <inkml:definitions>
+    <inkml:context xml:id="ctx0">
+      <inkml:inkSource xml:id="inkSrc0">
+        <inkml:traceFormat>
+          <inkml:channel name="X" type="integer" min="-2.14748E9" max="2.14748E9" units="cm"/>
+          <inkml:channel name="Y" type="integer" min="-2.14748E9" max="2.14748E9" units="cm"/>
+          <inkml:channel name="F" type="integer" max="32767" units="dev"/>
+          <inkml:channel name="OA" type="integer" max="360" units="deg"/>
+          <inkml:channel name="OE" type="integer" max="90" units="deg"/>
+        </inkml:traceFormat>
+        <inkml:channelProperties>
+          <inkml:channelProperty channel="X" name="resolution" value="1000" units="1/cm"/>
+          <inkml:channelProperty channel="Y" name="resolution" value="1000" units="1/cm"/>
+          <inkml:channelProperty channel="F" name="resolution" value="0" units="1/dev"/>
+          <inkml:channelProperty channel="OA" name="resolution" value="1000" units="1/deg"/>
+          <inkml:channelProperty channel="OE" name="resolution" value="1000" units="1/deg"/>
+        </inkml:channelProperties>
+      </inkml:inkSource>
+      <inkml:timestamp xml:id="ts0" timeString="2021-02-22T19:00:57.253"/>
+    </inkml:context>
+    <inkml:brush xml:id="br0">
+      <inkml:brushProperty name="width" value="0.05" units="cm"/>
+      <inkml:brushProperty name="height" value="0.05" units="cm"/>
+      <inkml:brushProperty name="color" value="#E71224"/>
+    </inkml:brush>
+  </inkml:definitions>
+  <inkml:trace contextRef="#ctx0" brushRef="#br0">142 8 18511 0 0,'-2'-7'2898'0'0,"-3"15"-2180"0"0,1 1-1 0 0,1 0 1 0 0,0 1 0 0 0,-3 11 0 0 0,-2 7-414 0 0,-25 69-198 0 0,-13 43-10 0 0,36-104-86 0 0,1 0 1 0 0,-2 37-1 0 0,10-65-290 0 0,0 1 0 0 0,1 0 1 0 0,0 0-1 0 0,1 0 0 0 0,0-1 0 0 0,0 1 0 0 0,3 9 0 0 0,-3-16 195 0 0,-1 0-1 0 0,1 0 0 0 0,0 0 1 0 0,0 0-1 0 0,0 0 1 0 0,-1 0-1 0 0,2 0 0 0 0,-1 0 1 0 0,0-1-1 0 0,0 1 0 0 0,1 0 1 0 0,-1-1-1 0 0,0 1 1 0 0,1-1-1 0 0,0 0 0 0 0,-1 1 1 0 0,1-1-1 0 0,0 0 0 0 0,0 0 1 0 0,0 0-1 0 0,-1 0 1 0 0,1 0-1 0 0,0-1 0 0 0,0 1 1 0 0,0 0-1 0 0,0-1 0 0 0,1 0 1 0 0,-1 1-1 0 0,0-1 1 0 0,0 0-1 0 0,0 0 0 0 0,0 0 1 0 0,0 0-1 0 0,4-2 0 0 0,14-4-1439 0 0,0-4-10 0 0</inkml:trace>
+</inkml:ink>
+</file>
+
+<file path=ppt/ink/ink23.xml><?xml version="1.0" encoding="utf-8"?>
+<inkml:ink xmlns:inkml="http://www.w3.org/2003/InkML">
+  <inkml:definitions>
+    <inkml:context xml:id="ctx0">
+      <inkml:inkSource xml:id="inkSrc0">
+        <inkml:traceFormat>
+          <inkml:channel name="X" type="integer" min="-2.14748E9" max="2.14748E9" units="cm"/>
+          <inkml:channel name="Y" type="integer" min="-2.14748E9" max="2.14748E9" units="cm"/>
+          <inkml:channel name="F" type="integer" max="32767" units="dev"/>
+          <inkml:channel name="OA" type="integer" max="360" units="deg"/>
+          <inkml:channel name="OE" type="integer" max="90" units="deg"/>
+        </inkml:traceFormat>
+        <inkml:channelProperties>
+          <inkml:channelProperty channel="X" name="resolution" value="1000" units="1/cm"/>
+          <inkml:channelProperty channel="Y" name="resolution" value="1000" units="1/cm"/>
+          <inkml:channelProperty channel="F" name="resolution" value="0" units="1/dev"/>
+          <inkml:channelProperty channel="OA" name="resolution" value="1000" units="1/deg"/>
+          <inkml:channelProperty channel="OE" name="resolution" value="1000" units="1/deg"/>
+        </inkml:channelProperties>
+      </inkml:inkSource>
+      <inkml:timestamp xml:id="ts0" timeString="2021-02-22T19:00:57.634"/>
+    </inkml:context>
+    <inkml:brush xml:id="br0">
+      <inkml:brushProperty name="width" value="0.05" units="cm"/>
+      <inkml:brushProperty name="height" value="0.05" units="cm"/>
+      <inkml:brushProperty name="color" value="#E71224"/>
+    </inkml:brush>
+  </inkml:definitions>
+  <inkml:trace contextRef="#ctx0" brushRef="#br0">132 48 19319 0 0,'0'-3'171'0'0,"-1"0"-1"0"0,1 0 0 0 0,-1 0 1 0 0,1 0-1 0 0,-1 0 0 0 0,0 0 1 0 0,0 0-1 0 0,0 0 0 0 0,0 0 1 0 0,-3-4-1 0 0,4 7-153 0 0,-1-1 0 0 0,1 0 0 0 0,-1 0 0 0 0,1 1 0 0 0,-1-1 0 0 0,0 0 0 0 0,1 1 0 0 0,-1-1 0 0 0,1 1 0 0 0,-1-1 0 0 0,0 1 0 0 0,0-1 0 0 0,1 1 0 0 0,-1-1 0 0 0,0 1 0 0 0,0 0 0 0 0,0 0 0 0 0,1-1 0 0 0,-1 1 0 0 0,0 0 0 0 0,0 0 0 0 0,0 0 0 0 0,0 0 0 0 0,0 0 0 0 0,1 0 0 0 0,-1 0 0 0 0,0 0 0 0 0,0 0 0 0 0,0 0 0 0 0,0 0 0 0 0,1 0 0 0 0,-1 1 0 0 0,0-1 0 0 0,0 0 0 0 0,0 1 0 0 0,1-1 0 0 0,-1 1 0 0 0,0-1 0 0 0,0 1 0 0 0,0 0 0 0 0,-5 4 148 0 0,0 1 0 0 0,1-1 0 0 0,0 1 0 0 0,0 0 0 0 0,0 0-1 0 0,1 1 1 0 0,0-1 0 0 0,0 1 0 0 0,-5 12 0 0 0,2 0-151 0 0,0-1 1 0 0,-5 32-1 0 0,8-27 322 0 0,1 0 0 0 0,1 0 0 0 0,1 1 1 0 0,1-1-1 0 0,1 1 0 0 0,1-1 0 0 0,2 0 0 0 0,10 39 0 0 0,-13-56-233 0 0,1 0 1 0 0,0-1-1 0 0,1 0 0 0 0,4 9 0 0 0,-6-13-52 0 0,0 1-1 0 0,1 0 1 0 0,-1 0 0 0 0,0-1-1 0 0,1 1 1 0 0,-1 0-1 0 0,1-1 1 0 0,-1 1-1 0 0,1-1 1 0 0,0 0 0 0 0,-1 0-1 0 0,1 0 1 0 0,0 1-1 0 0,3 0 1 0 0,-4-2 258 0 0,11-11 300 0 0,-3 0-457 0 0,0-1 0 0 0,-1 0-1 0 0,0 0 1 0 0,-1-1-1 0 0,0 0 1 0 0,-1 0-1 0 0,-1-1 1 0 0,5-18-1 0 0,-2 3-662 0 0,-2-1 0 0 0,-1 1 0 0 0,2-32 0 0 0,-7 39-6364 0 0,0 4-2258 0 0</inkml:trace>
+</inkml:ink>
+</file>
+
+<file path=ppt/ink/ink24.xml><?xml version="1.0" encoding="utf-8"?>
+<inkml:ink xmlns:inkml="http://www.w3.org/2003/InkML">
+  <inkml:definitions>
+    <inkml:context xml:id="ctx0">
+      <inkml:inkSource xml:id="inkSrc0">
+        <inkml:traceFormat>
+          <inkml:channel name="X" type="integer" min="-2.14748E9" max="2.14748E9" units="cm"/>
+          <inkml:channel name="Y" type="integer" min="-2.14748E9" max="2.14748E9" units="cm"/>
+          <inkml:channel name="F" type="integer" max="32767" units="dev"/>
+          <inkml:channel name="OA" type="integer" max="360" units="deg"/>
+          <inkml:channel name="OE" type="integer" max="90" units="deg"/>
+        </inkml:traceFormat>
+        <inkml:channelProperties>
+          <inkml:channelProperty channel="X" name="resolution" value="1000" units="1/cm"/>
+          <inkml:channelProperty channel="Y" name="resolution" value="1000" units="1/cm"/>
+          <inkml:channelProperty channel="F" name="resolution" value="0" units="1/dev"/>
+          <inkml:channelProperty channel="OA" name="resolution" value="1000" units="1/deg"/>
+          <inkml:channelProperty channel="OE" name="resolution" value="1000" units="1/deg"/>
+        </inkml:channelProperties>
+      </inkml:inkSource>
+      <inkml:timestamp xml:id="ts0" timeString="2021-02-22T19:00:58.039"/>
+    </inkml:context>
+    <inkml:brush xml:id="br0">
+      <inkml:brushProperty name="width" value="0.05" units="cm"/>
+      <inkml:brushProperty name="height" value="0.05" units="cm"/>
+      <inkml:brushProperty name="color" value="#E71224"/>
+    </inkml:brush>
+  </inkml:definitions>
+  <inkml:trace contextRef="#ctx0" brushRef="#br0">313 81 12960 0 0,'-8'-11'297'0'0,"0"0"0"0"0,0 1 1 0 0,-1 0-1 0 0,-11-10 0 0 0,17 18-83 0 0,0 0-1 0 0,0 0 0 0 0,0 0 0 0 0,0 0 1 0 0,0 1-1 0 0,-1-1 0 0 0,1 1 1 0 0,0 0-1 0 0,-1 0 0 0 0,1 0 1 0 0,-1 1-1 0 0,1-1 0 0 0,-1 1 1 0 0,1 0-1 0 0,-1 0 0 0 0,1 0 1 0 0,-1 0-1 0 0,1 0 0 0 0,-1 1 0 0 0,1 0 1 0 0,-5 1-1 0 0,-1 1 307 0 0,1 1 1 0 0,-1 1-1 0 0,1-1 0 0 0,0 1 0 0 0,0 1 0 0 0,-12 10 1 0 0,9-6-205 0 0,0 1 1 0 0,0 0-1 0 0,1 0 1 0 0,0 1 0 0 0,-11 17-1 0 0,15-19-168 0 0,1 0 0 0 0,0 0 0 0 0,1 0-1 0 0,0 1 1 0 0,0 0 0 0 0,1-1-1 0 0,1 1 1 0 0,-2 13 0 0 0,4-23-89 0 0,0 0 0 0 0,-1 1-1 0 0,1-1 1 0 0,0 1 0 0 0,0-1 0 0 0,1 1 0 0 0,-1-1 0 0 0,0 1 0 0 0,0-1 0 0 0,1 0-1 0 0,-1 1 1 0 0,1-1 0 0 0,-1 1 0 0 0,1-1 0 0 0,-1 0 0 0 0,1 0 0 0 0,0 1-1 0 0,0-1 1 0 0,0 0 0 0 0,0 0 0 0 0,0 0 0 0 0,0 0 0 0 0,0 0 0 0 0,0 0-1 0 0,0 0 1 0 0,2 1 0 0 0,-3-2-58 0 0,1 1 0 0 0,0-1 1 0 0,-1 0-1 0 0,1 1 0 0 0,-1-1 0 0 0,1 0 0 0 0,0 0 0 0 0,-1 1 0 0 0,1-1 0 0 0,0 0 1 0 0,0 0-1 0 0,-1 0 0 0 0,1 0 0 0 0,0 0 0 0 0,-1 0 0 0 0,1 0 0 0 0,0 0 0 0 0,0 0 0 0 0,-1 0 1 0 0,1-1-1 0 0,0 1 0 0 0,-1 0 0 0 0,1 0 0 0 0,1-1 0 0 0,0 0 14 0 0,3-1 39 0 0,-1 1 0 0 0,1-1 1 0 0,0-1-1 0 0,-1 1 0 0 0,0 0 0 0 0,1-1 1 0 0,-1 0-1 0 0,6-5 0 0 0,28-32 336 0 0,-30 31-311 0 0,20-28 207 0 0,-23 29-212 0 0,0 1-1 0 0,0 0 1 0 0,1-1-1 0 0,0 2 0 0 0,14-13 1 0 0,-20 19-70 0 0,1 0 1 0 0,-1-1 0 0 0,1 1-1 0 0,-1 0 1 0 0,1-1 0 0 0,-1 1-1 0 0,1 0 1 0 0,-1 0 0 0 0,1-1-1 0 0,-1 1 1 0 0,1 0 0 0 0,0 0-1 0 0,-1 0 1 0 0,1 0 0 0 0,-1 0-1 0 0,1 0 1 0 0,-1 0 0 0 0,1 0 0 0 0,0 0-1 0 0,-1 0 1 0 0,1 0 0 0 0,-1 0-1 0 0,1 0 1 0 0,-1 1 0 0 0,2-1-1 0 0,-1 1 0 0 0,-1-1 0 0 0,1 1 0 0 0,0 0 0 0 0,0 0 0 0 0,0-1 0 0 0,-1 1 0 0 0,1 0 0 0 0,0 0 0 0 0,-1 0 0 0 0,1 0 0 0 0,-1 0-1 0 0,1 2 1 0 0,2 5-24 0 0,-1 0 0 0 0,0 0-1 0 0,1 10 1 0 0,-1-6-69 0 0,3 8-26 0 0,17 68-1812 0 0,-18-76 930 0 0,0 0-1 0 0,1-1 1 0 0,1 0 0 0 0,0 0-1 0 0,9 12 1 0 0,-9-14-562 0 0</inkml:trace>
+</inkml:ink>
+</file>
+
+<file path=ppt/ink/ink25.xml><?xml version="1.0" encoding="utf-8"?>
+<inkml:ink xmlns:inkml="http://www.w3.org/2003/InkML">
+  <inkml:definitions>
+    <inkml:context xml:id="ctx0">
+      <inkml:inkSource xml:id="inkSrc0">
+        <inkml:traceFormat>
+          <inkml:channel name="X" type="integer" min="-2.14748E9" max="2.14748E9" units="cm"/>
+          <inkml:channel name="Y" type="integer" min="-2.14748E9" max="2.14748E9" units="cm"/>
+          <inkml:channel name="F" type="integer" max="32767" units="dev"/>
+          <inkml:channel name="OA" type="integer" max="360" units="deg"/>
+          <inkml:channel name="OE" type="integer" max="90" units="deg"/>
+        </inkml:traceFormat>
+        <inkml:channelProperties>
+          <inkml:channelProperty channel="X" name="resolution" value="1000" units="1/cm"/>
+          <inkml:channelProperty channel="Y" name="resolution" value="1000" units="1/cm"/>
+          <inkml:channelProperty channel="F" name="resolution" value="0" units="1/dev"/>
+          <inkml:channelProperty channel="OA" name="resolution" value="1000" units="1/deg"/>
+          <inkml:channelProperty channel="OE" name="resolution" value="1000" units="1/deg"/>
+        </inkml:channelProperties>
+      </inkml:inkSource>
+      <inkml:timestamp xml:id="ts0" timeString="2021-02-22T19:00:58.443"/>
+    </inkml:context>
+    <inkml:brush xml:id="br0">
+      <inkml:brushProperty name="width" value="0.05" units="cm"/>
+      <inkml:brushProperty name="height" value="0.05" units="cm"/>
+      <inkml:brushProperty name="color" value="#E71224"/>
+    </inkml:brush>
+  </inkml:definitions>
+  <inkml:trace contextRef="#ctx0" brushRef="#br0">0 244 16559 0 0,'0'0'1499'0'0,"0"-8"-1206"0"0,3-6 691 0 0,1 0 0 0 0,0 0 0 0 0,1 1 0 0 0,0 0 0 0 0,11-21 0 0 0,0 1-288 0 0,-10 21-109 0 0,1 0 0 0 0,1 0 0 0 0,0 1 0 0 0,0 0 0 0 0,18-18-1 0 0,-26 28-545 0 0,1 0 0 0 0,0 0-1 0 0,0 0 1 0 0,0 0 0 0 0,0 0-1 0 0,0 0 1 0 0,0 0 0 0 0,0 1-1 0 0,1-1 1 0 0,-1 0 0 0 0,0 1-1 0 0,0-1 1 0 0,1 1 0 0 0,-1-1-1 0 0,0 1 1 0 0,1 0 0 0 0,-1-1 0 0 0,0 1-1 0 0,1 0 1 0 0,-1 0 0 0 0,0 0-1 0 0,3 0 1 0 0,-2 1-64 0 0,0 0 0 0 0,0-1 1 0 0,-1 1-1 0 0,1 0 0 0 0,0 0 1 0 0,-1 0-1 0 0,1 1 0 0 0,-1-1 0 0 0,1 0 1 0 0,-1 0-1 0 0,1 1 0 0 0,-1-1 1 0 0,0 1-1 0 0,1 1 0 0 0,4 7-203 0 0,0 0 0 0 0,-1 0 0 0 0,0 1 1 0 0,4 12-1 0 0,-9-21 239 0 0,14 45-277 0 0,-11-32 269 0 0,2 1 1 0 0,6 15-1 0 0,-10-29-5 0 0,0 0 0 0 0,0 0 0 0 0,0-1 0 0 0,0 1 0 0 0,0 0 0 0 0,0 0 0 0 0,0-1 0 0 0,1 1 0 0 0,-1-1 0 0 0,0 0 0 0 0,1 1 0 0 0,-1-1 0 0 0,1 0 0 0 0,3 2 0 0 0,-4-2 0 0 0,0-1 0 0 0,1 0 0 0 0,-1 0 0 0 0,0 1 0 0 0,0-1 0 0 0,1 0 0 0 0,-1 0 0 0 0,0 0 0 0 0,1-1 0 0 0,-1 1 0 0 0,0 0 0 0 0,1 0 0 0 0,-1-1 0 0 0,0 1 0 0 0,0 0 0 0 0,0-1 0 0 0,1 0 0 0 0,-1 1 0 0 0,0-1 0 0 0,0 1 0 0 0,0-1 0 0 0,2-1 0 0 0,3-4 0 0 0,1 0 0 0 0,-1 0 0 0 0,0 0 0 0 0,0-1 0 0 0,5-8 0 0 0,24-41 0 0 0,-20 30 0 0 0,-13 23 0 0 0,1-1 0 0 0,-1 1 0 0 0,1 0 0 0 0,-1 0 0 0 0,1 0 0 0 0,0 0 0 0 0,0 1 0 0 0,0-1 0 0 0,0 1 0 0 0,4-2 0 0 0,-6 3 0 0 0,0 0 0 0 0,0 1 0 0 0,1 0 0 0 0,-1-1 0 0 0,0 1 0 0 0,0-1 0 0 0,0 1 0 0 0,1 0 0 0 0,-1 0 0 0 0,0 0 0 0 0,0 0 0 0 0,0 0 0 0 0,1 0 0 0 0,-1 0 0 0 0,0 0 0 0 0,0 0 0 0 0,0 1 0 0 0,1-1 0 0 0,-1 0 0 0 0,0 1 0 0 0,0-1 0 0 0,0 1 0 0 0,0-1 0 0 0,0 1 0 0 0,0 0 0 0 0,0-1 0 0 0,0 1 0 0 0,0 0 0 0 0,0 0 0 0 0,0 0 0 0 0,0 0 0 0 0,0 0 0 0 0,-1 0 0 0 0,2 2 0 0 0,5 8-4 0 0,-1 0-1 0 0,-1 1 1 0 0,0 0-1 0 0,-1 0 1 0 0,0 0-1 0 0,3 17 1 0 0,-3-10-2177 0 0,10 25 1 0 0,-8-28-6347 0 0</inkml:trace>
+</inkml:ink>
+</file>
+
+<file path=ppt/ink/ink26.xml><?xml version="1.0" encoding="utf-8"?>
+<inkml:ink xmlns:inkml="http://www.w3.org/2003/InkML">
+  <inkml:definitions>
+    <inkml:context xml:id="ctx0">
+      <inkml:inkSource xml:id="inkSrc0">
+        <inkml:traceFormat>
+          <inkml:channel name="X" type="integer" min="-2.14748E9" max="2.14748E9" units="cm"/>
+          <inkml:channel name="Y" type="integer" min="-2.14748E9" max="2.14748E9" units="cm"/>
+          <inkml:channel name="F" type="integer" max="32767" units="dev"/>
+          <inkml:channel name="OA" type="integer" max="360" units="deg"/>
+          <inkml:channel name="OE" type="integer" max="90" units="deg"/>
+        </inkml:traceFormat>
+        <inkml:channelProperties>
+          <inkml:channelProperty channel="X" name="resolution" value="1000" units="1/cm"/>
+          <inkml:channelProperty channel="Y" name="resolution" value="1000" units="1/cm"/>
+          <inkml:channelProperty channel="F" name="resolution" value="0" units="1/dev"/>
+          <inkml:channelProperty channel="OA" name="resolution" value="1000" units="1/deg"/>
+          <inkml:channelProperty channel="OE" name="resolution" value="1000" units="1/deg"/>
+        </inkml:channelProperties>
+      </inkml:inkSource>
+      <inkml:timestamp xml:id="ts0" timeString="2021-02-22T19:00:59.539"/>
+    </inkml:context>
+    <inkml:brush xml:id="br0">
+      <inkml:brushProperty name="width" value="0.05" units="cm"/>
+      <inkml:brushProperty name="height" value="0.05" units="cm"/>
+      <inkml:brushProperty name="color" value="#E71224"/>
+    </inkml:brush>
+  </inkml:definitions>
+  <inkml:trace contextRef="#ctx0" brushRef="#br0">2 1 10136 0 0,'-2'3'4497'0'0,"2"-2"-4175"0"0,1 0-1 0 0,-1 0 1 0 0,0 0-1 0 0,0 0 1 0 0,1 0 0 0 0,-1 0-1 0 0,1 0 1 0 0,-1 0 0 0 0,1 0-1 0 0,-1 0 1 0 0,1 0 0 0 0,-1 0-1 0 0,2 1 1 0 0,6 11 309 0 0,-1 10-194 0 0,-1 1-1 0 0,0-1 0 0 0,2 34 1 0 0,-1 3 463 0 0,4 90 206 0 0,-14 220 838 0 0,-1-285-1832 0 0,2-62-112 0 0,2-23 7 0 0,0 0 0 0 0,-1 0-1 0 0,1 1 1 0 0,0-1 0 0 0,0 0-1 0 0,0 1 1 0 0,0-1 0 0 0,0 0 0 0 0,0 1-1 0 0,0-1 1 0 0,0 0 0 0 0,0 0-1 0 0,0 1 1 0 0,0-1 0 0 0,0 0 0 0 0,0 1-1 0 0,0-1 1 0 0,0 0 0 0 0,0 1-1 0 0,0-1 1 0 0,1 0 0 0 0,-1 0-1 0 0,0 1 1 0 0,0-1 0 0 0,0 0 0 0 0,0 0-1 0 0,1 1 1 0 0,-1-1 0 0 0,0 0-1 0 0,0 0 1 0 0,0 1 0 0 0,1-1 0 0 0,-1 0-1 0 0,0 0 1 0 0,1 0 0 0 0,-1 0-1 0 0,0 1 1 0 0,0-1 0 0 0,1 0-1 0 0,-1 0 1 0 0,0 0 0 0 0,1 0 0 0 0,-1 0-1 0 0,0 0 1 0 0,0 0 0 0 0,1 0-1 0 0,-1 0 1 0 0,0 0 0 0 0,1 0 0 0 0,-1 0-1 0 0,0 0 1 0 0,1 0 0 0 0,-1 0-1 0 0,0 0 1 0 0,1 0 0 0 0,-1 0 0 0 0,0 0-1 0 0,0-1 1 0 0,1 1 0 0 0,-1 0-1 0 0,0 0 1 0 0,0 0 0 0 0,1 0-1 0 0,-1-1 1 0 0,122-40 1716 0 0,-100 36-1829 0 0,0 1 1 0 0,0 0-1 0 0,41 0 0 0 0,72 9 329 0 0,-114-3-178 0 0,-14-1-36 0 0,1 0 0 0 0,0-1 0 0 0,-1 0-1 0 0,12-1 1 0 0,-20-1-9 0 0,0 1 0 0 0,0 0 0 0 0,0 0 0 0 0,0 0 0 0 0,0 0 0 0 0,0 0 0 0 0,0 0 0 0 0,-1 0 0 0 0,1 0 0 0 0,0 0 0 0 0,-1 0 0 0 0,-1 0 0 0 0,0-1 0 0 0,-8-5 0 0 0,0 1 0 0 0,-20-8 0 0 0,19 9 0 0 0,0 0 0 0 0,-20-13 0 0 0,22 11 16 0 0,0 0-1 0 0,0 1 1 0 0,-1 0-1 0 0,0 1 1 0 0,-21-8-1 0 0,29 13 51 0 0,18 4 29 0 0,-13-3-89 0 0,1 0 1 0 0,-1-1-1 0 0,0 1 0 0 0,1 0 0 0 0,-1-1 1 0 0,0 0-1 0 0,5 1 0 0 0,113-6 304 0 0,41 1 984 0 0,-156 4-1341 0 0,0 1 0 0 0,0-1 1 0 0,-1 1-1 0 0,1 0 0 0 0,0 0 0 0 0,-1 1 0 0 0,1-1 0 0 0,6 4 1 0 0,-10-4 40 0 0,0 0 1 0 0,1-1-1 0 0,-1 1 1 0 0,0 0 0 0 0,0 0-1 0 0,0 0 1 0 0,0 0 0 0 0,0 0-1 0 0,0 0 1 0 0,0 0-1 0 0,0 0 1 0 0,0 1 0 0 0,-1-1-1 0 0,1 0 1 0 0,0 1 0 0 0,-1-1-1 0 0,1 0 1 0 0,-1 1 0 0 0,1-1-1 0 0,-1 0 1 0 0,0 1-1 0 0,0-1 1 0 0,0 1 0 0 0,1-1-1 0 0,-1 1 1 0 0,0-1 0 0 0,-1 0-1 0 0,1 1 1 0 0,0-1 0 0 0,0 1-1 0 0,-1 0 1 0 0,-1 6 35 0 0,-1-1 1 0 0,0-1-1 0 0,0 1 1 0 0,-1 0-1 0 0,0-1 1 0 0,0 0-1 0 0,0 0 1 0 0,-1 0-1 0 0,0 0 1 0 0,0-1-1 0 0,-10 9 0 0 0,-7 3 26 0 0,-46 27-1 0 0,45-30-410 0 0,-32 24-1 0 0,42-27-232 0 0,-15 13-1201 0 0,10-6-4995 0 0,4-5-1638 0 0</inkml:trace>
+</inkml:ink>
+</file>
+
+<file path=ppt/ink/ink27.xml><?xml version="1.0" encoding="utf-8"?>
+<inkml:ink xmlns:inkml="http://www.w3.org/2003/InkML">
+  <inkml:definitions>
+    <inkml:context xml:id="ctx0">
+      <inkml:inkSource xml:id="inkSrc0">
+        <inkml:traceFormat>
+          <inkml:channel name="X" type="integer" min="-2.14748E9" max="2.14748E9" units="cm"/>
+          <inkml:channel name="Y" type="integer" min="-2.14748E9" max="2.14748E9" units="cm"/>
+          <inkml:channel name="F" type="integer" max="32767" units="dev"/>
+          <inkml:channel name="OA" type="integer" max="360" units="deg"/>
+          <inkml:channel name="OE" type="integer" max="90" units="deg"/>
+        </inkml:traceFormat>
+        <inkml:channelProperties>
+          <inkml:channelProperty channel="X" name="resolution" value="1000" units="1/cm"/>
+          <inkml:channelProperty channel="Y" name="resolution" value="1000" units="1/cm"/>
+          <inkml:channelProperty channel="F" name="resolution" value="0" units="1/dev"/>
+          <inkml:channelProperty channel="OA" name="resolution" value="1000" units="1/deg"/>
+          <inkml:channelProperty channel="OE" name="resolution" value="1000" units="1/deg"/>
+        </inkml:channelProperties>
+      </inkml:inkSource>
+      <inkml:timestamp xml:id="ts0" timeString="2021-02-22T19:01:00.420"/>
+    </inkml:context>
+    <inkml:brush xml:id="br0">
+      <inkml:brushProperty name="width" value="0.05" units="cm"/>
+      <inkml:brushProperty name="height" value="0.05" units="cm"/>
+      <inkml:brushProperty name="color" value="#E71224"/>
+    </inkml:brush>
+  </inkml:definitions>
+  <inkml:trace contextRef="#ctx0" brushRef="#br0">463 52 3224 0 0,'0'0'143'0'0,"-3"-8"5972"0"0,-17-16-355 0 0,16 22-5339 0 0,1-1 0 0 0,-1 1 0 0 0,0 0 0 0 0,0 0-1 0 0,0 1 1 0 0,0-1 0 0 0,-1 1 0 0 0,1 0 0 0 0,0 0 0 0 0,-1 0-1 0 0,1 0 1 0 0,-7 1 0 0 0,2 0-164 0 0,1 1 0 0 0,-1 0 0 0 0,0 0 0 0 0,1 1 0 0 0,-14 4 0 0 0,0 1-22 0 0,11-4-108 0 0,-1 1 1 0 0,1 0-1 0 0,-12 7 0 0 0,-62 40 270 0 0,74-43-331 0 0,-1 1 0 0 0,1 1-1 0 0,1 0 1 0 0,-18 21 0 0 0,26-28-41 0 0,-6 7 67 0 0,0 0-1 0 0,1 0 1 0 0,0 0 0 0 0,1 1 0 0 0,1 0 0 0 0,-1 0 0 0 0,-6 23 0 0 0,8-18-37 0 0,0-3 24 0 0,1 0 1 0 0,1 0-1 0 0,-2 27 1 0 0,4-34-23 0 0,-1 0 7 0 0,1-1-1 0 0,1 1 0 0 0,-1-1 1 0 0,1 1-1 0 0,0-1 0 0 0,1 7 1 0 0,-1-11-56 0 0,-1 0 1 0 0,1 0 0 0 0,0 1-1 0 0,-1-1 1 0 0,1 0 0 0 0,0 0-1 0 0,0 0 1 0 0,0 0 0 0 0,0 0-1 0 0,0 0 1 0 0,0 0 0 0 0,0-1-1 0 0,0 1 1 0 0,0 0 0 0 0,0 0-1 0 0,0-1 1 0 0,0 1 0 0 0,0-1-1 0 0,1 1 1 0 0,-1-1 0 0 0,0 1-1 0 0,1-1 1 0 0,-1 0 0 0 0,0 0-1 0 0,0 0 1 0 0,1 1 0 0 0,-1-1-1 0 0,0-1 1 0 0,1 1 0 0 0,1 0-1 0 0,6-1 0 0 0,-1-1 0 0 0,0 0 0 0 0,0 0 0 0 0,0-1 0 0 0,0 0 0 0 0,0 0 0 0 0,0-1 0 0 0,-1 0 1 0 0,13-8-1 0 0,2-5 199 0 0,32-30 0 0 0,-36 30-102 0 0,-2-1 0 0 0,0-1 0 0 0,-1 0 0 0 0,-1-1 0 0 0,-1-1 0 0 0,15-30 0 0 0,-21 38 294 0 0,0 0 0 0 0,17-22 0 0 0,-23 33-38 0 0,7 28-2 0 0,-8-21-340 0 0,0 0-1 0 0,-1 0 1 0 0,1-1 0 0 0,-1 1 0 0 0,0 0 0 0 0,-1-1 0 0 0,1 1-1 0 0,-1-1 1 0 0,0 1 0 0 0,0-1 0 0 0,-3 5 0 0 0,2-3 8 0 0,0-1 1 0 0,1 1-1 0 0,0 0 1 0 0,0 0-1 0 0,0 0 1 0 0,-2 12-1 0 0,5 30 126 0 0,1-7-44 0 0,-5 0-38 0 0,-1-1 0 0 0,-2 1 1 0 0,-15 49-1 0 0,-46 114-3 0 0,49-151-255 0 0,19-56-86 0 0,0 1-1 0 0,0-1 0 0 0,1 1 0 0 0,-1-1 1 0 0,1 1-1 0 0,0 0 0 0 0,0 0 0 0 0,0 0 1 0 0,0 0-1 0 0,3-2 0 0 0,2-3-365 0 0,49-56-5294 0 0,-34 37-1552 0 0</inkml:trace>
+</inkml:ink>
+</file>
+
+<file path=ppt/ink/ink28.xml><?xml version="1.0" encoding="utf-8"?>
+<inkml:ink xmlns:inkml="http://www.w3.org/2003/InkML">
+  <inkml:definitions>
+    <inkml:context xml:id="ctx0">
+      <inkml:inkSource xml:id="inkSrc0">
+        <inkml:traceFormat>
+          <inkml:channel name="X" type="integer" min="-2.14748E9" max="2.14748E9" units="cm"/>
+          <inkml:channel name="Y" type="integer" min="-2.14748E9" max="2.14748E9" units="cm"/>
+          <inkml:channel name="F" type="integer" max="32767" units="dev"/>
+          <inkml:channel name="OA" type="integer" max="360" units="deg"/>
+          <inkml:channel name="OE" type="integer" max="90" units="deg"/>
+        </inkml:traceFormat>
+        <inkml:channelProperties>
+          <inkml:channelProperty channel="X" name="resolution" value="1000" units="1/cm"/>
+          <inkml:channelProperty channel="Y" name="resolution" value="1000" units="1/cm"/>
+          <inkml:channelProperty channel="F" name="resolution" value="0" units="1/dev"/>
+          <inkml:channelProperty channel="OA" name="resolution" value="1000" units="1/deg"/>
+          <inkml:channelProperty channel="OE" name="resolution" value="1000" units="1/deg"/>
+        </inkml:channelProperties>
+      </inkml:inkSource>
+      <inkml:timestamp xml:id="ts0" timeString="2021-02-22T19:01:00.788"/>
+    </inkml:context>
+    <inkml:brush xml:id="br0">
+      <inkml:brushProperty name="width" value="0.05" units="cm"/>
+      <inkml:brushProperty name="height" value="0.05" units="cm"/>
+      <inkml:brushProperty name="color" value="#E71224"/>
+    </inkml:brush>
+  </inkml:definitions>
+  <inkml:trace contextRef="#ctx0" brushRef="#br0">342 91 8752 0 0,'-6'-15'936'0'0,"4"13"-690"0"0,1-1 0 0 0,-1 1 0 0 0,1-1 0 0 0,-1 1 0 0 0,0 0 0 0 0,0 0 1 0 0,0-1-1 0 0,0 1 0 0 0,0 1 0 0 0,0-1 0 0 0,-1 0 0 0 0,1 0 0 0 0,-1 1 0 0 0,1 0 0 0 0,-1-1 1 0 0,0 1-1 0 0,1 0 0 0 0,-1 0 0 0 0,0 0 0 0 0,0 1 0 0 0,0-1 0 0 0,1 1 0 0 0,-1 0 1 0 0,0-1-1 0 0,0 1 0 0 0,0 0 0 0 0,0 1 0 0 0,0-1 0 0 0,0 1 0 0 0,0-1 0 0 0,-3 2 0 0 0,-7 2 1071 0 0,-1 1 0 0 0,1 0-1 0 0,1 1 1 0 0,-1 1 0 0 0,-12 8-1 0 0,13-7-1259 0 0,-1 1-1 0 0,2-1 1 0 0,-1 2-1 0 0,1 0 1 0 0,-13 15-1 0 0,18-17 49 0 0,0 0 0 0 0,0 0-1 0 0,1 1 1 0 0,0-1 0 0 0,0 1-1 0 0,1 0 1 0 0,1 1-1 0 0,-1-1 1 0 0,-1 11 0 0 0,-9 67 636 0 0,6-30-365 0 0,4-34-173 0 0,1 1 0 0 0,1 0 0 0 0,1 1 0 0 0,2-1 1 0 0,0 0-1 0 0,1 0 0 0 0,10 41 0 0 0,-10-59-150 0 0,0 0 0 0 0,0 0 0 0 0,1 0 0 0 0,-1 0 0 0 0,1-1 0 0 0,0 1 0 0 0,1-1 0 0 0,-1 0-1 0 0,1 0 1 0 0,0 0 0 0 0,1 0 0 0 0,-1 0 0 0 0,1-1 0 0 0,0 0 0 0 0,5 4 0 0 0,-5-6-29 0 0,-1 1 0 0 0,1-1 0 0 0,0 0 0 0 0,-1 0 0 0 0,1-1 0 0 0,0 1 0 0 0,0-1 0 0 0,0 0 0 0 0,0-1 0 0 0,0 1 0 0 0,0-1 0 0 0,0 0 0 0 0,1 0 0 0 0,-1 0 0 0 0,0-1 0 0 0,0 0 0 0 0,0 0 0 0 0,0 0 0 0 0,5-2 0 0 0,-1-1 1 0 0,-1 0 0 0 0,1-1 1 0 0,-1 0-1 0 0,1 0 1 0 0,-1 0-1 0 0,-1-1 0 0 0,1 0 1 0 0,-1-1-1 0 0,0 0 1 0 0,10-13-1 0 0,3-8 94 0 0,28-49 0 0 0,-41 65-96 0 0,4-9 16 0 0,-1 0 1 0 0,0 0-1 0 0,-1-1 1 0 0,10-42-1 0 0,-8 20 10 0 0,-3 14-24 0 0,-2-1 0 0 0,6-59 0 0 0,-11 70-17 0 0,0 6-7 0 0,0-1-1 0 0,-1 0 1 0 0,-1 0 0 0 0,0 1-1 0 0,-5-21 1 0 0,1 4-412 0 0,0 0-4036 0 0</inkml:trace>
+</inkml:ink>
+</file>
+
+<file path=ppt/ink/ink29.xml><?xml version="1.0" encoding="utf-8"?>
+<inkml:ink xmlns:inkml="http://www.w3.org/2003/InkML">
+  <inkml:definitions>
+    <inkml:context xml:id="ctx0">
+      <inkml:inkSource xml:id="inkSrc0">
+        <inkml:traceFormat>
+          <inkml:channel name="X" type="integer" min="-2.14748E9" max="2.14748E9" units="cm"/>
+          <inkml:channel name="Y" type="integer" min="-2.14748E9" max="2.14748E9" units="cm"/>
+          <inkml:channel name="F" type="integer" max="32767" units="dev"/>
+          <inkml:channel name="OA" type="integer" max="360" units="deg"/>
+          <inkml:channel name="OE" type="integer" max="90" units="deg"/>
+        </inkml:traceFormat>
+        <inkml:channelProperties>
+          <inkml:channelProperty channel="X" name="resolution" value="1000" units="1/cm"/>
+          <inkml:channelProperty channel="Y" name="resolution" value="1000" units="1/cm"/>
+          <inkml:channelProperty channel="F" name="resolution" value="0" units="1/dev"/>
+          <inkml:channelProperty channel="OA" name="resolution" value="1000" units="1/deg"/>
+          <inkml:channelProperty channel="OE" name="resolution" value="1000" units="1/deg"/>
+        </inkml:channelProperties>
+      </inkml:inkSource>
+      <inkml:timestamp xml:id="ts0" timeString="2021-02-22T19:01:01.555"/>
+    </inkml:context>
+    <inkml:brush xml:id="br0">
+      <inkml:brushProperty name="width" value="0.05" units="cm"/>
+      <inkml:brushProperty name="height" value="0.05" units="cm"/>
+      <inkml:brushProperty name="color" value="#E71224"/>
+    </inkml:brush>
+  </inkml:definitions>
+  <inkml:trace contextRef="#ctx0" brushRef="#br0">28 424 9184 0 0,'0'1'179'0'0,"-1"-1"-1"0"0,0 1 1 0 0,1 0 0 0 0,-1-1 0 0 0,0 1 0 0 0,0-1-1 0 0,0 1 1 0 0,0-1 0 0 0,0 0 0 0 0,1 1 0 0 0,-1-1-1 0 0,0 0 1 0 0,0 0 0 0 0,0 1 0 0 0,0-1 0 0 0,0 0-1 0 0,0 0 1 0 0,0 0 0 0 0,0 0 0 0 0,0 0 0 0 0,0-1 0 0 0,0 1-1 0 0,0 0 1 0 0,0 0 0 0 0,0 0 0 0 0,-1-1 0 0 0,2-1 35 0 0,-1 0 1 0 0,1 1 0 0 0,-1-1-1 0 0,1 0 1 0 0,0 1 0 0 0,-1-1-1 0 0,1 0 1 0 0,0 0 0 0 0,0 1-1 0 0,0-1 1 0 0,0 0 0 0 0,1 0-1 0 0,-1 1 1 0 0,0-1 0 0 0,2-2-1 0 0,8-28 1283 0 0,-2 14-712 0 0,0 1-1 0 0,18-26 1 0 0,1-2 205 0 0,34-57 902 0 0,-49 82-1641 0 0,-1-1 60 0 0,-9 16-238 0 0,1 0 1 0 0,0 0-1 0 0,0 0 1 0 0,0 0-1 0 0,1 0 1 0 0,6-6-1 0 0,-9 11-69 0 0,-1 0-1 0 0,1 0 0 0 0,0 0 1 0 0,0 0-1 0 0,-1 1 1 0 0,1-1-1 0 0,0 0 0 0 0,-1 1 1 0 0,1-1-1 0 0,-1 1 0 0 0,1-1 1 0 0,0 0-1 0 0,-1 1 1 0 0,1-1-1 0 0,-1 1 0 0 0,1-1 1 0 0,0 2-1 0 0,-1-2 0 0 0,2 4-3 0 0,1 0 0 0 0,-1 0 0 0 0,0 0 0 0 0,-1 1 0 0 0,1-1 0 0 0,-1 0 0 0 0,0 1 0 0 0,0-1 0 0 0,0 1 0 0 0,0 5 0 0 0,1 4 0 0 0,0 1 11 0 0,0 0-1 0 0,-2-1 1 0 0,-1 19-1 0 0,1 18 12 0 0,-3-32-22 0 0,3-16 0 0 0,-1-1 0 0 0,1 1 0 0 0,0-1 0 0 0,-1 1 0 0 0,1-1 0 0 0,0 1 0 0 0,1 2 0 0 0,-1-5 0 0 0,0 0 0 0 0,-1 1 0 0 0,1-1 0 0 0,1 0 0 0 0,-1 1 0 0 0,0-1 0 0 0,0 0 0 0 0,0 0 0 0 0,0 1 0 0 0,0-1 0 0 0,0 0 0 0 0,0 0 0 0 0,0 1 0 0 0,0-1 0 0 0,0 0 0 0 0,1 0 0 0 0,-1 1 0 0 0,0-1 0 0 0,0 0 0 0 0,0 0 0 0 0,0 0 0 0 0,1 1 0 0 0,-1-1 0 0 0,0 0 0 0 0,0 0 0 0 0,0 0 0 0 0,1 0 0 0 0,-1 0 0 0 0,0 1 0 0 0,0-1 0 0 0,1 0 0 0 0,-1 0 0 0 0,0 0 0 0 0,1 0 0 0 0,-1 0 0 0 0,0 0 0 0 0,0 0 0 0 0,1 0 0 0 0,-1 0 0 0 0,4-2 0 0 0,-1 0 6 0 0,0-1 0 0 0,0 1-1 0 0,0-1 1 0 0,-1 0 0 0 0,1 0 0 0 0,-1 0-1 0 0,0 0 1 0 0,3-5 0 0 0,3-4 6 0 0,50-73 101 0 0,6-9 201 0 0,-59 88-249 0 0,3-5 118 0 0,0 0 1 0 0,1 1-1 0 0,1 0 0 0 0,-1 0 1 0 0,20-13-1 0 0,-28 22-163 0 0,0 0-1 0 0,0 1 0 0 0,0-1 1 0 0,0 0-1 0 0,0 1 0 0 0,0 0 1 0 0,0-1-1 0 0,1 1 1 0 0,-1-1-1 0 0,0 1 0 0 0,0 0 1 0 0,1 0-1 0 0,-1 0 0 0 0,0 0 1 0 0,0 0-1 0 0,1 0 0 0 0,-1 0 1 0 0,0 0-1 0 0,0 0 1 0 0,0 1-1 0 0,1-1 0 0 0,0 1 1 0 0,0 0-8 0 0,0 0 0 0 0,0 1 0 0 0,0-1 0 0 0,-1 0 0 0 0,1 1 1 0 0,-1-1-1 0 0,1 1 0 0 0,-1 0 0 0 0,1-1 0 0 0,-1 1 0 0 0,2 3 1 0 0,1 4 13 0 0,0 0 0 0 0,-1 0 0 0 0,0 0 1 0 0,4 16-1 0 0,-6-13-4 0 0,0 0 1 0 0,-1 1 0 0 0,0-1-1 0 0,-1 1 1 0 0,0-1-1 0 0,-5 20 1 0 0,-2 21 16 0 0,3-15-37 0 0,3-26-5 0 0,0 0 1 0 0,1 1-1 0 0,0-1 0 0 0,2 23 0 0 0,-1-33-115 0 0,1 0-1 0 0,-1 0 1 0 0,1 0 0 0 0,-1 0-1 0 0,1 0 1 0 0,-1 0-1 0 0,1 0 1 0 0,0-1 0 0 0,0 1-1 0 0,0 0 1 0 0,0 0-1 0 0,0-1 1 0 0,1 1 0 0 0,1 2-1 0 0,-2-4-2 0 0,0 1-1 0 0,0-1 0 0 0,1 1 0 0 0,-1-1 1 0 0,0 1-1 0 0,0-1 0 0 0,0 0 0 0 0,0 0 1 0 0,0 0-1 0 0,0 0 0 0 0,0 1 1 0 0,0-1-1 0 0,1-1 0 0 0,-1 1 0 0 0,0 0 1 0 0,0 0-1 0 0,0 0 0 0 0,0-1 0 0 0,0 1 1 0 0,0 0-1 0 0,0-1 0 0 0,0 1 1 0 0,0-1-1 0 0,0 1 0 0 0,0-1 0 0 0,1 0 1 0 0,11-10-1246 0 0,-1-3-16 0 0</inkml:trace>
+</inkml:ink>
+</file>
+
+<file path=ppt/ink/ink3.xml><?xml version="1.0" encoding="utf-8"?>
+<inkml:ink xmlns:inkml="http://www.w3.org/2003/InkML">
+  <inkml:definitions>
+    <inkml:context xml:id="ctx0">
+      <inkml:inkSource xml:id="inkSrc0">
+        <inkml:traceFormat>
+          <inkml:channel name="X" type="integer" min="-2.14748E9" max="2.14748E9" units="cm"/>
+          <inkml:channel name="Y" type="integer" min="-2.14748E9" max="2.14748E9" units="cm"/>
+          <inkml:channel name="F" type="integer" max="32767" units="dev"/>
+          <inkml:channel name="OA" type="integer" max="360" units="deg"/>
+          <inkml:channel name="OE" type="integer" max="90" units="deg"/>
+        </inkml:traceFormat>
+        <inkml:channelProperties>
+          <inkml:channelProperty channel="X" name="resolution" value="1000" units="1/cm"/>
+          <inkml:channelProperty channel="Y" name="resolution" value="1000" units="1/cm"/>
+          <inkml:channelProperty channel="F" name="resolution" value="0" units="1/dev"/>
+          <inkml:channelProperty channel="OA" name="resolution" value="1000" units="1/deg"/>
+          <inkml:channelProperty channel="OE" name="resolution" value="1000" units="1/deg"/>
+        </inkml:channelProperties>
+      </inkml:inkSource>
+      <inkml:timestamp xml:id="ts0" timeString="2021-02-22T19:00:34.215"/>
+    </inkml:context>
+    <inkml:brush xml:id="br0">
+      <inkml:brushProperty name="width" value="0.05" units="cm"/>
+      <inkml:brushProperty name="height" value="0.05" units="cm"/>
+      <inkml:brushProperty name="color" value="#E71224"/>
+    </inkml:brush>
+  </inkml:definitions>
+  <inkml:trace contextRef="#ctx0" brushRef="#br0">1560 358 2304 0 0,'0'0'101'0'0,"-14"5"22"0"0,11-5 1121 0 0,-1 0 0 0 0,1 0 0 0 0,0 0 0 0 0,-1 0 0 0 0,1-1 0 0 0,-6-1 0 0 0,-4 0 666 0 0,11 1-1435 0 0,-1-1-1 0 0,0 1 1 0 0,1 0-1 0 0,-1-1 0 0 0,1 1 1 0 0,-1-1-1 0 0,-3-4 1 0 0,-7-3 825 0 0,11 7-1172 0 0,1 1 1 0 0,-1-1-1 0 0,0 1 0 0 0,0-1 0 0 0,1 0 0 0 0,-1 0 1 0 0,-1-3-1 0 0,2 3-105 0 0,-1 0 1 0 0,1 0-1 0 0,-1 0 1 0 0,1 0-1 0 0,-1 1 1 0 0,0-1-1 0 0,-3-2 0 0 0,2 2 136 0 0,0 0 0 0 0,1-1-1 0 0,-1 1 1 0 0,1-1 0 0 0,-3-3 0 0 0,3 4-36 0 0,0-1 0 0 0,0 1 1 0 0,0 0-1 0 0,0 0 1 0 0,0 0-1 0 0,-1 0 1 0 0,1 0-1 0 0,-1 0 1 0 0,-4-1-1 0 0,2 0 69 0 0,0 0-1 0 0,-1-1 1 0 0,1 1 0 0 0,0-1-1 0 0,1 0 1 0 0,-6-5 0 0 0,6 5-129 0 0,-1 0 0 0 0,1 0 0 0 0,-1 0 0 0 0,0 1-1 0 0,0-1 1 0 0,0 1 0 0 0,-6-2 0 0 0,2 1 11 0 0,1 0-1 0 0,0-1 0 0 0,1 0 1 0 0,-1 0-1 0 0,-7-8 0 0 0,0 2 959 0 0,-5-2-912 0 0,-1 1 0 0 0,0 1 0 0 0,0 0 1 0 0,-23-6-1 0 0,-24-12-34 0 0,32 9-43 0 0,27 15-29 0 0,0-1-1 0 0,-1 2 1 0 0,1-1-1 0 0,-1 1 0 0 0,0 1 1 0 0,-19-5-1 0 0,14 6-6 0 0,0 1 0 0 0,-1 1 0 0 0,1 1 0 0 0,-25 3 0 0 0,-61 16 10 0 0,81-15-13 0 0,-12 2 70 0 0,1 2 0 0 0,0 1 0 0 0,-38 17 0 0 0,-50 26-22 0 0,-32 17 24 0 0,133-58-189 0 0,0 1 0 0 0,1 0 0 0 0,0 1 0 0 0,-25 29 0 0 0,24-21 420 0 0,0 1 0 0 0,-17 32 0 0 0,22-32-271 0 0,1 0 0 0 0,2 1 0 0 0,0 0-1 0 0,1 0 1 0 0,-5 28 0 0 0,9-29 0 0 0,2 0 0 0 0,0 0 0 0 0,1 1 0 0 0,2-1 0 0 0,2 25 0 0 0,-1-34 20 0 0,1 0-1 0 0,1 0 1 0 0,0 0 0 0 0,1-1 0 0 0,0 1-1 0 0,1-1 1 0 0,1 0 0 0 0,0-1-1 0 0,13 21 1 0 0,-14-26-60 0 0,0 0 0 0 0,0 0 1 0 0,1 0-1 0 0,0 0 0 0 0,1-1 0 0 0,-1 0 0 0 0,1 0 0 0 0,0-1 0 0 0,1 1 0 0 0,-1-2 0 0 0,15 8 0 0 0,23 6 188 0 0,68 20 0 0 0,51 2 204 0 0,-122-31-273 0 0,163 21 155 0 0,-128-22-196 0 0,-52-5-14 0 0,0-1-1 0 0,0-1 1 0 0,37-3 0 0 0,-4-5 284 0 0,95-24-1 0 0,-131 25-277 0 0,0-2-1 0 0,0 0 0 0 0,0-1 0 0 0,-1-1 0 0 0,-1-2 1 0 0,1 0-1 0 0,21-17 0 0 0,53-53 277 0 0,-81 69-283 0 0,-1-2 1 0 0,0 0-1 0 0,-1-1 0 0 0,14-23 1 0 0,-23 34-52 0 0,51-98 213 0 0,-47 88-130 0 0,-1 0-1 0 0,-1-1 0 0 0,0 0 1 0 0,5-31-1 0 0,-7 24 1 0 0,4-51-12 0 0,-7 65-83 0 0,0 1 0 0 0,-1-1 0 0 0,0 1 0 0 0,-1-1-1 0 0,0 1 1 0 0,-4-14 0 0 0,2 13-8 0 0,1 1 0 0 0,-2-1-1 0 0,1 1 1 0 0,-1 0-1 0 0,0 0 1 0 0,-1 1 0 0 0,0-1-1 0 0,0 1 1 0 0,0 0 0 0 0,-9-6-1 0 0,9 9 25 0 0,0 0 1 0 0,0 0-1 0 0,0 0 0 0 0,0 1 0 0 0,-1 0 0 0 0,1 0 1 0 0,-1 1-1 0 0,0-1 0 0 0,0 2 0 0 0,0-1 0 0 0,0 1 1 0 0,0 0-1 0 0,-13 0 0 0 0,17 1 15 0 0,0 1 0 0 0,0-1-1 0 0,0 1 1 0 0,-1-1 0 0 0,1 1 0 0 0,0 0-1 0 0,0 0 1 0 0,0 0 0 0 0,0 1 0 0 0,0-1-1 0 0,0 1 1 0 0,1 0 0 0 0,-5 3-1 0 0,-11 13-1850 0 0,4 3-6478 0 0,9-9-1153 0 0</inkml:trace>
+</inkml:ink>
+</file>
+
+<file path=ppt/ink/ink30.xml><?xml version="1.0" encoding="utf-8"?>
+<inkml:ink xmlns:inkml="http://www.w3.org/2003/InkML">
+  <inkml:definitions>
+    <inkml:context xml:id="ctx0">
+      <inkml:inkSource xml:id="inkSrc0">
+        <inkml:traceFormat>
+          <inkml:channel name="X" type="integer" min="-2.14748E9" max="2.14748E9" units="cm"/>
+          <inkml:channel name="Y" type="integer" min="-2.14748E9" max="2.14748E9" units="cm"/>
+          <inkml:channel name="F" type="integer" max="32767" units="dev"/>
+          <inkml:channel name="OA" type="integer" max="360" units="deg"/>
+          <inkml:channel name="OE" type="integer" max="90" units="deg"/>
+        </inkml:traceFormat>
+        <inkml:channelProperties>
+          <inkml:channelProperty channel="X" name="resolution" value="1000" units="1/cm"/>
+          <inkml:channelProperty channel="Y" name="resolution" value="1000" units="1/cm"/>
+          <inkml:channelProperty channel="F" name="resolution" value="0" units="1/dev"/>
+          <inkml:channelProperty channel="OA" name="resolution" value="1000" units="1/deg"/>
+          <inkml:channelProperty channel="OE" name="resolution" value="1000" units="1/deg"/>
+        </inkml:channelProperties>
+      </inkml:inkSource>
+      <inkml:timestamp xml:id="ts0" timeString="2021-02-22T19:01:01.938"/>
+    </inkml:context>
+    <inkml:brush xml:id="br0">
+      <inkml:brushProperty name="width" value="0.05" units="cm"/>
+      <inkml:brushProperty name="height" value="0.05" units="cm"/>
+      <inkml:brushProperty name="color" value="#E71224"/>
+    </inkml:brush>
+  </inkml:definitions>
+  <inkml:trace contextRef="#ctx0" brushRef="#br0">39 404 8752 0 0,'0'0'673'0'0,"2"8"-410"0"0,-1 8 1194 0 0,-2 0 0 0 0,0 0-1 0 0,0 0 1 0 0,-2 0 0 0 0,-5 20 0 0 0,2-7-152 0 0,3-17-1059 0 0,-3 17-105 0 0,1 0 0 0 0,1 1 0 0 0,2-1 0 0 0,0 33 0 0 0,5-51-5166 0 0</inkml:trace>
+  <inkml:trace contextRef="#ctx0" brushRef="#br0" timeOffset="1">213 16 18743 0 0,'-2'-6'416'0'0,"-4"4"80"0"0,4-3 16 0 0,-4 3 120 0 0,0 4-632 0 0,0 3 0 0 0,4 6 0 0 0,-1 1-96 0 0,0 3 24 0 0,0 4-5439 0 0,3 4-1089 0 0</inkml:trace>
+</inkml:ink>
+</file>
+
+<file path=ppt/ink/ink31.xml><?xml version="1.0" encoding="utf-8"?>
+<inkml:ink xmlns:inkml="http://www.w3.org/2003/InkML">
+  <inkml:definitions>
+    <inkml:context xml:id="ctx0">
+      <inkml:inkSource xml:id="inkSrc0">
+        <inkml:traceFormat>
+          <inkml:channel name="X" type="integer" min="-2.14748E9" max="2.14748E9" units="cm"/>
+          <inkml:channel name="Y" type="integer" min="-2.14748E9" max="2.14748E9" units="cm"/>
+          <inkml:channel name="F" type="integer" max="32767" units="dev"/>
+          <inkml:channel name="OA" type="integer" max="360" units="deg"/>
+          <inkml:channel name="OE" type="integer" max="90" units="deg"/>
+        </inkml:traceFormat>
+        <inkml:channelProperties>
+          <inkml:channelProperty channel="X" name="resolution" value="1000" units="1/cm"/>
+          <inkml:channelProperty channel="Y" name="resolution" value="1000" units="1/cm"/>
+          <inkml:channelProperty channel="F" name="resolution" value="0" units="1/dev"/>
+          <inkml:channelProperty channel="OA" name="resolution" value="1000" units="1/deg"/>
+          <inkml:channelProperty channel="OE" name="resolution" value="1000" units="1/deg"/>
+        </inkml:channelProperties>
+      </inkml:inkSource>
+      <inkml:timestamp xml:id="ts0" timeString="2021-02-22T19:01:02.327"/>
+    </inkml:context>
+    <inkml:brush xml:id="br0">
+      <inkml:brushProperty name="width" value="0.05" units="cm"/>
+      <inkml:brushProperty name="height" value="0.05" units="cm"/>
+      <inkml:brushProperty name="color" value="#E71224"/>
+    </inkml:brush>
+  </inkml:definitions>
+  <inkml:trace contextRef="#ctx0" brushRef="#br0">13 420 21191 0 0,'-6'-14'1606'0'0,"3"-21"-858"0"0,0 0 0 0 0,3 0-1 0 0,6-60 1 0 0,-6 90-641 0 0,14-90 1388 0 0,-2 26-697 0 0,-12 64-746 0 0,1 0 0 0 0,0 1 0 0 0,0-1 0 0 0,0 1-1 0 0,3-6 1 0 0,-4 10-51 0 0,0 0-1 0 0,0 0 1 0 0,0 0-1 0 0,0 0 1 0 0,0-1-1 0 0,0 1 0 0 0,0 0 1 0 0,0 0-1 0 0,0 0 1 0 0,0 0-1 0 0,0 0 1 0 0,0-1-1 0 0,0 1 1 0 0,0 0-1 0 0,0 0 1 0 0,0 0-1 0 0,0 0 1 0 0,0 0-1 0 0,0 0 1 0 0,0-1-1 0 0,0 1 1 0 0,0 0-1 0 0,1 0 1 0 0,-1 0-1 0 0,0 0 1 0 0,0 0-1 0 0,0 0 1 0 0,0 0-1 0 0,0 0 1 0 0,0 0-1 0 0,0 0 1 0 0,1-1-1 0 0,-1 1 0 0 0,0 0 1 0 0,0 0-1 0 0,0 0 1 0 0,0 0-1 0 0,0 0 1 0 0,1 0-1 0 0,-1 0 1 0 0,0 0-1 0 0,0 0 1 0 0,0 0-1 0 0,0 0 1 0 0,0 0-1 0 0,1 0 1 0 0,-1 0-1 0 0,0 0 1 0 0,0 0-1 0 0,0 0 1 0 0,0 1-1 0 0,0-1 1 0 0,0 0-1 0 0,1 0 1 0 0,-1 0-1 0 0,0 0 1 0 0,0 0-1 0 0,0 0 0 0 0,0 0 1 0 0,0 0-1 0 0,0 0 1 0 0,0 1-1 0 0,1-1 1 0 0,1 7-6 0 0,-2-7 7 0 0,6 25-89 0 0,3 47 0 0 0,-1-7-99 0 0,-4-39 156 0 0,1-1-1 0 0,1 0 1 0 0,1 0 0 0 0,20 43-1 0 0,-26-65 23 0 0,1 0 0 0 0,-1 0 0 0 0,1 0-1 0 0,0 0 1 0 0,0 0 0 0 0,1-1 0 0 0,-1 1 0 0 0,1-1 0 0 0,-1 1-1 0 0,1-1 1 0 0,0 0 0 0 0,-1 0 0 0 0,1 0 0 0 0,6 2-1 0 0,-7-4 10 0 0,0 1-1 0 0,0-1 0 0 0,0 1 0 0 0,1-1 1 0 0,-1 0-1 0 0,0 0 0 0 0,0 0 0 0 0,1 0 1 0 0,-1 0-1 0 0,0 0 0 0 0,1-1 0 0 0,-1 1 1 0 0,0-1-1 0 0,0 0 0 0 0,0 0 0 0 0,0 1 0 0 0,0-1 1 0 0,0 0-1 0 0,0-1 0 0 0,0 1 0 0 0,0 0 1 0 0,3-3-1 0 0,3-5 142 0 0,1 0-1 0 0,-2 0 1 0 0,1-1 0 0 0,-1 0-1 0 0,-1 0 1 0 0,10-19 0 0 0,-5 8-150 0 0,30-63-50 0 0,-23 43-2158 0 0,2 2-5173 0 0,-8 16-894 0 0</inkml:trace>
+</inkml:ink>
+</file>
+
+<file path=ppt/ink/ink32.xml><?xml version="1.0" encoding="utf-8"?>
+<inkml:ink xmlns:inkml="http://www.w3.org/2003/InkML">
+  <inkml:definitions>
+    <inkml:context xml:id="ctx0">
+      <inkml:inkSource xml:id="inkSrc0">
+        <inkml:traceFormat>
+          <inkml:channel name="X" type="integer" min="-2.14748E9" max="2.14748E9" units="cm"/>
+          <inkml:channel name="Y" type="integer" min="-2.14748E9" max="2.14748E9" units="cm"/>
+          <inkml:channel name="F" type="integer" max="32767" units="dev"/>
+          <inkml:channel name="OA" type="integer" max="360" units="deg"/>
+          <inkml:channel name="OE" type="integer" max="90" units="deg"/>
+        </inkml:traceFormat>
+        <inkml:channelProperties>
+          <inkml:channelProperty channel="X" name="resolution" value="1000" units="1/cm"/>
+          <inkml:channelProperty channel="Y" name="resolution" value="1000" units="1/cm"/>
+          <inkml:channelProperty channel="F" name="resolution" value="0" units="1/dev"/>
+          <inkml:channelProperty channel="OA" name="resolution" value="1000" units="1/deg"/>
+          <inkml:channelProperty channel="OE" name="resolution" value="1000" units="1/deg"/>
+        </inkml:channelProperties>
+      </inkml:inkSource>
+      <inkml:timestamp xml:id="ts0" timeString="2021-02-22T19:01:02.700"/>
+    </inkml:context>
+    <inkml:brush xml:id="br0">
+      <inkml:brushProperty name="width" value="0.05" units="cm"/>
+      <inkml:brushProperty name="height" value="0.05" units="cm"/>
+      <inkml:brushProperty name="color" value="#E71224"/>
+    </inkml:brush>
+  </inkml:definitions>
+  <inkml:trace contextRef="#ctx0" brushRef="#br0">60 26 21191 0 0,'0'0'1606'0'0,"-14"0"-884"0"0,11 2-581 0 0,-1 1-1 0 0,1 0 1 0 0,0 0-1 0 0,0 0 1 0 0,1 0-1 0 0,-1 0 1 0 0,1 1-1 0 0,-1-1 0 0 0,1 1 1 0 0,0-1-1 0 0,0 1 1 0 0,1 0-1 0 0,-1 0 1 0 0,-1 7-1 0 0,1-3-150 0 0,0 1 1 0 0,1-1-1 0 0,0 1 0 0 0,0 0 0 0 0,1 16 0 0 0,1-13 10 0 0,1-1 0 0 0,1 0 0 0 0,-1-1 0 0 0,1 1 0 0 0,1 0 0 0 0,0-1 0 0 0,1 0 0 0 0,8 14 0 0 0,-11-21 53 0 0,0-1-1 0 0,0 1 0 0 0,1-1 0 0 0,-1 1 1 0 0,1-1-1 0 0,-1 0 0 0 0,1 0 1 0 0,0 0-1 0 0,0 0 0 0 0,0-1 0 0 0,0 1 1 0 0,0-1-1 0 0,1 0 0 0 0,-1 0 1 0 0,0 0-1 0 0,0 0 0 0 0,1-1 1 0 0,-1 1-1 0 0,1-1 0 0 0,-1 0 0 0 0,0 0 1 0 0,1 0-1 0 0,-1 0 0 0 0,1 0 1 0 0,-1-1-1 0 0,0 0 0 0 0,1 0 0 0 0,-1 0 1 0 0,0 0-1 0 0,0 0 0 0 0,0-1 1 0 0,1 1-1 0 0,-2-1 0 0 0,1 0 1 0 0,3-2-1 0 0,8-7 62 0 0,-1 0 1 0 0,-1-1 0 0 0,0 0-1 0 0,-1-1 1 0 0,0 0 0 0 0,-1-1-1 0 0,0-1 1 0 0,-1 1 0 0 0,-1-1-1 0 0,0-1 1 0 0,-1 0 0 0 0,-1 0-1 0 0,6-23 1 0 0,8-18 493 0 0,-20 57-608 0 0,0 0 0 0 0,0 0 0 0 0,0 0 0 0 0,0 0 0 0 0,0-1 0 0 0,0 1 0 0 0,0 0 0 0 0,0 0 0 0 0,1 0 0 0 0,-1 0 0 0 0,0 0 0 0 0,0 0 0 0 0,0 0 0 0 0,0 0 0 0 0,0 0 0 0 0,0 0 0 0 0,0-1 0 0 0,0 1 0 0 0,0 0 0 0 0,0 0 0 0 0,1 0 0 0 0,-1 0 0 0 0,0 0 0 0 0,0 0 0 0 0,0 0 0 0 0,0 0 0 0 0,0 0 0 0 0,0 0 0 0 0,0 0 0 0 0,1 0 0 0 0,-1 0 0 0 0,0 0 0 0 0,0 0 0 0 0,0 0 0 0 0,0 0 0 0 0,0 0 0 0 0,0 0 0 0 0,0 0 0 0 0,1 0 0 0 0,-1 0 0 0 0,0 0 0 0 0,0 0 0 0 0,0 0 0 0 0,0 0 0 0 0,0 1 0 0 0,0-1 0 0 0,0 0 0 0 0,0 0 0 0 0,0 0 0 0 0,1 0 0 0 0,-1 0 0 0 0,0 0 0 0 0,0 0 0 0 0,0 0 0 0 0,4 5 0 0 0,-4-5 0 0 0,1 6 0 0 0,1-1 0 0 0,-1 1 0 0 0,1-1 0 0 0,-2 1 0 0 0,1-1 0 0 0,-1 1 0 0 0,1-1 0 0 0,-1 1 0 0 0,-2 8 0 0 0,1 8 0 0 0,-9 116 18 0 0,2-53-252 0 0,7-49-846 0 0</inkml:trace>
+</inkml:ink>
+</file>
+
+<file path=ppt/ink/ink33.xml><?xml version="1.0" encoding="utf-8"?>
+<inkml:ink xmlns:inkml="http://www.w3.org/2003/InkML">
+  <inkml:definitions>
+    <inkml:context xml:id="ctx0">
+      <inkml:inkSource xml:id="inkSrc0">
+        <inkml:traceFormat>
+          <inkml:channel name="X" type="integer" min="-2.14748E9" max="2.14748E9" units="cm"/>
+          <inkml:channel name="Y" type="integer" min="-2.14748E9" max="2.14748E9" units="cm"/>
+          <inkml:channel name="F" type="integer" max="32767" units="dev"/>
+          <inkml:channel name="OA" type="integer" max="360" units="deg"/>
+          <inkml:channel name="OE" type="integer" max="90" units="deg"/>
+        </inkml:traceFormat>
+        <inkml:channelProperties>
+          <inkml:channelProperty channel="X" name="resolution" value="1000" units="1/cm"/>
+          <inkml:channelProperty channel="Y" name="resolution" value="1000" units="1/cm"/>
+          <inkml:channelProperty channel="F" name="resolution" value="0" units="1/dev"/>
+          <inkml:channelProperty channel="OA" name="resolution" value="1000" units="1/deg"/>
+          <inkml:channelProperty channel="OE" name="resolution" value="1000" units="1/deg"/>
+        </inkml:channelProperties>
+      </inkml:inkSource>
+      <inkml:timestamp xml:id="ts0" timeString="2021-02-22T19:01:03.087"/>
+    </inkml:context>
+    <inkml:brush xml:id="br0">
+      <inkml:brushProperty name="width" value="0.05" units="cm"/>
+      <inkml:brushProperty name="height" value="0.05" units="cm"/>
+      <inkml:brushProperty name="color" value="#E71224"/>
+    </inkml:brush>
+  </inkml:definitions>
+  <inkml:trace contextRef="#ctx0" brushRef="#br0">204 195 11056 0 0,'8'-31'1632'0'0,"1"1"0"0"0,16-34 0 0 0,-2 7 2641 0 0,-18 44-2659 0 0,-4 23 72 0 0,-1 3-1760 0 0,-12 236 1868 0 0,4-130-1208 0 0,5-76-374 0 0,-11 332 504 0 0,20-234-804 0 0,0-115-2694 0 0</inkml:trace>
+  <inkml:trace contextRef="#ctx0" brushRef="#br0" timeOffset="1">4 636 23039 0 0,'0'0'528'0'0,"-3"-2"372"0"0,3 2-883 0 0,0 0 1 0 0,0 0-1 0 0,0 0 0 0 0,0 0 1 0 0,0 0-1 0 0,0 0 1 0 0,0 0-1 0 0,0 0 0 0 0,0 0 1 0 0,0 0-1 0 0,0 0 1 0 0,0 0-1 0 0,0 0 0 0 0,0 0 1 0 0,1 0-1 0 0,-1 0 1 0 0,0 0-1 0 0,0 0 0 0 0,0 0 1 0 0,0 0-1 0 0,0 0 1 0 0,0 0-1 0 0,0 0 1 0 0,0 0-1 0 0,0 0 0 0 0,0-1 1 0 0,0 1-1 0 0,0 0 1 0 0,0 0-1 0 0,0 0 0 0 0,0 0 1 0 0,0 0-1 0 0,0 0 1 0 0,0 0-1 0 0,0 0 0 0 0,0 0 1 0 0,0 0-1 0 0,0 0 1 0 0,0 0-1 0 0,0 0 0 0 0,0 0 1 0 0,-1 0-1 0 0,1 0 1 0 0,0 0-1 0 0,0 0 0 0 0,0 0 1 0 0,0 0-1 0 0,0 0 1 0 0,0 0-1 0 0,0 0 0 0 0,0 0 1 0 0,0-1-1 0 0,0 1 1 0 0,0 0-1 0 0,0 0 0 0 0,0 0 1 0 0,0 0-1 0 0,0 0 1 0 0,0 0-1 0 0,0 0 0 0 0,0 0 1 0 0,125-27 3027 0 0,-95 21-2863 0 0,86-13 452 0 0,-99 18-1372 0 0,0-1 1 0 0,21 2-1 0 0,-31 1 348 0 0,1 0 1 0 0,0 0-1 0 0,-1 1 0 0 0,1 0 1 0 0,-1 0-1 0 0,0 0 0 0 0,9 5 1 0 0,-1 2-1473 0 0</inkml:trace>
+</inkml:ink>
+</file>
+
+<file path=ppt/ink/ink34.xml><?xml version="1.0" encoding="utf-8"?>
+<inkml:ink xmlns:inkml="http://www.w3.org/2003/InkML">
+  <inkml:definitions>
+    <inkml:context xml:id="ctx0">
+      <inkml:inkSource xml:id="inkSrc0">
+        <inkml:traceFormat>
+          <inkml:channel name="X" type="integer" min="-2.14748E9" max="2.14748E9" units="cm"/>
+          <inkml:channel name="Y" type="integer" min="-2.14748E9" max="2.14748E9" units="cm"/>
+          <inkml:channel name="F" type="integer" max="32767" units="dev"/>
+          <inkml:channel name="OA" type="integer" max="360" units="deg"/>
+          <inkml:channel name="OE" type="integer" max="90" units="deg"/>
+        </inkml:traceFormat>
+        <inkml:channelProperties>
+          <inkml:channelProperty channel="X" name="resolution" value="1000" units="1/cm"/>
+          <inkml:channelProperty channel="Y" name="resolution" value="1000" units="1/cm"/>
+          <inkml:channelProperty channel="F" name="resolution" value="0" units="1/dev"/>
+          <inkml:channelProperty channel="OA" name="resolution" value="1000" units="1/deg"/>
+          <inkml:channelProperty channel="OE" name="resolution" value="1000" units="1/deg"/>
+        </inkml:channelProperties>
+      </inkml:inkSource>
+      <inkml:timestamp xml:id="ts0" timeString="2021-02-22T19:01:03.492"/>
+    </inkml:context>
+    <inkml:brush xml:id="br0">
+      <inkml:brushProperty name="width" value="0.05" units="cm"/>
+      <inkml:brushProperty name="height" value="0.05" units="cm"/>
+      <inkml:brushProperty name="color" value="#E71224"/>
+    </inkml:brush>
+  </inkml:definitions>
+  <inkml:trace contextRef="#ctx0" brushRef="#br0">1 266 7832 0 0,'0'0'602'0'0,"1"0"-395"0"0,5-2 949 0 0,0 0 0 0 0,0-1 0 0 0,0 1 0 0 0,-1-1 0 0 0,1 0 0 0 0,-1-1 0 0 0,0 1 0 0 0,8-8 0 0 0,4-5 1339 0 0,15-18 1 0 0,-21 22-2373 0 0,1-4 469 0 0,-1 0 0 0 0,-1 0 0 0 0,0-1 0 0 0,8-20 0 0 0,-16 33-558 0 0,0 1-1 0 0,-1 0 1 0 0,0-1 0 0 0,1 1-1 0 0,-1-1 1 0 0,-1 0-1 0 0,1 1 1 0 0,0-1 0 0 0,-1 0-1 0 0,0 1 1 0 0,0-1-1 0 0,0 0 1 0 0,0 1 0 0 0,-2-7-1 0 0,2 10-33 0 0,0-1 0 0 0,0 1 0 0 0,-1-1 0 0 0,1 1 0 0 0,0 0 0 0 0,0-1 0 0 0,-1 1 0 0 0,1-1 0 0 0,0 1 0 0 0,-1 0 0 0 0,1-1 0 0 0,0 1 0 0 0,-1-1 0 0 0,1 1 0 0 0,-1 0 0 0 0,1 0 0 0 0,0-1 0 0 0,-1 1 0 0 0,1 0 0 0 0,-1 0 0 0 0,1 0 0 0 0,-1-1 0 0 0,1 1 0 0 0,-1 0 0 0 0,1 0 0 0 0,-1 0 0 0 0,1 0 0 0 0,-1 0 0 0 0,1 0 0 0 0,-1 0 0 0 0,1 0 0 0 0,-1 0 0 0 0,0 0 0 0 0,1 0 0 0 0,-1 0 0 0 0,1 1 0 0 0,0-1 0 0 0,-1 0 0 0 0,1 0 0 0 0,-1 0 0 0 0,0 1 0 0 0,0 0 0 0 0,-3 0 23 0 0,0 1-1 0 0,1 0 1 0 0,-1 0-1 0 0,1 0 1 0 0,0 0-1 0 0,-1 1 1 0 0,1-1-1 0 0,0 1 1 0 0,1 0 0 0 0,-1 0-1 0 0,0 0 1 0 0,-4 6-1 0 0,-2 6 203 0 0,-12 26 0 0 0,14-27-159 0 0,3-7-11 0 0,1 1 0 0 0,0 0-1 0 0,0-1 1 0 0,1 1 0 0 0,0 0-1 0 0,0 0 1 0 0,1 0 0 0 0,0 0-1 0 0,1 1 1 0 0,0-1 0 0 0,0 0-1 0 0,0 0 1 0 0,1 0 0 0 0,3 14-1 0 0,-3-20-50 0 0,-1 0-1 0 0,1 0 0 0 0,0 0 0 0 0,0 0 1 0 0,0 0-1 0 0,0-1 0 0 0,0 1 0 0 0,0 0 1 0 0,0 0-1 0 0,1-1 0 0 0,-1 1 0 0 0,1-1 1 0 0,-1 1-1 0 0,1-1 0 0 0,0 0 0 0 0,-1 0 0 0 0,3 2 1 0 0,-1-2-45 0 0,0 0 0 0 0,0 0 0 0 0,0 0 1 0 0,0 0-1 0 0,1-1 0 0 0,-1 1 0 0 0,0-1 1 0 0,0 0-1 0 0,0 1 0 0 0,5-2 0 0 0,2 0-804 0 0,1-1 0 0 0,0-1 0 0 0,-1 0 1 0 0,0 0-1 0 0,15-7 0 0 0,3-3-7924 0 0</inkml:trace>
+</inkml:ink>
+</file>
+
+<file path=ppt/ink/ink35.xml><?xml version="1.0" encoding="utf-8"?>
+<inkml:ink xmlns:inkml="http://www.w3.org/2003/InkML">
+  <inkml:definitions>
+    <inkml:context xml:id="ctx0">
+      <inkml:inkSource xml:id="inkSrc0">
+        <inkml:traceFormat>
+          <inkml:channel name="X" type="integer" min="-2.14748E9" max="2.14748E9" units="cm"/>
+          <inkml:channel name="Y" type="integer" min="-2.14748E9" max="2.14748E9" units="cm"/>
+          <inkml:channel name="F" type="integer" max="32767" units="dev"/>
+          <inkml:channel name="OA" type="integer" max="360" units="deg"/>
+          <inkml:channel name="OE" type="integer" max="90" units="deg"/>
+        </inkml:traceFormat>
+        <inkml:channelProperties>
+          <inkml:channelProperty channel="X" name="resolution" value="1000" units="1/cm"/>
+          <inkml:channelProperty channel="Y" name="resolution" value="1000" units="1/cm"/>
+          <inkml:channelProperty channel="F" name="resolution" value="0" units="1/dev"/>
+          <inkml:channelProperty channel="OA" name="resolution" value="1000" units="1/deg"/>
+          <inkml:channelProperty channel="OE" name="resolution" value="1000" units="1/deg"/>
+        </inkml:channelProperties>
+      </inkml:inkSource>
+      <inkml:timestamp xml:id="ts0" timeString="2021-02-22T19:01:03.859"/>
+    </inkml:context>
+    <inkml:brush xml:id="br0">
+      <inkml:brushProperty name="width" value="0.05" units="cm"/>
+      <inkml:brushProperty name="height" value="0.05" units="cm"/>
+      <inkml:brushProperty name="color" value="#E71224"/>
+    </inkml:brush>
+  </inkml:definitions>
+  <inkml:trace contextRef="#ctx0" brushRef="#br0">206 0 13824 0 0,'-31'15'1489'0'0,"23"-10"265"0"0,-1 1 0 0 0,1 0 0 0 0,-14 13 0 0 0,18-15-1006 0 0,1 0 0 0 0,-1 0 0 0 0,1 1 0 0 0,-1-1 0 0 0,1 1 0 0 0,1 0 0 0 0,-1 0 0 0 0,-2 6 0 0 0,4-8-639 0 0,0 0 0 0 0,1 1 0 0 0,-1-1 0 0 0,0 0 0 0 0,1 1 1 0 0,0-1-1 0 0,0 0 0 0 0,0 7 0 0 0,1-7-51 0 0,1 1 0 0 0,-1-1 1 0 0,0 1-1 0 0,1-1 0 0 0,0 1 0 0 0,0-1 1 0 0,0 0-1 0 0,0 0 0 0 0,0 0 0 0 0,0 0 0 0 0,1 0 1 0 0,0-1-1 0 0,-1 1 0 0 0,1-1 0 0 0,4 3 0 0 0,-3-2-15 0 0,0 1-1 0 0,0 0 1 0 0,0 0-1 0 0,-1 0 0 0 0,1 0 1 0 0,3 6-1 0 0,-6-7-37 0 0,0-1 0 0 0,-1 1-1 0 0,1-1 1 0 0,-1 0 0 0 0,1 1 0 0 0,-1-1 0 0 0,0 1-1 0 0,0-1 1 0 0,0 1 0 0 0,-1-1 0 0 0,1 1 0 0 0,0-1-1 0 0,-1 1 1 0 0,0 2 0 0 0,-14 33 67 0 0,6-23-134 0 0,-1-1 1 0 0,0 1-1 0 0,-1-1 1 0 0,0-1-1 0 0,-21 19 1 0 0,4-9-1550 0 0,8-10-5977 0 0,5-5-1811 0 0</inkml:trace>
+</inkml:ink>
+</file>
+
+<file path=ppt/ink/ink36.xml><?xml version="1.0" encoding="utf-8"?>
+<inkml:ink xmlns:inkml="http://www.w3.org/2003/InkML">
+  <inkml:definitions>
+    <inkml:context xml:id="ctx0">
+      <inkml:inkSource xml:id="inkSrc0">
+        <inkml:traceFormat>
+          <inkml:channel name="X" type="integer" min="-2.14748E9" max="2.14748E9" units="cm"/>
+          <inkml:channel name="Y" type="integer" min="-2.14748E9" max="2.14748E9" units="cm"/>
+          <inkml:channel name="F" type="integer" max="32767" units="dev"/>
+          <inkml:channel name="OA" type="integer" max="360" units="deg"/>
+          <inkml:channel name="OE" type="integer" max="90" units="deg"/>
+        </inkml:traceFormat>
+        <inkml:channelProperties>
+          <inkml:channelProperty channel="X" name="resolution" value="1000" units="1/cm"/>
+          <inkml:channelProperty channel="Y" name="resolution" value="1000" units="1/cm"/>
+          <inkml:channelProperty channel="F" name="resolution" value="0" units="1/dev"/>
+          <inkml:channelProperty channel="OA" name="resolution" value="1000" units="1/deg"/>
+          <inkml:channelProperty channel="OE" name="resolution" value="1000" units="1/deg"/>
+        </inkml:channelProperties>
+      </inkml:inkSource>
+      <inkml:timestamp xml:id="ts0" timeString="2021-02-22T19:01:06.943"/>
+    </inkml:context>
+    <inkml:brush xml:id="br0">
+      <inkml:brushProperty name="width" value="0.05" units="cm"/>
+      <inkml:brushProperty name="height" value="0.05" units="cm"/>
+      <inkml:brushProperty name="color" value="#E71224"/>
+    </inkml:brush>
+  </inkml:definitions>
+  <inkml:trace contextRef="#ctx0" brushRef="#br0">60 20 12240 0 0,'-3'-2'196'0'0,"0"0"0"0"0,1 1 1 0 0,-1 0-1 0 0,0-1 1 0 0,0 1-1 0 0,0 0 0 0 0,0 0 1 0 0,-7-1-1 0 0,-13-5 4636 0 0,20 20-4132 0 0,3-12-522 0 0,0 0-1 0 0,1-1 0 0 0,-1 1 0 0 0,1 0 1 0 0,-1 0-1 0 0,1-1 0 0 0,-1 1 0 0 0,1 0 1 0 0,-1-1-1 0 0,1 1 0 0 0,-1 0 0 0 0,1-1 1 0 0,0 1-1 0 0,-1-1 0 0 0,1 1 0 0 0,0-1 1 0 0,1 1-1 0 0,0 1-316 0 0,5 2 387 0 0,0 0-1 0 0,0 0 0 0 0,0-1 0 0 0,0 0 0 0 0,1 0 0 0 0,-1 0 1 0 0,1-1-1 0 0,-1-1 0 0 0,15 3 0 0 0,17 4 200 0 0,-31-6-434 0 0,1 0 0 0 0,-1 0 0 0 0,1-1 0 0 0,10 1 0 0 0,173 9 161 0 0,-61-2 346 0 0,1 3-254 0 0,-48-4-166 0 0,100 16 192 0 0,-62-6-4 0 0,-59-10-179 0 0,100 0-1 0 0,-75-6 59 0 0,103-1 311 0 0,-13 0-313 0 0,-96-1-107 0 0,17 1-63 0 0,160-6-271 0 0,-34 0 680 0 0,318 6 161 0 0,-126-33-373 0 0,-316 21-145 0 0,381-25 397 0 0,-221 43-444 0 0,346 53 0 0 0,-415-37 925 0 0,-144-20-742 0 0,72-2-1 0 0,-49-3 216 0 0,-48 3-331 0 0,0-2 0 0 0,0-1 1 0 0,0-1-1 0 0,39-9 0 0 0,-58 10-290 0 0,8-1 569 0 0,-2 2-3141 0 0</inkml:trace>
+</inkml:ink>
+</file>
+
+<file path=ppt/ink/ink37.xml><?xml version="1.0" encoding="utf-8"?>
+<inkml:ink xmlns:inkml="http://www.w3.org/2003/InkML">
+  <inkml:definitions>
+    <inkml:context xml:id="ctx0">
+      <inkml:inkSource xml:id="inkSrc0">
+        <inkml:traceFormat>
+          <inkml:channel name="X" type="integer" min="-2.14748E9" max="2.14748E9" units="cm"/>
+          <inkml:channel name="Y" type="integer" min="-2.14748E9" max="2.14748E9" units="cm"/>
+          <inkml:channel name="F" type="integer" max="32767" units="dev"/>
+          <inkml:channel name="OA" type="integer" max="360" units="deg"/>
+          <inkml:channel name="OE" type="integer" max="90" units="deg"/>
+        </inkml:traceFormat>
+        <inkml:channelProperties>
+          <inkml:channelProperty channel="X" name="resolution" value="1000" units="1/cm"/>
+          <inkml:channelProperty channel="Y" name="resolution" value="1000" units="1/cm"/>
+          <inkml:channelProperty channel="F" name="resolution" value="0" units="1/dev"/>
+          <inkml:channelProperty channel="OA" name="resolution" value="1000" units="1/deg"/>
+          <inkml:channelProperty channel="OE" name="resolution" value="1000" units="1/deg"/>
+        </inkml:channelProperties>
+      </inkml:inkSource>
+      <inkml:timestamp xml:id="ts0" timeString="2021-02-22T19:01:16.792"/>
+    </inkml:context>
+    <inkml:brush xml:id="br0">
+      <inkml:brushProperty name="width" value="0.05" units="cm"/>
+      <inkml:brushProperty name="height" value="0.05" units="cm"/>
+      <inkml:brushProperty name="color" value="#E71224"/>
+    </inkml:brush>
+  </inkml:definitions>
+  <inkml:trace contextRef="#ctx0" brushRef="#br0">202 1 4144 0 0,'-3'4'71'0'0,"2"-3"-58"0"0,1 0 0 0 0,-1-1 0 0 0,1 1 0 0 0,-1 0-1 0 0,1-1 1 0 0,-1 1 0 0 0,1-1 0 0 0,-1 1 0 0 0,0 0 0 0 0,1-1 0 0 0,-1 1 0 0 0,0-1 0 0 0,0 0 0 0 0,1 1 0 0 0,-1-1 0 0 0,0 0 0 0 0,0 1 0 0 0,0-1 0 0 0,1 0 0 0 0,-1 0 0 0 0,0 0 0 0 0,0 1 0 0 0,0-1 0 0 0,0 0 0 0 0,-1-1 0 0 0,-23 2 3604 0 0,16-2-2571 0 0,1 0 1 0 0,-1 1-1 0 0,-9 1 0 0 0,-23-2 1769 0 0,38 1-2251 0 0,-1-1-1 0 0,1 2 1 0 0,-1-1-1 0 0,0 0 1 0 0,1 1 0 0 0,-1-1-1 0 0,-5 3 1 0 0,7-2-433 0 0,0-1 0 0 0,0 1-1 0 0,1 0 1 0 0,-1-1 0 0 0,0 1 0 0 0,1 0 0 0 0,-1 0 0 0 0,1 0-1 0 0,-1 0 1 0 0,1 0 0 0 0,0 1 0 0 0,-1-1 0 0 0,1 0 0 0 0,0 1-1 0 0,0-1 1 0 0,-1 3 0 0 0,1-4 368 0 0,-5 6 454 0 0,6-6-947 0 0,0 0 0 0 0,0 0 0 0 0,0 0 0 0 0,0 1 0 0 0,-1-1 0 0 0,1 0 0 0 0,0 0-1 0 0,0 1 1 0 0,0-1 0 0 0,0 0 0 0 0,0 0 0 0 0,0 1 0 0 0,0-1 0 0 0,0 0 0 0 0,0 0 0 0 0,0 1 0 0 0,0-1 0 0 0,0 0 0 0 0,0 0 0 0 0,0 1 0 0 0,0-1 0 0 0,0 0 0 0 0,0 0 0 0 0,0 1-1 0 0,0-1 1 0 0,0 0 0 0 0,0 0 0 0 0,0 1 0 0 0,0-1 0 0 0,0 0 0 0 0,0 0 0 0 0,1 1 0 0 0,-1-1 0 0 0,0 0 0 0 0,0 0 0 0 0,0 0 0 0 0,1 1 0 0 0,7 4 263 0 0,-8-5-156 0 0,5 3 93 0 0,0-1 0 0 0,1 0 1 0 0,-1 0-1 0 0,0-1 0 0 0,1 1 0 0 0,-1-1 0 0 0,9 0 0 0 0,43 0 179 0 0,-14-1 626 0 0,350 3 1316 0 0,-188-1-1982 0 0,41-6-83 0 0,1 0 7 0 0,-129-3-49 0 0,-54 1-84 0 0,20-2 61 0 0,-52 4-34 0 0,-1 1 0 0 0,1 2 0 0 0,0 1 0 0 0,45 5 0 0 0,-44 1-170 0 0,49 18 0 0 0,-81-24 89 0 0,0 0-21 0 0,3-2-49 0 0,-4 1-13 0 0,0 1 0 0 0,1 0 0 0 0,-1 0 0 0 0,0-1-1 0 0,1 1 1 0 0,-1 0 0 0 0,0 0 0 0 0,1-1 0 0 0,-1 1 0 0 0,0 0 0 0 0,0-1-1 0 0,0 1 1 0 0,1 0 0 0 0,-1-1 0 0 0,0 1 0 0 0,0-1 0 0 0,0 1 0 0 0,0 0 0 0 0,0-1-1 0 0,0 1 1 0 0,0 0 0 0 0,0-1 0 0 0,0 1 0 0 0,0-1 0 0 0,0 1 0 0 0,0 0 0 0 0,0-1-1 0 0,0 1 1 0 0,0-1 0 0 0,0 1 0 0 0,0 0 0 0 0,0-1 0 0 0,0 1 0 0 0,-1-1 0 0 0,1 1-1 0 0,0 0 1 0 0,0-1 0 0 0,0 1 0 0 0,-1 0 0 0 0,1 0 0 0 0,0-1 0 0 0,0 1-1 0 0,-1 0 1 0 0,1-1 0 0 0,0 1 0 0 0,-1 0 0 0 0,1 0 0 0 0,0 0 0 0 0,-1-1 0 0 0,1 1-1 0 0,-1 0 1 0 0,0-1-96 0 0,0 1 1 0 0,0-1-1 0 0,0 0 0 0 0,0 1 0 0 0,0-1 0 0 0,0 1 0 0 0,0 0 0 0 0,0-1 0 0 0,0 1 0 0 0,0 0 1 0 0,0-1-1 0 0,0 1 0 0 0,-1 0 0 0 0,1 0 0 0 0,0 0 0 0 0,0 0 0 0 0,0 0 0 0 0,0 0 0 0 0,0 1 0 0 0,-2-1 1 0 0,-5 5-3996 0 0</inkml:trace>
+</inkml:ink>
+</file>
+
+<file path=ppt/ink/ink4.xml><?xml version="1.0" encoding="utf-8"?>
+<inkml:ink xmlns:inkml="http://www.w3.org/2003/InkML">
+  <inkml:definitions>
+    <inkml:context xml:id="ctx0">
+      <inkml:inkSource xml:id="inkSrc0">
+        <inkml:traceFormat>
+          <inkml:channel name="X" type="integer" min="-2.14748E9" max="2.14748E9" units="cm"/>
+          <inkml:channel name="Y" type="integer" min="-2.14748E9" max="2.14748E9" units="cm"/>
+          <inkml:channel name="F" type="integer" max="32767" units="dev"/>
+          <inkml:channel name="OA" type="integer" max="360" units="deg"/>
+          <inkml:channel name="OE" type="integer" max="90" units="deg"/>
+        </inkml:traceFormat>
+        <inkml:channelProperties>
+          <inkml:channelProperty channel="X" name="resolution" value="1000" units="1/cm"/>
+          <inkml:channelProperty channel="Y" name="resolution" value="1000" units="1/cm"/>
+          <inkml:channelProperty channel="F" name="resolution" value="0" units="1/dev"/>
+          <inkml:channelProperty channel="OA" name="resolution" value="1000" units="1/deg"/>
+          <inkml:channelProperty channel="OE" name="resolution" value="1000" units="1/deg"/>
+        </inkml:channelProperties>
+      </inkml:inkSource>
+      <inkml:timestamp xml:id="ts0" timeString="2021-02-22T19:00:36.369"/>
+    </inkml:context>
+    <inkml:brush xml:id="br0">
+      <inkml:brushProperty name="width" value="0.05" units="cm"/>
+      <inkml:brushProperty name="height" value="0.05" units="cm"/>
+      <inkml:brushProperty name="color" value="#E71224"/>
+    </inkml:brush>
+  </inkml:definitions>
+  <inkml:trace contextRef="#ctx0" brushRef="#br0">64 126 5984 0 0,'-5'-2'273'0'0,"0"0"1"0"0,1 0 0 0 0,-1-1-1 0 0,1 0 1 0 0,-1 0 0 0 0,1 0-1 0 0,0 0 1 0 0,-5-6-1 0 0,7 7 454 0 0,0 0-1 0 0,0 0 0 0 0,0-1 1 0 0,1 1-1 0 0,0 0 1 0 0,-1-1-1 0 0,1 1 0 0 0,0 0 1 0 0,0-1-1 0 0,0 0 0 0 0,-1-4 1 0 0,2 6-566 0 0,0 0 0 0 0,0 0 0 0 0,0-1 1 0 0,0 1-1 0 0,0 0 0 0 0,0 0 0 0 0,1 0 0 0 0,-1-1 1 0 0,0 1-1 0 0,1 0 0 0 0,-1 0 0 0 0,1 0 1 0 0,-1 0-1 0 0,1 0 0 0 0,0 0 0 0 0,-1 0 0 0 0,1 0 1 0 0,0 0-1 0 0,0 0 0 0 0,-1 0 0 0 0,1 0 1 0 0,0 0-1 0 0,0 1 0 0 0,0-1 0 0 0,0 0 0 0 0,0 1 1 0 0,0-1-1 0 0,0 0 0 0 0,2 0 0 0 0,12-4 302 0 0,1 0 0 0 0,-1 1 0 0 0,1 1 0 0 0,0 0 0 0 0,0 1 0 0 0,19 0 0 0 0,4-1 16 0 0,18-1 288 0 0,1 2 0 0 0,88 10 0 0 0,114 28 373 0 0,-258-36-1133 0 0,54 9 181 0 0,161 24 576 0 0,-203-31-695 0 0,1 1-1 0 0,-1 0 1 0 0,0 1-1 0 0,0 0 1 0 0,0 1-1 0 0,20 11 1 0 0,-18-8 59 0 0,-15-8 91 0 0,-10 9 179 0 0,4-7-369 0 0,0 0-1 0 0,0-1 0 0 0,-1 0 0 0 0,1-1 1 0 0,-1 1-1 0 0,1-1 0 0 0,-1 0 1 0 0,1 0-1 0 0,-1-1 0 0 0,1 1 0 0 0,-7-3 1 0 0,-8 1-18 0 0,-146-15-99 0 0,-303-16-336 0 0,423 33 528 0 0,0 3 0 0 0,1 1 0 0 0,-1 3 0 0 0,-58 16 0 0 0,59-7-104 0 0,46-16 0 0 0,-1 0 0 0 0,0 0 0 0 0,0 0 0 0 0,0 0 0 0 0,0 0 0 0 0,0 0 0 0 0,1 0 0 0 0,-1 0 0 0 0,0 0 0 0 0,0 0 0 0 0,0 0 0 0 0,0 0 0 0 0,0 1 0 0 0,0-1 0 0 0,0 0 0 0 0,0 0 0 0 0,1 0 0 0 0,-1 0 0 0 0,0 0 0 0 0,0 0 0 0 0,0 1 0 0 0,0-1 0 0 0,0 0 0 0 0,0 0 0 0 0,0 0 0 0 0,0 0 0 0 0,0 0 0 0 0,0 1 0 0 0,0-1 0 0 0,0 0 0 0 0,0 0 0 0 0,0 0 0 0 0,0 0 0 0 0,0 0 0 0 0,0 1 0 0 0,0-1 0 0 0,0 0 0 0 0,0 0 0 0 0,0 0 0 0 0,0 0 0 0 0,0 0 0 0 0,0 1 0 0 0,0-1 0 0 0,-1 0 0 0 0,1 0 0 0 0,0 0 0 0 0,0 0 0 0 0,0 0 0 0 0,0 0 0 0 0,0 0 0 0 0,0 1 0 0 0,0-1 0 0 0,-1 0 0 0 0,1 0 0 0 0,0 0 0 0 0,0 0 0 0 0,0 0 0 0 0,0 0 0 0 0,-1 0 0 0 0,1 0 0 0 0,0 0 0 0 0,11 2-6 0 0,0 0 0 0 0,0-2-1 0 0,-1 1 1 0 0,1-1 0 0 0,0 0 0 0 0,17-4-1 0 0,-3 2-29 0 0,208-21-203 0 0,-53 5 110 0 0,-100 10 169 0 0,-16 1 92 0 0,110 2 0 0 0,-147 5-43 0 0,-21-1-80 0 0,0 1-1 0 0,0 0 1 0 0,0 0 0 0 0,0 1 0 0 0,0 0 0 0 0,0 0 0 0 0,10 3 0 0 0,-16-4-9 0 0,0 0 0 0 0,1 0 0 0 0,-1 0 0 0 0,0 0 0 0 0,0 0 0 0 0,1 0 0 0 0,-1 0 0 0 0,0 0 0 0 0,0 0 0 0 0,0 0 0 0 0,1 0 0 0 0,-1 1 0 0 0,0-1 0 0 0,0 0 0 0 0,0 0 0 0 0,1 0 0 0 0,-1 0 0 0 0,0 0 0 0 0,0 1 0 0 0,0-1 0 0 0,0 0 0 0 0,1 0 0 0 0,-1 0 0 0 0,0 0 0 0 0,0 1 0 0 0,0-1 0 0 0,0 0 0 0 0,0 0 0 0 0,0 0 0 0 0,0 1 0 0 0,0-1 0 0 0,0 0 0 0 0,0 0 0 0 0,0 1 0 0 0,0-1 0 0 0,0 0 0 0 0,0 0 0 0 0,0 0 0 0 0,0 1 0 0 0,0-1 0 0 0,0 0 0 0 0,0 0 0 0 0,0 1 0 0 0,0-1 0 0 0,0 0 0 0 0,0 0 0 0 0,0 0 0 0 0,0 1 0 0 0,0-1 0 0 0,0 0 0 0 0,-1 0 0 0 0,1 0 0 0 0,0 1 0 0 0,0-1 0 0 0,0 0 0 0 0,0 0 0 0 0,0 0 0 0 0,-1 0 0 0 0,1 1 0 0 0,-2 1 1 0 0,0 0-1 0 0,0 1 1 0 0,0-1 0 0 0,-1 0-1 0 0,1 0 1 0 0,-1 0 0 0 0,1 0-1 0 0,-1-1 1 0 0,1 1 0 0 0,-1-1-1 0 0,0 0 1 0 0,-4 2 0 0 0,-40 10 54 0 0,32-9-47 0 0,-15 3 0 0 0,-1-2 0 0 0,-1-1 0 0 0,-60 0 0 0 0,-95-17 24 0 0,-8-20-58 0 0,117 18 7 0 0,-90-6 0 0 0,151 20 19 0 0,25 5 0 0 0,1-2 0 0 0,14 4 0 0 0,37 0-24 0 0,0-3 0 0 0,82-6-1 0 0,-82 0 18 0 0,354-16 7 0 0,-388 17 10 0 0,-7 2 17 0 0,37-8 0 0 0,-29 3 77 0 0,-25 5-63 0 0,-4 0-4 0 0,-15 2 13 0 0,-17 2-18 0 0,-84 5 80 0 0,-56-7-112 0 0,-44 2 0 0 0,148 1 0 0 0,-74 14 0 0 0,128-16 0 0 0,0 1 0 0 0,0 1 0 0 0,1 0 0 0 0,-18 9 0 0 0,32-13 0 0 0,-1 0 0 0 0,0 0 0 0 0,0 0 0 0 0,1 0 0 0 0,-1 0 0 0 0,1 0 0 0 0,-1 1 0 0 0,1-1 0 0 0,-1 1 0 0 0,-1 2 0 0 0,3-4-1 0 0,0 0-1 0 0,-1 0 1 0 0,1 1-1 0 0,0-1 1 0 0,0 0-1 0 0,0 0 1 0 0,0 1-1 0 0,-1-1 1 0 0,1 0-1 0 0,0 1 1 0 0,0-1 0 0 0,0 0-1 0 0,0 1 1 0 0,0-1-1 0 0,0 0 1 0 0,0 0-1 0 0,0 1 1 0 0,0-1-1 0 0,0 0 1 0 0,0 1 0 0 0,0-1-1 0 0,0 0 1 0 0,0 1-1 0 0,0-1 1 0 0,0 0-1 0 0,0 1 1 0 0,0-1-1 0 0,0 0 1 0 0,0 1-1 0 0,1-1 1 0 0,-1 0 0 0 0,0 0-1 0 0,0 1 1 0 0,0-1-1 0 0,0 0 1 0 0,1 0-1 0 0,-1 1 1 0 0,0-1-1 0 0,0 0 1 0 0,1 0-1 0 0,-1 0 1 0 0,0 1 0 0 0,0-1-1 0 0,1 0 1 0 0,-1 0-1 0 0,0 0 1 0 0,1 0-1 0 0,-1 0 1 0 0,0 0-1 0 0,1 1 1 0 0,-1-1-1 0 0,0 0 1 0 0,1 0 0 0 0,-1 0-1 0 0,1 0 1 0 0,-1 0-11 0 0,12 4-35 0 0,1 0 1 0 0,0 0 0 0 0,0-2-1 0 0,0 1 1 0 0,26 0-1 0 0,-12-3 99 0 0,-1-1-1 0 0,29-4 1 0 0,185-37 64 0 0,40-5-42 0 0,-157 36 1 0 0,-100 4-5588 0 0,-28 7 4154 0 0</inkml:trace>
+</inkml:ink>
+</file>
+
+<file path=ppt/ink/ink5.xml><?xml version="1.0" encoding="utf-8"?>
+<inkml:ink xmlns:inkml="http://www.w3.org/2003/InkML">
+  <inkml:definitions>
+    <inkml:context xml:id="ctx0">
+      <inkml:inkSource xml:id="inkSrc0">
+        <inkml:traceFormat>
+          <inkml:channel name="X" type="integer" min="-2.14748E9" max="2.14748E9" units="cm"/>
+          <inkml:channel name="Y" type="integer" min="-2.14748E9" max="2.14748E9" units="cm"/>
+          <inkml:channel name="F" type="integer" max="32767" units="dev"/>
+          <inkml:channel name="OA" type="integer" max="360" units="deg"/>
+          <inkml:channel name="OE" type="integer" max="90" units="deg"/>
+        </inkml:traceFormat>
+        <inkml:channelProperties>
+          <inkml:channelProperty channel="X" name="resolution" value="1000" units="1/cm"/>
+          <inkml:channelProperty channel="Y" name="resolution" value="1000" units="1/cm"/>
+          <inkml:channelProperty channel="F" name="resolution" value="0" units="1/dev"/>
+          <inkml:channelProperty channel="OA" name="resolution" value="1000" units="1/deg"/>
+          <inkml:channelProperty channel="OE" name="resolution" value="1000" units="1/deg"/>
+        </inkml:channelProperties>
+      </inkml:inkSource>
+      <inkml:timestamp xml:id="ts0" timeString="2021-02-22T19:00:45.746"/>
+    </inkml:context>
+    <inkml:brush xml:id="br0">
+      <inkml:brushProperty name="width" value="0.05" units="cm"/>
+      <inkml:brushProperty name="height" value="0.05" units="cm"/>
+      <inkml:brushProperty name="color" value="#E71224"/>
+    </inkml:brush>
+  </inkml:definitions>
+  <inkml:trace contextRef="#ctx0" brushRef="#br0">108 27 4144 0 0,'0'0'319'0'0,"-13"2"-83"0"0,6-1 683 0 0,0-1 0 0 0,-1 0 1 0 0,1-1-1 0 0,0 0 1 0 0,0 0-1 0 0,-9-3 0 0 0,10 3 102 0 0,1 0 0 0 0,-1-1 0 0 0,1 0 0 0 0,-7-4 2544 0 0,12 6-3368 0 0,0 0-92 0 0,0-1 0 0 0,-1 1 0 0 0,1 0 0 0 0,0 0 0 0 0,0 0 0 0 0,0 0 0 0 0,0-1 0 0 0,0 1 0 0 0,0 0 0 0 0,0 0 0 0 0,0 0 0 0 0,0 0 0 0 0,0-1 0 0 0,0 1 0 0 0,0 0 0 0 0,0 0 0 0 0,0 0 0 0 0,0-1 0 0 0,0 1 0 0 0,0 0-1 0 0,0 0 1 0 0,0 0 0 0 0,0 0 0 0 0,0-1 0 0 0,0 1 0 0 0,1 0 0 0 0,-1 0 0 0 0,0 0 0 0 0,0 0 0 0 0,0-1 0 0 0,0 1 0 0 0,0 0 0 0 0,0 0 0 0 0,0 0 0 0 0,1 0 0 0 0,-1 0 0 0 0,0 0 0 0 0,0 0 0 0 0,0-1 0 0 0,0 1 0 0 0,1 0 0 0 0,-1 0 0 0 0,0 0 0 0 0,0 0 0 0 0,1 0 0 0 0,8-2 101 0 0,1 1 0 0 0,-1 0 1 0 0,1 1-1 0 0,-1 0 1 0 0,1 1-1 0 0,0-1 1 0 0,14 5-1 0 0,0-2 21 0 0,115 18 519 0 0,85 8 84 0 0,-115-21-573 0 0,101 1 206 0 0,260-36 337 0 0,-24 14 31 0 0,-390 13-718 0 0,75 6 151 0 0,-18 4-45 0 0,-27 1 466 0 0,-59-7-269 0 0,49 3 0 0 0,-67-6-416 0 0,-6-1 0 0 0,0 0 0 0 0,0 1 0 0 0,1-1 0 0 0,-1 0 0 0 0,0-1 0 0 0,0 1 0 0 0,0-1 0 0 0,0 1 0 0 0,5-2 0 0 0,-5 1 0 0 0,3-1 0 0 0,1-13 0 0 0,-7 14 3 0 0,0-1 0 0 0,0 1 0 0 0,0-1 0 0 0,0 1-1 0 0,0 0 1 0 0,0-1 0 0 0,0 1 0 0 0,-1-1 0 0 0,1 1 0 0 0,-1 0 0 0 0,1-1 0 0 0,-1 1 0 0 0,1 0-1 0 0,-1 0 1 0 0,0-1 0 0 0,0 1 0 0 0,1 0 0 0 0,-1 0 0 0 0,0 0 0 0 0,-2-1 0 0 0,3 1-6 0 0,0 1 0 0 0,-1-1 0 0 0,1 0 1 0 0,-1 1-1 0 0,1-1 0 0 0,-1 1 0 0 0,0 0 0 0 0,1-1 1 0 0,-1 1-1 0 0,1-1 0 0 0,-1 1 0 0 0,0 0 1 0 0,1 0-1 0 0,-1-1 0 0 0,0 1 0 0 0,1 0 0 0 0,-1 0 1 0 0,0 0-1 0 0,1-1 0 0 0,-1 1 0 0 0,0 0 0 0 0,1 0 1 0 0,-1 0-1 0 0,0 0 0 0 0,0 1 0 0 0,1-1 1 0 0,-1 0-1 0 0,0 0 0 0 0,1 0 0 0 0,-1 0 0 0 0,0 1 1 0 0,1-1-1 0 0,-1 0 0 0 0,0 1 0 0 0,1-1 1 0 0,-1 0-1 0 0,1 1 0 0 0,-1-1 0 0 0,0 2 0 0 0,-5 5-697 0 0,-5 6-2069 0 0,5-2-4141 0 0,1 4-2267 0 0</inkml:trace>
+</inkml:ink>
+</file>
+
+<file path=ppt/ink/ink6.xml><?xml version="1.0" encoding="utf-8"?>
+<inkml:ink xmlns:inkml="http://www.w3.org/2003/InkML">
+  <inkml:definitions>
+    <inkml:context xml:id="ctx0">
+      <inkml:inkSource xml:id="inkSrc0">
+        <inkml:traceFormat>
+          <inkml:channel name="X" type="integer" min="-2.14748E9" max="2.14748E9" units="cm"/>
+          <inkml:channel name="Y" type="integer" min="-2.14748E9" max="2.14748E9" units="cm"/>
+          <inkml:channel name="F" type="integer" max="32767" units="dev"/>
+          <inkml:channel name="OA" type="integer" max="360" units="deg"/>
+          <inkml:channel name="OE" type="integer" max="90" units="deg"/>
+        </inkml:traceFormat>
+        <inkml:channelProperties>
+          <inkml:channelProperty channel="X" name="resolution" value="1000" units="1/cm"/>
+          <inkml:channelProperty channel="Y" name="resolution" value="1000" units="1/cm"/>
+          <inkml:channelProperty channel="F" name="resolution" value="0" units="1/dev"/>
+          <inkml:channelProperty channel="OA" name="resolution" value="1000" units="1/deg"/>
+          <inkml:channelProperty channel="OE" name="resolution" value="1000" units="1/deg"/>
+        </inkml:channelProperties>
+      </inkml:inkSource>
+      <inkml:timestamp xml:id="ts0" timeString="2021-02-22T19:00:46.261"/>
+    </inkml:context>
+    <inkml:brush xml:id="br0">
+      <inkml:brushProperty name="width" value="0.05" units="cm"/>
+      <inkml:brushProperty name="height" value="0.05" units="cm"/>
+      <inkml:brushProperty name="color" value="#E71224"/>
+    </inkml:brush>
+  </inkml:definitions>
+  <inkml:trace contextRef="#ctx0" brushRef="#br0">141 70 6912 0 0,'0'-30'2558'0'0,"-5"0"5103"0"0,5 29-7490 0 0,0 1 0 0 0,0-1 0 0 0,0 1 0 0 0,-1-1-1 0 0,1 1 1 0 0,0 0 0 0 0,0-1 0 0 0,0 1 0 0 0,0-1-1 0 0,-1 1 1 0 0,1-1 0 0 0,0 1 0 0 0,0 0 0 0 0,-1-1-1 0 0,1 1 1 0 0,0 0 0 0 0,0-1 0 0 0,-1 1 0 0 0,1 0-1 0 0,0-1 1 0 0,-1 1 0 0 0,1 0 0 0 0,-1 0 0 0 0,1-1-1 0 0,-1 1 1 0 0,1 0-66 0 0,-1 0-1 0 0,1 1 1 0 0,-1-1-1 0 0,1 0 1 0 0,0 0-1 0 0,-1 1 0 0 0,1-1 1 0 0,-1 0-1 0 0,1 1 1 0 0,0-1-1 0 0,-1 0 1 0 0,1 1-1 0 0,0-1 1 0 0,0 0-1 0 0,-1 1 1 0 0,1-1-1 0 0,0 1 1 0 0,0-1-1 0 0,-1 1 0 0 0,-8 26 1186 0 0,-35 189-709 0 0,30-142-546 0 0,-8 45 989 0 0,-10 145 0 0 0,32-249-1301 0 0,0-1 1 0 0,1 1-1 0 0,0-1 0 0 0,6 26 0 0 0,-7-39 192 0 0,0 0 0 0 0,1 0-1 0 0,-1 0 1 0 0,0 0 0 0 0,0 0-1 0 0,1 0 1 0 0,-1 0 0 0 0,1 0-1 0 0,-1 0 1 0 0,1 0 0 0 0,-1 0-1 0 0,1-1 1 0 0,0 1 0 0 0,-1 0-1 0 0,1 0 1 0 0,0-1 0 0 0,0 1-1 0 0,-1 0 1 0 0,1-1 0 0 0,0 1-1 0 0,0 0 1 0 0,0-1 0 0 0,0 0-1 0 0,0 1 1 0 0,0-1 0 0 0,0 1-1 0 0,0-1 1 0 0,0 0 0 0 0,0 0-1 0 0,0 0 1 0 0,0 1 0 0 0,0-1-1 0 0,0 0 1 0 0,0 0 0 0 0,0-1-1 0 0,0 1 1 0 0,0 0 0 0 0,0 0-1 0 0,0 0 1 0 0,0-1 0 0 0,2 0-1 0 0,8-8-8105 0 0</inkml:trace>
+</inkml:ink>
+</file>
+
+<file path=ppt/ink/ink7.xml><?xml version="1.0" encoding="utf-8"?>
+<inkml:ink xmlns:inkml="http://www.w3.org/2003/InkML">
+  <inkml:definitions>
+    <inkml:context xml:id="ctx0">
+      <inkml:inkSource xml:id="inkSrc0">
+        <inkml:traceFormat>
+          <inkml:channel name="X" type="integer" min="-2.14748E9" max="2.14748E9" units="cm"/>
+          <inkml:channel name="Y" type="integer" min="-2.14748E9" max="2.14748E9" units="cm"/>
+          <inkml:channel name="F" type="integer" max="32767" units="dev"/>
+          <inkml:channel name="OA" type="integer" max="360" units="deg"/>
+          <inkml:channel name="OE" type="integer" max="90" units="deg"/>
+        </inkml:traceFormat>
+        <inkml:channelProperties>
+          <inkml:channelProperty channel="X" name="resolution" value="1000" units="1/cm"/>
+          <inkml:channelProperty channel="Y" name="resolution" value="1000" units="1/cm"/>
+          <inkml:channelProperty channel="F" name="resolution" value="0" units="1/dev"/>
+          <inkml:channelProperty channel="OA" name="resolution" value="1000" units="1/deg"/>
+          <inkml:channelProperty channel="OE" name="resolution" value="1000" units="1/deg"/>
+        </inkml:channelProperties>
+      </inkml:inkSource>
+      <inkml:timestamp xml:id="ts0" timeString="2021-02-22T19:00:46.914"/>
+    </inkml:context>
+    <inkml:brush xml:id="br0">
+      <inkml:brushProperty name="width" value="0.05" units="cm"/>
+      <inkml:brushProperty name="height" value="0.05" units="cm"/>
+      <inkml:brushProperty name="color" value="#E71224"/>
+    </inkml:brush>
+  </inkml:definitions>
+  <inkml:trace contextRef="#ctx0" brushRef="#br0">15 328 6448 0 0,'-6'-3'7545'0'0,"5"1"-6988"0"0,0-1 0 0 0,0 0-1 0 0,0 1 1 0 0,0-1 0 0 0,0 0 0 0 0,0 1 0 0 0,1-1-1 0 0,-1 0 1 0 0,1 0 0 0 0,0-5 0 0 0,0 3-180 0 0,1 0 1 0 0,-1 0-1 0 0,1 1 0 0 0,1-1 1 0 0,-1 0-1 0 0,1 1 0 0 0,-1-1 1 0 0,1 0-1 0 0,5-7 0 0 0,3-10 412 0 0,3-4-6 0 0,8-3-320 0 0,1 1-1 0 0,2 1 0 0 0,0 1 1 0 0,31-25-1 0 0,-51 48-442 0 0,-1 0 0 0 0,1 1 0 0 0,0-1 0 0 0,-1 1 0 0 0,1 0 0 0 0,0 0 0 0 0,0 0 0 0 0,1 1 0 0 0,-1 0 0 0 0,0-1 0 0 0,0 1 0 0 0,1 1 0 0 0,-1-1 0 0 0,1 1 0 0 0,7 0 0 0 0,-8 0-7 0 0,0 1-1 0 0,-1 0 1 0 0,1-1 0 0 0,0 2-1 0 0,-1-1 1 0 0,1 0 0 0 0,0 1-1 0 0,-1 0 1 0 0,0 0-1 0 0,1 0 1 0 0,-1 0 0 0 0,0 0-1 0 0,0 1 1 0 0,0-1 0 0 0,0 1-1 0 0,-1 0 1 0 0,1 0 0 0 0,2 4-1 0 0,4 6-1 0 0,-1 0-1 0 0,-1 1 1 0 0,-1 0 0 0 0,1 0-1 0 0,5 21 1 0 0,-5-17-11 0 0,1 0 0 0 0,15 26 0 0 0,-22-42 0 0 0,3 3-115 0 0,-1 1-1 0 0,1-1 0 0 0,0-1 1 0 0,1 1-1 0 0,-1-1 1 0 0,1 1-1 0 0,0-1 1 0 0,10 6-1 0 0,-5-4-564 0 0,0 0-1 0 0,0-1 1 0 0,1 0-1 0 0,11 3 1 0 0,-2-3-1278 0 0</inkml:trace>
+</inkml:ink>
+</file>
+
+<file path=ppt/ink/ink8.xml><?xml version="1.0" encoding="utf-8"?>
+<inkml:ink xmlns:inkml="http://www.w3.org/2003/InkML">
+  <inkml:definitions>
+    <inkml:context xml:id="ctx0">
+      <inkml:inkSource xml:id="inkSrc0">
+        <inkml:traceFormat>
+          <inkml:channel name="X" type="integer" min="-2.14748E9" max="2.14748E9" units="cm"/>
+          <inkml:channel name="Y" type="integer" min="-2.14748E9" max="2.14748E9" units="cm"/>
+          <inkml:channel name="F" type="integer" max="32767" units="dev"/>
+          <inkml:channel name="OA" type="integer" max="360" units="deg"/>
+          <inkml:channel name="OE" type="integer" max="90" units="deg"/>
+        </inkml:traceFormat>
+        <inkml:channelProperties>
+          <inkml:channelProperty channel="X" name="resolution" value="1000" units="1/cm"/>
+          <inkml:channelProperty channel="Y" name="resolution" value="1000" units="1/cm"/>
+          <inkml:channelProperty channel="F" name="resolution" value="0" units="1/dev"/>
+          <inkml:channelProperty channel="OA" name="resolution" value="1000" units="1/deg"/>
+          <inkml:channelProperty channel="OE" name="resolution" value="1000" units="1/deg"/>
+        </inkml:channelProperties>
+      </inkml:inkSource>
+      <inkml:timestamp xml:id="ts0" timeString="2021-02-22T19:00:50.885"/>
+    </inkml:context>
+    <inkml:brush xml:id="br0">
+      <inkml:brushProperty name="width" value="0.05" units="cm"/>
+      <inkml:brushProperty name="height" value="0.05" units="cm"/>
+      <inkml:brushProperty name="color" value="#E71224"/>
+    </inkml:brush>
+  </inkml:definitions>
+  <inkml:trace contextRef="#ctx0" brushRef="#br0">49 2 13824 0 0,'-7'-1'8383'0'0,"6"1"-7983"0"0,-27 499 1862 0 0,20-382-2195 0 0,5-57-68 0 0,2-55-33 0 0,1 0 1 0 0,0 0-1 0 0,0 0 0 0 0,0 0 0 0 0,1 0 0 0 0,0 0 0 0 0,0 0 0 0 0,0 0 0 0 0,3 8 1 0 0,-3-18-2157 0 0</inkml:trace>
+</inkml:ink>
+</file>
+
+<file path=ppt/ink/ink9.xml><?xml version="1.0" encoding="utf-8"?>
+<inkml:ink xmlns:inkml="http://www.w3.org/2003/InkML">
+  <inkml:definitions>
+    <inkml:context xml:id="ctx0">
+      <inkml:inkSource xml:id="inkSrc0">
+        <inkml:traceFormat>
+          <inkml:channel name="X" type="integer" min="-2.14748E9" max="2.14748E9" units="cm"/>
+          <inkml:channel name="Y" type="integer" min="-2.14748E9" max="2.14748E9" units="cm"/>
+          <inkml:channel name="F" type="integer" max="32767" units="dev"/>
+          <inkml:channel name="OA" type="integer" max="360" units="deg"/>
+          <inkml:channel name="OE" type="integer" max="90" units="deg"/>
+        </inkml:traceFormat>
+        <inkml:channelProperties>
+          <inkml:channelProperty channel="X" name="resolution" value="1000" units="1/cm"/>
+          <inkml:channelProperty channel="Y" name="resolution" value="1000" units="1/cm"/>
+          <inkml:channelProperty channel="F" name="resolution" value="0" units="1/dev"/>
+          <inkml:channelProperty channel="OA" name="resolution" value="1000" units="1/deg"/>
+          <inkml:channelProperty channel="OE" name="resolution" value="1000" units="1/deg"/>
+        </inkml:channelProperties>
+      </inkml:inkSource>
+      <inkml:timestamp xml:id="ts0" timeString="2021-02-22T19:00:51.230"/>
+    </inkml:context>
+    <inkml:brush xml:id="br0">
+      <inkml:brushProperty name="width" value="0.05" units="cm"/>
+      <inkml:brushProperty name="height" value="0.05" units="cm"/>
+      <inkml:brushProperty name="color" value="#E71224"/>
+    </inkml:brush>
+  </inkml:definitions>
+  <inkml:trace contextRef="#ctx0" brushRef="#br0">1 68 2760 0 0,'0'0'125'0'0,"1"0"-3"0"0,31 0 1604 0 0,77-2 14825 0 0,-62-3-16129 0 0,91-21 121 0 0,-86 15-250 0 0,2 2 0 0 0,87-5-1 0 0,-133 14-587 0 0,-1 0 0 0 0,1 0 1 0 0,0 1-1 0 0,-1 0 0 0 0,1 0 0 0 0,-1 1 0 0 0,1 0 0 0 0,-1 0 0 0 0,12 6 0 0 0,-7-1-7027 0 0</inkml:trace>
+</inkml:ink>
 </file>
 
 <file path=ppt/notesMasters/notesMaster1.xml><?xml version="1.0" encoding="utf-8"?>
@@ -845,7 +2035,7 @@
           <a:p>
             <a:fld id="{3A2BF66F-FEB0-48C1-A8B9-A73F54BB1A08}" type="datetimeFigureOut">
               <a:rPr lang="en-US" smtClean="0"/>
-              <a:t>2/19/2021</a:t>
+              <a:t>2/22/2021</a:t>
             </a:fld>
             <a:endParaRPr lang="en-US"/>
           </a:p>
@@ -1045,7 +2235,7 @@
           <a:p>
             <a:fld id="{3A2BF66F-FEB0-48C1-A8B9-A73F54BB1A08}" type="datetimeFigureOut">
               <a:rPr lang="en-US" smtClean="0"/>
-              <a:t>2/19/2021</a:t>
+              <a:t>2/22/2021</a:t>
             </a:fld>
             <a:endParaRPr lang="en-US"/>
           </a:p>
@@ -1255,7 +2445,7 @@
           <a:p>
             <a:fld id="{3A2BF66F-FEB0-48C1-A8B9-A73F54BB1A08}" type="datetimeFigureOut">
               <a:rPr lang="en-US" smtClean="0"/>
-              <a:t>2/19/2021</a:t>
+              <a:t>2/22/2021</a:t>
             </a:fld>
             <a:endParaRPr lang="en-US"/>
           </a:p>
@@ -1455,7 +2645,7 @@
           <a:p>
             <a:fld id="{3A2BF66F-FEB0-48C1-A8B9-A73F54BB1A08}" type="datetimeFigureOut">
               <a:rPr lang="en-US" smtClean="0"/>
-              <a:t>2/19/2021</a:t>
+              <a:t>2/22/2021</a:t>
             </a:fld>
             <a:endParaRPr lang="en-US"/>
           </a:p>
@@ -1732,7 +2922,7 @@
           <a:p>
             <a:fld id="{3A2BF66F-FEB0-48C1-A8B9-A73F54BB1A08}" type="datetimeFigureOut">
               <a:rPr lang="en-US" smtClean="0"/>
-              <a:t>2/19/2021</a:t>
+              <a:t>2/22/2021</a:t>
             </a:fld>
             <a:endParaRPr lang="en-US"/>
           </a:p>
@@ -1999,7 +3189,7 @@
           <a:p>
             <a:fld id="{3A2BF66F-FEB0-48C1-A8B9-A73F54BB1A08}" type="datetimeFigureOut">
               <a:rPr lang="en-US" smtClean="0"/>
-              <a:t>2/19/2021</a:t>
+              <a:t>2/22/2021</a:t>
             </a:fld>
             <a:endParaRPr lang="en-US"/>
           </a:p>
@@ -2413,7 +3603,7 @@
           <a:p>
             <a:fld id="{3A2BF66F-FEB0-48C1-A8B9-A73F54BB1A08}" type="datetimeFigureOut">
               <a:rPr lang="en-US" smtClean="0"/>
-              <a:t>2/19/2021</a:t>
+              <a:t>2/22/2021</a:t>
             </a:fld>
             <a:endParaRPr lang="en-US"/>
           </a:p>
@@ -2556,7 +3746,7 @@
           <a:p>
             <a:fld id="{3A2BF66F-FEB0-48C1-A8B9-A73F54BB1A08}" type="datetimeFigureOut">
               <a:rPr lang="en-US" smtClean="0"/>
-              <a:t>2/19/2021</a:t>
+              <a:t>2/22/2021</a:t>
             </a:fld>
             <a:endParaRPr lang="en-US"/>
           </a:p>
@@ -2671,7 +3861,7 @@
           <a:p>
             <a:fld id="{3A2BF66F-FEB0-48C1-A8B9-A73F54BB1A08}" type="datetimeFigureOut">
               <a:rPr lang="en-US" smtClean="0"/>
-              <a:t>2/19/2021</a:t>
+              <a:t>2/22/2021</a:t>
             </a:fld>
             <a:endParaRPr lang="en-US"/>
           </a:p>
@@ -2983,7 +4173,7 @@
           <a:p>
             <a:fld id="{3A2BF66F-FEB0-48C1-A8B9-A73F54BB1A08}" type="datetimeFigureOut">
               <a:rPr lang="en-US" smtClean="0"/>
-              <a:t>2/19/2021</a:t>
+              <a:t>2/22/2021</a:t>
             </a:fld>
             <a:endParaRPr lang="en-US"/>
           </a:p>
@@ -3273,7 +4463,7 @@
           <a:p>
             <a:fld id="{3A2BF66F-FEB0-48C1-A8B9-A73F54BB1A08}" type="datetimeFigureOut">
               <a:rPr lang="en-US" smtClean="0"/>
-              <a:t>2/19/2021</a:t>
+              <a:t>2/22/2021</a:t>
             </a:fld>
             <a:endParaRPr lang="en-US"/>
           </a:p>
@@ -3516,7 +4706,7 @@
           <a:p>
             <a:fld id="{3A2BF66F-FEB0-48C1-A8B9-A73F54BB1A08}" type="datetimeFigureOut">
               <a:rPr lang="en-US" smtClean="0"/>
-              <a:t>2/19/2021</a:t>
+              <a:t>2/22/2021</a:t>
             </a:fld>
             <a:endParaRPr lang="en-US"/>
           </a:p>
@@ -4183,6 +5373,2019 @@
           </a:p>
         </p:txBody>
       </p:sp>
+      <mc:AlternateContent xmlns:mc="http://schemas.openxmlformats.org/markup-compatibility/2006">
+        <mc:Choice xmlns:p14="http://schemas.microsoft.com/office/powerpoint/2010/main" Requires="p14">
+          <p:contentPart p14:bwMode="auto" r:id="rId2">
+            <p14:nvContentPartPr>
+              <p14:cNvPr id="4" name="Ink 3">
+                <a:extLst>
+                  <a:ext uri="{FF2B5EF4-FFF2-40B4-BE49-F238E27FC236}">
+                    <a16:creationId xmlns:a16="http://schemas.microsoft.com/office/drawing/2014/main" id="{A475B26D-4028-4CE2-9DBC-A60B6C6D19A2}"/>
+                  </a:ext>
+                </a:extLst>
+              </p14:cNvPr>
+              <p14:cNvContentPartPr/>
+              <p14:nvPr/>
+            </p14:nvContentPartPr>
+            <p14:xfrm>
+              <a:off x="850249" y="1735819"/>
+              <a:ext cx="810360" cy="55080"/>
+            </p14:xfrm>
+          </p:contentPart>
+        </mc:Choice>
+        <mc:Fallback>
+          <p:pic>
+            <p:nvPicPr>
+              <p:cNvPr id="4" name="Ink 3">
+                <a:extLst>
+                  <a:ext uri="{FF2B5EF4-FFF2-40B4-BE49-F238E27FC236}">
+                    <a16:creationId xmlns:a16="http://schemas.microsoft.com/office/drawing/2014/main" id="{A475B26D-4028-4CE2-9DBC-A60B6C6D19A2}"/>
+                  </a:ext>
+                </a:extLst>
+              </p:cNvPr>
+              <p:cNvPicPr/>
+              <p:nvPr/>
+            </p:nvPicPr>
+            <p:blipFill>
+              <a:blip r:embed="rId3"/>
+              <a:stretch>
+                <a:fillRect/>
+              </a:stretch>
+            </p:blipFill>
+            <p:spPr>
+              <a:xfrm>
+                <a:off x="841609" y="1727179"/>
+                <a:ext cx="828000" cy="72720"/>
+              </a:xfrm>
+              <a:prstGeom prst="rect">
+                <a:avLst/>
+              </a:prstGeom>
+            </p:spPr>
+          </p:pic>
+        </mc:Fallback>
+      </mc:AlternateContent>
+      <p:grpSp>
+        <p:nvGrpSpPr>
+          <p:cNvPr id="7" name="Group 6">
+            <a:extLst>
+              <a:ext uri="{FF2B5EF4-FFF2-40B4-BE49-F238E27FC236}">
+                <a16:creationId xmlns:a16="http://schemas.microsoft.com/office/drawing/2014/main" id="{46F7C176-96E3-447F-9644-6185787424E4}"/>
+              </a:ext>
+            </a:extLst>
+          </p:cNvPr>
+          <p:cNvGrpSpPr/>
+          <p:nvPr/>
+        </p:nvGrpSpPr>
+        <p:grpSpPr>
+          <a:xfrm>
+            <a:off x="775729" y="2151619"/>
+            <a:ext cx="942840" cy="480960"/>
+            <a:chOff x="775729" y="2151619"/>
+            <a:chExt cx="942840" cy="480960"/>
+          </a:xfrm>
+        </p:grpSpPr>
+        <mc:AlternateContent xmlns:mc="http://schemas.openxmlformats.org/markup-compatibility/2006">
+          <mc:Choice xmlns:p14="http://schemas.microsoft.com/office/powerpoint/2010/main" Requires="p14">
+            <p:contentPart p14:bwMode="auto" r:id="rId4">
+              <p14:nvContentPartPr>
+                <p14:cNvPr id="5" name="Ink 4">
+                  <a:extLst>
+                    <a:ext uri="{FF2B5EF4-FFF2-40B4-BE49-F238E27FC236}">
+                      <a16:creationId xmlns:a16="http://schemas.microsoft.com/office/drawing/2014/main" id="{C3EC2E56-46D6-41D9-BEC2-E0DEEA8AE74B}"/>
+                    </a:ext>
+                  </a:extLst>
+                </p14:cNvPr>
+                <p14:cNvContentPartPr/>
+                <p14:nvPr/>
+              </p14:nvContentPartPr>
+              <p14:xfrm>
+                <a:off x="851689" y="2151619"/>
+                <a:ext cx="866880" cy="68400"/>
+              </p14:xfrm>
+            </p:contentPart>
+          </mc:Choice>
+          <mc:Fallback>
+            <p:pic>
+              <p:nvPicPr>
+                <p:cNvPr id="5" name="Ink 4">
+                  <a:extLst>
+                    <a:ext uri="{FF2B5EF4-FFF2-40B4-BE49-F238E27FC236}">
+                      <a16:creationId xmlns:a16="http://schemas.microsoft.com/office/drawing/2014/main" id="{C3EC2E56-46D6-41D9-BEC2-E0DEEA8AE74B}"/>
+                    </a:ext>
+                  </a:extLst>
+                </p:cNvPr>
+                <p:cNvPicPr/>
+                <p:nvPr/>
+              </p:nvPicPr>
+              <p:blipFill>
+                <a:blip r:embed="rId5"/>
+                <a:stretch>
+                  <a:fillRect/>
+                </a:stretch>
+              </p:blipFill>
+              <p:spPr>
+                <a:xfrm>
+                  <a:off x="842689" y="2142979"/>
+                  <a:ext cx="884520" cy="86040"/>
+                </a:xfrm>
+                <a:prstGeom prst="rect">
+                  <a:avLst/>
+                </a:prstGeom>
+              </p:spPr>
+            </p:pic>
+          </mc:Fallback>
+        </mc:AlternateContent>
+        <mc:AlternateContent xmlns:mc="http://schemas.openxmlformats.org/markup-compatibility/2006">
+          <mc:Choice xmlns:p14="http://schemas.microsoft.com/office/powerpoint/2010/main" Requires="p14">
+            <p:contentPart p14:bwMode="auto" r:id="rId6">
+              <p14:nvContentPartPr>
+                <p14:cNvPr id="6" name="Ink 5">
+                  <a:extLst>
+                    <a:ext uri="{FF2B5EF4-FFF2-40B4-BE49-F238E27FC236}">
+                      <a16:creationId xmlns:a16="http://schemas.microsoft.com/office/drawing/2014/main" id="{3432FC59-AA66-47EB-ACB2-EE390F7CDD06}"/>
+                    </a:ext>
+                  </a:extLst>
+                </p14:cNvPr>
+                <p14:cNvContentPartPr/>
+                <p14:nvPr/>
+              </p14:nvContentPartPr>
+              <p14:xfrm>
+                <a:off x="775729" y="2229739"/>
+                <a:ext cx="578160" cy="402840"/>
+              </p14:xfrm>
+            </p:contentPart>
+          </mc:Choice>
+          <mc:Fallback>
+            <p:pic>
+              <p:nvPicPr>
+                <p:cNvPr id="6" name="Ink 5">
+                  <a:extLst>
+                    <a:ext uri="{FF2B5EF4-FFF2-40B4-BE49-F238E27FC236}">
+                      <a16:creationId xmlns:a16="http://schemas.microsoft.com/office/drawing/2014/main" id="{3432FC59-AA66-47EB-ACB2-EE390F7CDD06}"/>
+                    </a:ext>
+                  </a:extLst>
+                </p:cNvPr>
+                <p:cNvPicPr/>
+                <p:nvPr/>
+              </p:nvPicPr>
+              <p:blipFill>
+                <a:blip r:embed="rId7"/>
+                <a:stretch>
+                  <a:fillRect/>
+                </a:stretch>
+              </p:blipFill>
+              <p:spPr>
+                <a:xfrm>
+                  <a:off x="767089" y="2220739"/>
+                  <a:ext cx="595800" cy="420480"/>
+                </a:xfrm>
+                <a:prstGeom prst="rect">
+                  <a:avLst/>
+                </a:prstGeom>
+              </p:spPr>
+            </p:pic>
+          </mc:Fallback>
+        </mc:AlternateContent>
+      </p:grpSp>
+      <mc:AlternateContent xmlns:mc="http://schemas.openxmlformats.org/markup-compatibility/2006">
+        <mc:Choice xmlns:p14="http://schemas.microsoft.com/office/powerpoint/2010/main" Requires="p14">
+          <p:contentPart p14:bwMode="auto" r:id="rId8">
+            <p14:nvContentPartPr>
+              <p14:cNvPr id="8" name="Ink 7">
+                <a:extLst>
+                  <a:ext uri="{FF2B5EF4-FFF2-40B4-BE49-F238E27FC236}">
+                    <a16:creationId xmlns:a16="http://schemas.microsoft.com/office/drawing/2014/main" id="{DE31BAA0-6F3F-4D8C-97DC-CDBD9B1FA14A}"/>
+                  </a:ext>
+                </a:extLst>
+              </p14:cNvPr>
+              <p14:cNvContentPartPr/>
+              <p14:nvPr/>
+            </p14:nvContentPartPr>
+            <p14:xfrm>
+              <a:off x="3332089" y="2570299"/>
+              <a:ext cx="403200" cy="68400"/>
+            </p14:xfrm>
+          </p:contentPart>
+        </mc:Choice>
+        <mc:Fallback>
+          <p:pic>
+            <p:nvPicPr>
+              <p:cNvPr id="8" name="Ink 7">
+                <a:extLst>
+                  <a:ext uri="{FF2B5EF4-FFF2-40B4-BE49-F238E27FC236}">
+                    <a16:creationId xmlns:a16="http://schemas.microsoft.com/office/drawing/2014/main" id="{DE31BAA0-6F3F-4D8C-97DC-CDBD9B1FA14A}"/>
+                  </a:ext>
+                </a:extLst>
+              </p:cNvPr>
+              <p:cNvPicPr/>
+              <p:nvPr/>
+            </p:nvPicPr>
+            <p:blipFill>
+              <a:blip r:embed="rId9"/>
+              <a:stretch>
+                <a:fillRect/>
+              </a:stretch>
+            </p:blipFill>
+            <p:spPr>
+              <a:xfrm>
+                <a:off x="3323449" y="2561299"/>
+                <a:ext cx="420840" cy="86040"/>
+              </a:xfrm>
+              <a:prstGeom prst="rect">
+                <a:avLst/>
+              </a:prstGeom>
+            </p:spPr>
+          </p:pic>
+        </mc:Fallback>
+      </mc:AlternateContent>
+      <p:grpSp>
+        <p:nvGrpSpPr>
+          <p:cNvPr id="34" name="Group 33">
+            <a:extLst>
+              <a:ext uri="{FF2B5EF4-FFF2-40B4-BE49-F238E27FC236}">
+                <a16:creationId xmlns:a16="http://schemas.microsoft.com/office/drawing/2014/main" id="{3351F9C5-118D-4140-85DB-70CDBF5E4898}"/>
+              </a:ext>
+            </a:extLst>
+          </p:cNvPr>
+          <p:cNvGrpSpPr/>
+          <p:nvPr/>
+        </p:nvGrpSpPr>
+        <p:grpSpPr>
+          <a:xfrm>
+            <a:off x="838009" y="3027859"/>
+            <a:ext cx="1659600" cy="588600"/>
+            <a:chOff x="838009" y="3027859"/>
+            <a:chExt cx="1659600" cy="588600"/>
+          </a:xfrm>
+        </p:grpSpPr>
+        <mc:AlternateContent xmlns:mc="http://schemas.openxmlformats.org/markup-compatibility/2006">
+          <mc:Choice xmlns:p14="http://schemas.microsoft.com/office/powerpoint/2010/main" Requires="p14">
+            <p:contentPart p14:bwMode="auto" r:id="rId10">
+              <p14:nvContentPartPr>
+                <p14:cNvPr id="9" name="Ink 8">
+                  <a:extLst>
+                    <a:ext uri="{FF2B5EF4-FFF2-40B4-BE49-F238E27FC236}">
+                      <a16:creationId xmlns:a16="http://schemas.microsoft.com/office/drawing/2014/main" id="{B20843BA-0773-4229-8FB8-2C8FE67DC2CF}"/>
+                    </a:ext>
+                  </a:extLst>
+                </p14:cNvPr>
+                <p14:cNvContentPartPr/>
+                <p14:nvPr/>
+              </p14:nvContentPartPr>
+              <p14:xfrm>
+                <a:off x="838009" y="3027859"/>
+                <a:ext cx="816840" cy="27720"/>
+              </p14:xfrm>
+            </p:contentPart>
+          </mc:Choice>
+          <mc:Fallback>
+            <p:pic>
+              <p:nvPicPr>
+                <p:cNvPr id="9" name="Ink 8">
+                  <a:extLst>
+                    <a:ext uri="{FF2B5EF4-FFF2-40B4-BE49-F238E27FC236}">
+                      <a16:creationId xmlns:a16="http://schemas.microsoft.com/office/drawing/2014/main" id="{B20843BA-0773-4229-8FB8-2C8FE67DC2CF}"/>
+                    </a:ext>
+                  </a:extLst>
+                </p:cNvPr>
+                <p:cNvPicPr/>
+                <p:nvPr/>
+              </p:nvPicPr>
+              <p:blipFill>
+                <a:blip r:embed="rId11"/>
+                <a:stretch>
+                  <a:fillRect/>
+                </a:stretch>
+              </p:blipFill>
+              <p:spPr>
+                <a:xfrm>
+                  <a:off x="829369" y="3018859"/>
+                  <a:ext cx="834480" cy="45360"/>
+                </a:xfrm>
+                <a:prstGeom prst="rect">
+                  <a:avLst/>
+                </a:prstGeom>
+              </p:spPr>
+            </p:pic>
+          </mc:Fallback>
+        </mc:AlternateContent>
+        <mc:AlternateContent xmlns:mc="http://schemas.openxmlformats.org/markup-compatibility/2006">
+          <mc:Choice xmlns:p14="http://schemas.microsoft.com/office/powerpoint/2010/main" Requires="p14">
+            <p:contentPart p14:bwMode="auto" r:id="rId12">
+              <p14:nvContentPartPr>
+                <p14:cNvPr id="10" name="Ink 9">
+                  <a:extLst>
+                    <a:ext uri="{FF2B5EF4-FFF2-40B4-BE49-F238E27FC236}">
+                      <a16:creationId xmlns:a16="http://schemas.microsoft.com/office/drawing/2014/main" id="{82BB457F-F632-4CD5-859C-2CE28E8E8974}"/>
+                    </a:ext>
+                  </a:extLst>
+                </p14:cNvPr>
+                <p14:cNvContentPartPr/>
+                <p14:nvPr/>
+              </p14:nvContentPartPr>
+              <p14:xfrm>
+                <a:off x="1187929" y="3188059"/>
+                <a:ext cx="51120" cy="297720"/>
+              </p14:xfrm>
+            </p:contentPart>
+          </mc:Choice>
+          <mc:Fallback>
+            <p:pic>
+              <p:nvPicPr>
+                <p:cNvPr id="10" name="Ink 9">
+                  <a:extLst>
+                    <a:ext uri="{FF2B5EF4-FFF2-40B4-BE49-F238E27FC236}">
+                      <a16:creationId xmlns:a16="http://schemas.microsoft.com/office/drawing/2014/main" id="{82BB457F-F632-4CD5-859C-2CE28E8E8974}"/>
+                    </a:ext>
+                  </a:extLst>
+                </p:cNvPr>
+                <p:cNvPicPr/>
+                <p:nvPr/>
+              </p:nvPicPr>
+              <p:blipFill>
+                <a:blip r:embed="rId13"/>
+                <a:stretch>
+                  <a:fillRect/>
+                </a:stretch>
+              </p:blipFill>
+              <p:spPr>
+                <a:xfrm>
+                  <a:off x="1179289" y="3179059"/>
+                  <a:ext cx="68760" cy="315360"/>
+                </a:xfrm>
+                <a:prstGeom prst="rect">
+                  <a:avLst/>
+                </a:prstGeom>
+              </p:spPr>
+            </p:pic>
+          </mc:Fallback>
+        </mc:AlternateContent>
+        <mc:AlternateContent xmlns:mc="http://schemas.openxmlformats.org/markup-compatibility/2006">
+          <mc:Choice xmlns:p14="http://schemas.microsoft.com/office/powerpoint/2010/main" Requires="p14">
+            <p:contentPart p14:bwMode="auto" r:id="rId14">
+              <p14:nvContentPartPr>
+                <p14:cNvPr id="11" name="Ink 10">
+                  <a:extLst>
+                    <a:ext uri="{FF2B5EF4-FFF2-40B4-BE49-F238E27FC236}">
+                      <a16:creationId xmlns:a16="http://schemas.microsoft.com/office/drawing/2014/main" id="{67E377A7-C7A4-49A2-8142-1D7CA7D842FD}"/>
+                    </a:ext>
+                  </a:extLst>
+                </p14:cNvPr>
+                <p14:cNvContentPartPr/>
+                <p14:nvPr/>
+              </p14:nvContentPartPr>
+              <p14:xfrm>
+                <a:off x="1138249" y="3140179"/>
+                <a:ext cx="196200" cy="118080"/>
+              </p14:xfrm>
+            </p:contentPart>
+          </mc:Choice>
+          <mc:Fallback>
+            <p:pic>
+              <p:nvPicPr>
+                <p:cNvPr id="11" name="Ink 10">
+                  <a:extLst>
+                    <a:ext uri="{FF2B5EF4-FFF2-40B4-BE49-F238E27FC236}">
+                      <a16:creationId xmlns:a16="http://schemas.microsoft.com/office/drawing/2014/main" id="{67E377A7-C7A4-49A2-8142-1D7CA7D842FD}"/>
+                    </a:ext>
+                  </a:extLst>
+                </p:cNvPr>
+                <p:cNvPicPr/>
+                <p:nvPr/>
+              </p:nvPicPr>
+              <p:blipFill>
+                <a:blip r:embed="rId15"/>
+                <a:stretch>
+                  <a:fillRect/>
+                </a:stretch>
+              </p:blipFill>
+              <p:spPr>
+                <a:xfrm>
+                  <a:off x="1129609" y="3131539"/>
+                  <a:ext cx="213840" cy="135720"/>
+                </a:xfrm>
+                <a:prstGeom prst="rect">
+                  <a:avLst/>
+                </a:prstGeom>
+              </p:spPr>
+            </p:pic>
+          </mc:Fallback>
+        </mc:AlternateContent>
+        <mc:AlternateContent xmlns:mc="http://schemas.openxmlformats.org/markup-compatibility/2006">
+          <mc:Choice xmlns:p14="http://schemas.microsoft.com/office/powerpoint/2010/main" Requires="p14">
+            <p:contentPart p14:bwMode="auto" r:id="rId16">
+              <p14:nvContentPartPr>
+                <p14:cNvPr id="13" name="Ink 12">
+                  <a:extLst>
+                    <a:ext uri="{FF2B5EF4-FFF2-40B4-BE49-F238E27FC236}">
+                      <a16:creationId xmlns:a16="http://schemas.microsoft.com/office/drawing/2014/main" id="{7C62F1AF-B7ED-4BA2-B1E0-55FBD0912C36}"/>
+                    </a:ext>
+                  </a:extLst>
+                </p14:cNvPr>
+                <p14:cNvContentPartPr/>
+                <p14:nvPr/>
+              </p14:nvContentPartPr>
+              <p14:xfrm>
+                <a:off x="1512289" y="3211459"/>
+                <a:ext cx="17640" cy="264600"/>
+              </p14:xfrm>
+            </p:contentPart>
+          </mc:Choice>
+          <mc:Fallback>
+            <p:pic>
+              <p:nvPicPr>
+                <p:cNvPr id="13" name="Ink 12">
+                  <a:extLst>
+                    <a:ext uri="{FF2B5EF4-FFF2-40B4-BE49-F238E27FC236}">
+                      <a16:creationId xmlns:a16="http://schemas.microsoft.com/office/drawing/2014/main" id="{7C62F1AF-B7ED-4BA2-B1E0-55FBD0912C36}"/>
+                    </a:ext>
+                  </a:extLst>
+                </p:cNvPr>
+                <p:cNvPicPr/>
+                <p:nvPr/>
+              </p:nvPicPr>
+              <p:blipFill>
+                <a:blip r:embed="rId17"/>
+                <a:stretch>
+                  <a:fillRect/>
+                </a:stretch>
+              </p:blipFill>
+              <p:spPr>
+                <a:xfrm>
+                  <a:off x="1503649" y="3202819"/>
+                  <a:ext cx="35280" cy="282240"/>
+                </a:xfrm>
+                <a:prstGeom prst="rect">
+                  <a:avLst/>
+                </a:prstGeom>
+              </p:spPr>
+            </p:pic>
+          </mc:Fallback>
+        </mc:AlternateContent>
+        <mc:AlternateContent xmlns:mc="http://schemas.openxmlformats.org/markup-compatibility/2006">
+          <mc:Choice xmlns:p14="http://schemas.microsoft.com/office/powerpoint/2010/main" Requires="p14">
+            <p:contentPart p14:bwMode="auto" r:id="rId18">
+              <p14:nvContentPartPr>
+                <p14:cNvPr id="14" name="Ink 13">
+                  <a:extLst>
+                    <a:ext uri="{FF2B5EF4-FFF2-40B4-BE49-F238E27FC236}">
+                      <a16:creationId xmlns:a16="http://schemas.microsoft.com/office/drawing/2014/main" id="{492DB552-2307-4008-87B9-77902ABC1E79}"/>
+                    </a:ext>
+                  </a:extLst>
+                </p14:cNvPr>
+                <p14:cNvContentPartPr/>
+                <p14:nvPr/>
+              </p14:nvContentPartPr>
+              <p14:xfrm>
+                <a:off x="1497169" y="3167899"/>
+                <a:ext cx="242640" cy="24480"/>
+              </p14:xfrm>
+            </p:contentPart>
+          </mc:Choice>
+          <mc:Fallback>
+            <p:pic>
+              <p:nvPicPr>
+                <p:cNvPr id="14" name="Ink 13">
+                  <a:extLst>
+                    <a:ext uri="{FF2B5EF4-FFF2-40B4-BE49-F238E27FC236}">
+                      <a16:creationId xmlns:a16="http://schemas.microsoft.com/office/drawing/2014/main" id="{492DB552-2307-4008-87B9-77902ABC1E79}"/>
+                    </a:ext>
+                  </a:extLst>
+                </p:cNvPr>
+                <p:cNvPicPr/>
+                <p:nvPr/>
+              </p:nvPicPr>
+              <p:blipFill>
+                <a:blip r:embed="rId19"/>
+                <a:stretch>
+                  <a:fillRect/>
+                </a:stretch>
+              </p:blipFill>
+              <p:spPr>
+                <a:xfrm>
+                  <a:off x="1488529" y="3159259"/>
+                  <a:ext cx="260280" cy="42120"/>
+                </a:xfrm>
+                <a:prstGeom prst="rect">
+                  <a:avLst/>
+                </a:prstGeom>
+              </p:spPr>
+            </p:pic>
+          </mc:Fallback>
+        </mc:AlternateContent>
+        <mc:AlternateContent xmlns:mc="http://schemas.openxmlformats.org/markup-compatibility/2006">
+          <mc:Choice xmlns:p14="http://schemas.microsoft.com/office/powerpoint/2010/main" Requires="p14">
+            <p:contentPart p14:bwMode="auto" r:id="rId20">
+              <p14:nvContentPartPr>
+                <p14:cNvPr id="15" name="Ink 14">
+                  <a:extLst>
+                    <a:ext uri="{FF2B5EF4-FFF2-40B4-BE49-F238E27FC236}">
+                      <a16:creationId xmlns:a16="http://schemas.microsoft.com/office/drawing/2014/main" id="{9302CF8D-A3D1-4255-BE8F-9EB79C7AC3E8}"/>
+                    </a:ext>
+                  </a:extLst>
+                </p14:cNvPr>
+                <p14:cNvContentPartPr/>
+                <p14:nvPr/>
+              </p14:nvContentPartPr>
+              <p14:xfrm>
+                <a:off x="1504369" y="3315139"/>
+                <a:ext cx="171000" cy="56160"/>
+              </p14:xfrm>
+            </p:contentPart>
+          </mc:Choice>
+          <mc:Fallback>
+            <p:pic>
+              <p:nvPicPr>
+                <p:cNvPr id="15" name="Ink 14">
+                  <a:extLst>
+                    <a:ext uri="{FF2B5EF4-FFF2-40B4-BE49-F238E27FC236}">
+                      <a16:creationId xmlns:a16="http://schemas.microsoft.com/office/drawing/2014/main" id="{9302CF8D-A3D1-4255-BE8F-9EB79C7AC3E8}"/>
+                    </a:ext>
+                  </a:extLst>
+                </p:cNvPr>
+                <p:cNvPicPr/>
+                <p:nvPr/>
+              </p:nvPicPr>
+              <p:blipFill>
+                <a:blip r:embed="rId21"/>
+                <a:stretch>
+                  <a:fillRect/>
+                </a:stretch>
+              </p:blipFill>
+              <p:spPr>
+                <a:xfrm>
+                  <a:off x="1495369" y="3306139"/>
+                  <a:ext cx="188640" cy="73800"/>
+                </a:xfrm>
+                <a:prstGeom prst="rect">
+                  <a:avLst/>
+                </a:prstGeom>
+              </p:spPr>
+            </p:pic>
+          </mc:Fallback>
+        </mc:AlternateContent>
+        <mc:AlternateContent xmlns:mc="http://schemas.openxmlformats.org/markup-compatibility/2006">
+          <mc:Choice xmlns:p14="http://schemas.microsoft.com/office/powerpoint/2010/main" Requires="p14">
+            <p:contentPart p14:bwMode="auto" r:id="rId22">
+              <p14:nvContentPartPr>
+                <p14:cNvPr id="16" name="Ink 15">
+                  <a:extLst>
+                    <a:ext uri="{FF2B5EF4-FFF2-40B4-BE49-F238E27FC236}">
+                      <a16:creationId xmlns:a16="http://schemas.microsoft.com/office/drawing/2014/main" id="{793B5841-BD1D-430F-8275-AA0BDD2AF467}"/>
+                    </a:ext>
+                  </a:extLst>
+                </p14:cNvPr>
+                <p14:cNvContentPartPr/>
+                <p14:nvPr/>
+              </p14:nvContentPartPr>
+              <p14:xfrm>
+                <a:off x="1762129" y="3227299"/>
+                <a:ext cx="218520" cy="228960"/>
+              </p14:xfrm>
+            </p:contentPart>
+          </mc:Choice>
+          <mc:Fallback>
+            <p:pic>
+              <p:nvPicPr>
+                <p:cNvPr id="16" name="Ink 15">
+                  <a:extLst>
+                    <a:ext uri="{FF2B5EF4-FFF2-40B4-BE49-F238E27FC236}">
+                      <a16:creationId xmlns:a16="http://schemas.microsoft.com/office/drawing/2014/main" id="{793B5841-BD1D-430F-8275-AA0BDD2AF467}"/>
+                    </a:ext>
+                  </a:extLst>
+                </p:cNvPr>
+                <p:cNvPicPr/>
+                <p:nvPr/>
+              </p:nvPicPr>
+              <p:blipFill>
+                <a:blip r:embed="rId23"/>
+                <a:stretch>
+                  <a:fillRect/>
+                </a:stretch>
+              </p:blipFill>
+              <p:spPr>
+                <a:xfrm>
+                  <a:off x="1753129" y="3218659"/>
+                  <a:ext cx="236160" cy="246600"/>
+                </a:xfrm>
+                <a:prstGeom prst="rect">
+                  <a:avLst/>
+                </a:prstGeom>
+              </p:spPr>
+            </p:pic>
+          </mc:Fallback>
+        </mc:AlternateContent>
+        <mc:AlternateContent xmlns:mc="http://schemas.openxmlformats.org/markup-compatibility/2006">
+          <mc:Choice xmlns:p14="http://schemas.microsoft.com/office/powerpoint/2010/main" Requires="p14">
+            <p:contentPart p14:bwMode="auto" r:id="rId24">
+              <p14:nvContentPartPr>
+                <p14:cNvPr id="17" name="Ink 16">
+                  <a:extLst>
+                    <a:ext uri="{FF2B5EF4-FFF2-40B4-BE49-F238E27FC236}">
+                      <a16:creationId xmlns:a16="http://schemas.microsoft.com/office/drawing/2014/main" id="{A2CB239A-F836-4FDA-ABF7-16FB191307FF}"/>
+                    </a:ext>
+                  </a:extLst>
+                </p14:cNvPr>
+                <p14:cNvContentPartPr/>
+                <p14:nvPr/>
+              </p14:nvContentPartPr>
+              <p14:xfrm>
+                <a:off x="2056249" y="3163579"/>
+                <a:ext cx="118440" cy="288360"/>
+              </p14:xfrm>
+            </p:contentPart>
+          </mc:Choice>
+          <mc:Fallback>
+            <p:pic>
+              <p:nvPicPr>
+                <p:cNvPr id="17" name="Ink 16">
+                  <a:extLst>
+                    <a:ext uri="{FF2B5EF4-FFF2-40B4-BE49-F238E27FC236}">
+                      <a16:creationId xmlns:a16="http://schemas.microsoft.com/office/drawing/2014/main" id="{A2CB239A-F836-4FDA-ABF7-16FB191307FF}"/>
+                    </a:ext>
+                  </a:extLst>
+                </p:cNvPr>
+                <p:cNvPicPr/>
+                <p:nvPr/>
+              </p:nvPicPr>
+              <p:blipFill>
+                <a:blip r:embed="rId25"/>
+                <a:stretch>
+                  <a:fillRect/>
+                </a:stretch>
+              </p:blipFill>
+              <p:spPr>
+                <a:xfrm>
+                  <a:off x="2047609" y="3154939"/>
+                  <a:ext cx="136080" cy="306000"/>
+                </a:xfrm>
+                <a:prstGeom prst="rect">
+                  <a:avLst/>
+                </a:prstGeom>
+              </p:spPr>
+            </p:pic>
+          </mc:Fallback>
+        </mc:AlternateContent>
+        <mc:AlternateContent xmlns:mc="http://schemas.openxmlformats.org/markup-compatibility/2006">
+          <mc:Choice xmlns:p14="http://schemas.microsoft.com/office/powerpoint/2010/main" Requires="p14">
+            <p:contentPart p14:bwMode="auto" r:id="rId26">
+              <p14:nvContentPartPr>
+                <p14:cNvPr id="18" name="Ink 17">
+                  <a:extLst>
+                    <a:ext uri="{FF2B5EF4-FFF2-40B4-BE49-F238E27FC236}">
+                      <a16:creationId xmlns:a16="http://schemas.microsoft.com/office/drawing/2014/main" id="{1A0AADD0-A912-4F2D-9A72-FFFB0ACBF89B}"/>
+                    </a:ext>
+                  </a:extLst>
+                </p14:cNvPr>
+                <p14:cNvContentPartPr/>
+                <p14:nvPr/>
+              </p14:nvContentPartPr>
+              <p14:xfrm>
+                <a:off x="2229769" y="3312619"/>
+                <a:ext cx="119880" cy="120960"/>
+              </p14:xfrm>
+            </p:contentPart>
+          </mc:Choice>
+          <mc:Fallback>
+            <p:pic>
+              <p:nvPicPr>
+                <p:cNvPr id="18" name="Ink 17">
+                  <a:extLst>
+                    <a:ext uri="{FF2B5EF4-FFF2-40B4-BE49-F238E27FC236}">
+                      <a16:creationId xmlns:a16="http://schemas.microsoft.com/office/drawing/2014/main" id="{1A0AADD0-A912-4F2D-9A72-FFFB0ACBF89B}"/>
+                    </a:ext>
+                  </a:extLst>
+                </p:cNvPr>
+                <p:cNvPicPr/>
+                <p:nvPr/>
+              </p:nvPicPr>
+              <p:blipFill>
+                <a:blip r:embed="rId27"/>
+                <a:stretch>
+                  <a:fillRect/>
+                </a:stretch>
+              </p:blipFill>
+              <p:spPr>
+                <a:xfrm>
+                  <a:off x="2220769" y="3303979"/>
+                  <a:ext cx="137520" cy="138600"/>
+                </a:xfrm>
+                <a:prstGeom prst="rect">
+                  <a:avLst/>
+                </a:prstGeom>
+              </p:spPr>
+            </p:pic>
+          </mc:Fallback>
+        </mc:AlternateContent>
+        <mc:AlternateContent xmlns:mc="http://schemas.openxmlformats.org/markup-compatibility/2006">
+          <mc:Choice xmlns:p14="http://schemas.microsoft.com/office/powerpoint/2010/main" Requires="p14">
+            <p:contentPart p14:bwMode="auto" r:id="rId28">
+              <p14:nvContentPartPr>
+                <p14:cNvPr id="19" name="Ink 18">
+                  <a:extLst>
+                    <a:ext uri="{FF2B5EF4-FFF2-40B4-BE49-F238E27FC236}">
+                      <a16:creationId xmlns:a16="http://schemas.microsoft.com/office/drawing/2014/main" id="{EA657E32-7D23-4361-9550-45099DBA7849}"/>
+                    </a:ext>
+                  </a:extLst>
+                </p14:cNvPr>
+                <p14:cNvContentPartPr/>
+                <p14:nvPr/>
+              </p14:nvContentPartPr>
+              <p14:xfrm>
+                <a:off x="2312569" y="3333859"/>
+                <a:ext cx="185040" cy="282600"/>
+              </p14:xfrm>
+            </p:contentPart>
+          </mc:Choice>
+          <mc:Fallback>
+            <p:pic>
+              <p:nvPicPr>
+                <p:cNvPr id="19" name="Ink 18">
+                  <a:extLst>
+                    <a:ext uri="{FF2B5EF4-FFF2-40B4-BE49-F238E27FC236}">
+                      <a16:creationId xmlns:a16="http://schemas.microsoft.com/office/drawing/2014/main" id="{EA657E32-7D23-4361-9550-45099DBA7849}"/>
+                    </a:ext>
+                  </a:extLst>
+                </p:cNvPr>
+                <p:cNvPicPr/>
+                <p:nvPr/>
+              </p:nvPicPr>
+              <p:blipFill>
+                <a:blip r:embed="rId29"/>
+                <a:stretch>
+                  <a:fillRect/>
+                </a:stretch>
+              </p:blipFill>
+              <p:spPr>
+                <a:xfrm>
+                  <a:off x="2303569" y="3324859"/>
+                  <a:ext cx="202680" cy="300240"/>
+                </a:xfrm>
+                <a:prstGeom prst="rect">
+                  <a:avLst/>
+                </a:prstGeom>
+              </p:spPr>
+            </p:pic>
+          </mc:Fallback>
+        </mc:AlternateContent>
+      </p:grpSp>
+      <p:grpSp>
+        <p:nvGrpSpPr>
+          <p:cNvPr id="33" name="Group 32">
+            <a:extLst>
+              <a:ext uri="{FF2B5EF4-FFF2-40B4-BE49-F238E27FC236}">
+                <a16:creationId xmlns:a16="http://schemas.microsoft.com/office/drawing/2014/main" id="{41E871C8-F7AE-4323-8893-18D743A8F687}"/>
+              </a:ext>
+            </a:extLst>
+          </p:cNvPr>
+          <p:cNvGrpSpPr/>
+          <p:nvPr/>
+        </p:nvGrpSpPr>
+        <p:grpSpPr>
+          <a:xfrm>
+            <a:off x="2748889" y="3132259"/>
+            <a:ext cx="1031760" cy="292680"/>
+            <a:chOff x="2748889" y="3132259"/>
+            <a:chExt cx="1031760" cy="292680"/>
+          </a:xfrm>
+        </p:grpSpPr>
+        <mc:AlternateContent xmlns:mc="http://schemas.openxmlformats.org/markup-compatibility/2006">
+          <mc:Choice xmlns:p14="http://schemas.microsoft.com/office/powerpoint/2010/main" Requires="p14">
+            <p:contentPart p14:bwMode="auto" r:id="rId30">
+              <p14:nvContentPartPr>
+                <p14:cNvPr id="20" name="Ink 19">
+                  <a:extLst>
+                    <a:ext uri="{FF2B5EF4-FFF2-40B4-BE49-F238E27FC236}">
+                      <a16:creationId xmlns:a16="http://schemas.microsoft.com/office/drawing/2014/main" id="{503D4092-E9C4-4C76-8EDD-AD380FBDFB50}"/>
+                    </a:ext>
+                  </a:extLst>
+                </p14:cNvPr>
+                <p14:cNvContentPartPr/>
+                <p14:nvPr/>
+              </p14:nvContentPartPr>
+              <p14:xfrm>
+                <a:off x="2748889" y="3132259"/>
+                <a:ext cx="143280" cy="292680"/>
+              </p14:xfrm>
+            </p:contentPart>
+          </mc:Choice>
+          <mc:Fallback>
+            <p:pic>
+              <p:nvPicPr>
+                <p:cNvPr id="20" name="Ink 19">
+                  <a:extLst>
+                    <a:ext uri="{FF2B5EF4-FFF2-40B4-BE49-F238E27FC236}">
+                      <a16:creationId xmlns:a16="http://schemas.microsoft.com/office/drawing/2014/main" id="{503D4092-E9C4-4C76-8EDD-AD380FBDFB50}"/>
+                    </a:ext>
+                  </a:extLst>
+                </p:cNvPr>
+                <p:cNvPicPr/>
+                <p:nvPr/>
+              </p:nvPicPr>
+              <p:blipFill>
+                <a:blip r:embed="rId31"/>
+                <a:stretch>
+                  <a:fillRect/>
+                </a:stretch>
+              </p:blipFill>
+              <p:spPr>
+                <a:xfrm>
+                  <a:off x="2739889" y="3123619"/>
+                  <a:ext cx="160920" cy="310320"/>
+                </a:xfrm>
+                <a:prstGeom prst="rect">
+                  <a:avLst/>
+                </a:prstGeom>
+              </p:spPr>
+            </p:pic>
+          </mc:Fallback>
+        </mc:AlternateContent>
+        <mc:AlternateContent xmlns:mc="http://schemas.openxmlformats.org/markup-compatibility/2006">
+          <mc:Choice xmlns:p14="http://schemas.microsoft.com/office/powerpoint/2010/main" Requires="p14">
+            <p:contentPart p14:bwMode="auto" r:id="rId32">
+              <p14:nvContentPartPr>
+                <p14:cNvPr id="21" name="Ink 20">
+                  <a:extLst>
+                    <a:ext uri="{FF2B5EF4-FFF2-40B4-BE49-F238E27FC236}">
+                      <a16:creationId xmlns:a16="http://schemas.microsoft.com/office/drawing/2014/main" id="{14474DF2-826A-4441-B138-A0E5521CBABA}"/>
+                    </a:ext>
+                  </a:extLst>
+                </p14:cNvPr>
+                <p14:cNvContentPartPr/>
+                <p14:nvPr/>
+              </p14:nvContentPartPr>
+              <p14:xfrm>
+                <a:off x="2991529" y="3283099"/>
+                <a:ext cx="155160" cy="122040"/>
+              </p14:xfrm>
+            </p:contentPart>
+          </mc:Choice>
+          <mc:Fallback>
+            <p:pic>
+              <p:nvPicPr>
+                <p:cNvPr id="21" name="Ink 20">
+                  <a:extLst>
+                    <a:ext uri="{FF2B5EF4-FFF2-40B4-BE49-F238E27FC236}">
+                      <a16:creationId xmlns:a16="http://schemas.microsoft.com/office/drawing/2014/main" id="{14474DF2-826A-4441-B138-A0E5521CBABA}"/>
+                    </a:ext>
+                  </a:extLst>
+                </p:cNvPr>
+                <p:cNvPicPr/>
+                <p:nvPr/>
+              </p:nvPicPr>
+              <p:blipFill>
+                <a:blip r:embed="rId33"/>
+                <a:stretch>
+                  <a:fillRect/>
+                </a:stretch>
+              </p:blipFill>
+              <p:spPr>
+                <a:xfrm>
+                  <a:off x="2982529" y="3274459"/>
+                  <a:ext cx="172800" cy="139680"/>
+                </a:xfrm>
+                <a:prstGeom prst="rect">
+                  <a:avLst/>
+                </a:prstGeom>
+              </p:spPr>
+            </p:pic>
+          </mc:Fallback>
+        </mc:AlternateContent>
+        <mc:AlternateContent xmlns:mc="http://schemas.openxmlformats.org/markup-compatibility/2006">
+          <mc:Choice xmlns:p14="http://schemas.microsoft.com/office/powerpoint/2010/main" Requires="p14">
+            <p:contentPart p14:bwMode="auto" r:id="rId34">
+              <p14:nvContentPartPr>
+                <p14:cNvPr id="22" name="Ink 21">
+                  <a:extLst>
+                    <a:ext uri="{FF2B5EF4-FFF2-40B4-BE49-F238E27FC236}">
+                      <a16:creationId xmlns:a16="http://schemas.microsoft.com/office/drawing/2014/main" id="{EBB09C83-A53E-4D6A-8883-945BD62528F6}"/>
+                    </a:ext>
+                  </a:extLst>
+                </p14:cNvPr>
+                <p14:cNvContentPartPr/>
+                <p14:nvPr/>
+              </p14:nvContentPartPr>
+              <p14:xfrm>
+                <a:off x="3180889" y="3331339"/>
+                <a:ext cx="132840" cy="90000"/>
+              </p14:xfrm>
+            </p:contentPart>
+          </mc:Choice>
+          <mc:Fallback>
+            <p:pic>
+              <p:nvPicPr>
+                <p:cNvPr id="22" name="Ink 21">
+                  <a:extLst>
+                    <a:ext uri="{FF2B5EF4-FFF2-40B4-BE49-F238E27FC236}">
+                      <a16:creationId xmlns:a16="http://schemas.microsoft.com/office/drawing/2014/main" id="{EBB09C83-A53E-4D6A-8883-945BD62528F6}"/>
+                    </a:ext>
+                  </a:extLst>
+                </p:cNvPr>
+                <p:cNvPicPr/>
+                <p:nvPr/>
+              </p:nvPicPr>
+              <p:blipFill>
+                <a:blip r:embed="rId35"/>
+                <a:stretch>
+                  <a:fillRect/>
+                </a:stretch>
+              </p:blipFill>
+              <p:spPr>
+                <a:xfrm>
+                  <a:off x="3171889" y="3322699"/>
+                  <a:ext cx="150480" cy="107640"/>
+                </a:xfrm>
+                <a:prstGeom prst="rect">
+                  <a:avLst/>
+                </a:prstGeom>
+              </p:spPr>
+            </p:pic>
+          </mc:Fallback>
+        </mc:AlternateContent>
+        <mc:AlternateContent xmlns:mc="http://schemas.openxmlformats.org/markup-compatibility/2006">
+          <mc:Choice xmlns:p14="http://schemas.microsoft.com/office/powerpoint/2010/main" Requires="p14">
+            <p:contentPart p14:bwMode="auto" r:id="rId36">
+              <p14:nvContentPartPr>
+                <p14:cNvPr id="23" name="Ink 22">
+                  <a:extLst>
+                    <a:ext uri="{FF2B5EF4-FFF2-40B4-BE49-F238E27FC236}">
+                      <a16:creationId xmlns:a16="http://schemas.microsoft.com/office/drawing/2014/main" id="{5A148C1D-76F4-4032-A9C9-0A49A6A26232}"/>
+                    </a:ext>
+                  </a:extLst>
+                </p14:cNvPr>
+                <p14:cNvContentPartPr/>
+                <p14:nvPr/>
+              </p14:nvContentPartPr>
+              <p14:xfrm>
+                <a:off x="3465289" y="3182659"/>
+                <a:ext cx="315360" cy="174240"/>
+              </p14:xfrm>
+            </p:contentPart>
+          </mc:Choice>
+          <mc:Fallback>
+            <p:pic>
+              <p:nvPicPr>
+                <p:cNvPr id="23" name="Ink 22">
+                  <a:extLst>
+                    <a:ext uri="{FF2B5EF4-FFF2-40B4-BE49-F238E27FC236}">
+                      <a16:creationId xmlns:a16="http://schemas.microsoft.com/office/drawing/2014/main" id="{5A148C1D-76F4-4032-A9C9-0A49A6A26232}"/>
+                    </a:ext>
+                  </a:extLst>
+                </p:cNvPr>
+                <p:cNvPicPr/>
+                <p:nvPr/>
+              </p:nvPicPr>
+              <p:blipFill>
+                <a:blip r:embed="rId37"/>
+                <a:stretch>
+                  <a:fillRect/>
+                </a:stretch>
+              </p:blipFill>
+              <p:spPr>
+                <a:xfrm>
+                  <a:off x="3456289" y="3173659"/>
+                  <a:ext cx="333000" cy="191880"/>
+                </a:xfrm>
+                <a:prstGeom prst="rect">
+                  <a:avLst/>
+                </a:prstGeom>
+              </p:spPr>
+            </p:pic>
+          </mc:Fallback>
+        </mc:AlternateContent>
+      </p:grpSp>
+      <p:grpSp>
+        <p:nvGrpSpPr>
+          <p:cNvPr id="32" name="Group 31">
+            <a:extLst>
+              <a:ext uri="{FF2B5EF4-FFF2-40B4-BE49-F238E27FC236}">
+                <a16:creationId xmlns:a16="http://schemas.microsoft.com/office/drawing/2014/main" id="{9860D892-B1B6-4716-BDFC-41865FD50007}"/>
+              </a:ext>
+            </a:extLst>
+          </p:cNvPr>
+          <p:cNvGrpSpPr/>
+          <p:nvPr/>
+        </p:nvGrpSpPr>
+        <p:grpSpPr>
+          <a:xfrm>
+            <a:off x="4121569" y="3060619"/>
+            <a:ext cx="595440" cy="290880"/>
+            <a:chOff x="4121569" y="3060619"/>
+            <a:chExt cx="595440" cy="290880"/>
+          </a:xfrm>
+        </p:grpSpPr>
+        <mc:AlternateContent xmlns:mc="http://schemas.openxmlformats.org/markup-compatibility/2006">
+          <mc:Choice xmlns:p14="http://schemas.microsoft.com/office/powerpoint/2010/main" Requires="p14">
+            <p:contentPart p14:bwMode="auto" r:id="rId38">
+              <p14:nvContentPartPr>
+                <p14:cNvPr id="24" name="Ink 23">
+                  <a:extLst>
+                    <a:ext uri="{FF2B5EF4-FFF2-40B4-BE49-F238E27FC236}">
+                      <a16:creationId xmlns:a16="http://schemas.microsoft.com/office/drawing/2014/main" id="{81889A5C-779E-4A58-90AC-9D457C8BAA8C}"/>
+                    </a:ext>
+                  </a:extLst>
+                </p14:cNvPr>
+                <p14:cNvContentPartPr/>
+                <p14:nvPr/>
+              </p14:nvContentPartPr>
+              <p14:xfrm>
+                <a:off x="4121569" y="3064939"/>
+                <a:ext cx="129960" cy="241560"/>
+              </p14:xfrm>
+            </p:contentPart>
+          </mc:Choice>
+          <mc:Fallback>
+            <p:pic>
+              <p:nvPicPr>
+                <p:cNvPr id="24" name="Ink 23">
+                  <a:extLst>
+                    <a:ext uri="{FF2B5EF4-FFF2-40B4-BE49-F238E27FC236}">
+                      <a16:creationId xmlns:a16="http://schemas.microsoft.com/office/drawing/2014/main" id="{81889A5C-779E-4A58-90AC-9D457C8BAA8C}"/>
+                    </a:ext>
+                  </a:extLst>
+                </p:cNvPr>
+                <p:cNvPicPr/>
+                <p:nvPr/>
+              </p:nvPicPr>
+              <p:blipFill>
+                <a:blip r:embed="rId39"/>
+                <a:stretch>
+                  <a:fillRect/>
+                </a:stretch>
+              </p:blipFill>
+              <p:spPr>
+                <a:xfrm>
+                  <a:off x="4112569" y="3056299"/>
+                  <a:ext cx="147600" cy="259200"/>
+                </a:xfrm>
+                <a:prstGeom prst="rect">
+                  <a:avLst/>
+                </a:prstGeom>
+              </p:spPr>
+            </p:pic>
+          </mc:Fallback>
+        </mc:AlternateContent>
+        <mc:AlternateContent xmlns:mc="http://schemas.openxmlformats.org/markup-compatibility/2006">
+          <mc:Choice xmlns:p14="http://schemas.microsoft.com/office/powerpoint/2010/main" Requires="p14">
+            <p:contentPart p14:bwMode="auto" r:id="rId40">
+              <p14:nvContentPartPr>
+                <p14:cNvPr id="25" name="Ink 24">
+                  <a:extLst>
+                    <a:ext uri="{FF2B5EF4-FFF2-40B4-BE49-F238E27FC236}">
+                      <a16:creationId xmlns:a16="http://schemas.microsoft.com/office/drawing/2014/main" id="{FEA5B404-60C0-44E1-824C-53879F3440A7}"/>
+                    </a:ext>
+                  </a:extLst>
+                </p14:cNvPr>
+                <p14:cNvContentPartPr/>
+                <p14:nvPr/>
+              </p14:nvContentPartPr>
+              <p14:xfrm>
+                <a:off x="4285009" y="3190579"/>
+                <a:ext cx="128880" cy="126720"/>
+              </p14:xfrm>
+            </p:contentPart>
+          </mc:Choice>
+          <mc:Fallback>
+            <p:pic>
+              <p:nvPicPr>
+                <p:cNvPr id="25" name="Ink 24">
+                  <a:extLst>
+                    <a:ext uri="{FF2B5EF4-FFF2-40B4-BE49-F238E27FC236}">
+                      <a16:creationId xmlns:a16="http://schemas.microsoft.com/office/drawing/2014/main" id="{FEA5B404-60C0-44E1-824C-53879F3440A7}"/>
+                    </a:ext>
+                  </a:extLst>
+                </p:cNvPr>
+                <p:cNvPicPr/>
+                <p:nvPr/>
+              </p:nvPicPr>
+              <p:blipFill>
+                <a:blip r:embed="rId41"/>
+                <a:stretch>
+                  <a:fillRect/>
+                </a:stretch>
+              </p:blipFill>
+              <p:spPr>
+                <a:xfrm>
+                  <a:off x="4276009" y="3181939"/>
+                  <a:ext cx="146520" cy="144360"/>
+                </a:xfrm>
+                <a:prstGeom prst="rect">
+                  <a:avLst/>
+                </a:prstGeom>
+              </p:spPr>
+            </p:pic>
+          </mc:Fallback>
+        </mc:AlternateContent>
+        <mc:AlternateContent xmlns:mc="http://schemas.openxmlformats.org/markup-compatibility/2006">
+          <mc:Choice xmlns:p14="http://schemas.microsoft.com/office/powerpoint/2010/main" Requires="p14">
+            <p:contentPart p14:bwMode="auto" r:id="rId42">
+              <p14:nvContentPartPr>
+                <p14:cNvPr id="26" name="Ink 25">
+                  <a:extLst>
+                    <a:ext uri="{FF2B5EF4-FFF2-40B4-BE49-F238E27FC236}">
+                      <a16:creationId xmlns:a16="http://schemas.microsoft.com/office/drawing/2014/main" id="{0526047B-B528-4D13-9D7D-6C2DF8E0A5C6}"/>
+                    </a:ext>
+                  </a:extLst>
+                </p14:cNvPr>
+                <p14:cNvContentPartPr/>
+                <p14:nvPr/>
+              </p14:nvContentPartPr>
+              <p14:xfrm>
+                <a:off x="4453849" y="3060619"/>
+                <a:ext cx="263160" cy="290880"/>
+              </p14:xfrm>
+            </p:contentPart>
+          </mc:Choice>
+          <mc:Fallback>
+            <p:pic>
+              <p:nvPicPr>
+                <p:cNvPr id="26" name="Ink 25">
+                  <a:extLst>
+                    <a:ext uri="{FF2B5EF4-FFF2-40B4-BE49-F238E27FC236}">
+                      <a16:creationId xmlns:a16="http://schemas.microsoft.com/office/drawing/2014/main" id="{0526047B-B528-4D13-9D7D-6C2DF8E0A5C6}"/>
+                    </a:ext>
+                  </a:extLst>
+                </p:cNvPr>
+                <p:cNvPicPr/>
+                <p:nvPr/>
+              </p:nvPicPr>
+              <p:blipFill>
+                <a:blip r:embed="rId43"/>
+                <a:stretch>
+                  <a:fillRect/>
+                </a:stretch>
+              </p:blipFill>
+              <p:spPr>
+                <a:xfrm>
+                  <a:off x="4444849" y="3051619"/>
+                  <a:ext cx="280800" cy="308520"/>
+                </a:xfrm>
+                <a:prstGeom prst="rect">
+                  <a:avLst/>
+                </a:prstGeom>
+              </p:spPr>
+            </p:pic>
+          </mc:Fallback>
+        </mc:AlternateContent>
+      </p:grpSp>
+      <p:grpSp>
+        <p:nvGrpSpPr>
+          <p:cNvPr id="31" name="Group 30">
+            <a:extLst>
+              <a:ext uri="{FF2B5EF4-FFF2-40B4-BE49-F238E27FC236}">
+                <a16:creationId xmlns:a16="http://schemas.microsoft.com/office/drawing/2014/main" id="{64268995-C64E-4200-94DE-D0CB78A92190}"/>
+              </a:ext>
+            </a:extLst>
+          </p:cNvPr>
+          <p:cNvGrpSpPr/>
+          <p:nvPr/>
+        </p:nvGrpSpPr>
+        <p:grpSpPr>
+          <a:xfrm>
+            <a:off x="5089249" y="3068899"/>
+            <a:ext cx="638640" cy="251640"/>
+            <a:chOff x="5089249" y="3068899"/>
+            <a:chExt cx="638640" cy="251640"/>
+          </a:xfrm>
+        </p:grpSpPr>
+        <mc:AlternateContent xmlns:mc="http://schemas.openxmlformats.org/markup-compatibility/2006">
+          <mc:Choice xmlns:p14="http://schemas.microsoft.com/office/powerpoint/2010/main" Requires="p14">
+            <p:contentPart p14:bwMode="auto" r:id="rId44">
+              <p14:nvContentPartPr>
+                <p14:cNvPr id="27" name="Ink 26">
+                  <a:extLst>
+                    <a:ext uri="{FF2B5EF4-FFF2-40B4-BE49-F238E27FC236}">
+                      <a16:creationId xmlns:a16="http://schemas.microsoft.com/office/drawing/2014/main" id="{19DCC412-74FD-47A7-AB3B-C113FA8D19FB}"/>
+                    </a:ext>
+                  </a:extLst>
+                </p14:cNvPr>
+                <p14:cNvContentPartPr/>
+                <p14:nvPr/>
+              </p14:nvContentPartPr>
+              <p14:xfrm>
+                <a:off x="5089249" y="3072499"/>
+                <a:ext cx="51480" cy="210960"/>
+              </p14:xfrm>
+            </p:contentPart>
+          </mc:Choice>
+          <mc:Fallback>
+            <p:pic>
+              <p:nvPicPr>
+                <p:cNvPr id="27" name="Ink 26">
+                  <a:extLst>
+                    <a:ext uri="{FF2B5EF4-FFF2-40B4-BE49-F238E27FC236}">
+                      <a16:creationId xmlns:a16="http://schemas.microsoft.com/office/drawing/2014/main" id="{19DCC412-74FD-47A7-AB3B-C113FA8D19FB}"/>
+                    </a:ext>
+                  </a:extLst>
+                </p:cNvPr>
+                <p:cNvPicPr/>
+                <p:nvPr/>
+              </p:nvPicPr>
+              <p:blipFill>
+                <a:blip r:embed="rId45"/>
+                <a:stretch>
+                  <a:fillRect/>
+                </a:stretch>
+              </p:blipFill>
+              <p:spPr>
+                <a:xfrm>
+                  <a:off x="5080249" y="3063859"/>
+                  <a:ext cx="69120" cy="228600"/>
+                </a:xfrm>
+                <a:prstGeom prst="rect">
+                  <a:avLst/>
+                </a:prstGeom>
+              </p:spPr>
+            </p:pic>
+          </mc:Fallback>
+        </mc:AlternateContent>
+        <mc:AlternateContent xmlns:mc="http://schemas.openxmlformats.org/markup-compatibility/2006">
+          <mc:Choice xmlns:p14="http://schemas.microsoft.com/office/powerpoint/2010/main" Requires="p14">
+            <p:contentPart p14:bwMode="auto" r:id="rId46">
+              <p14:nvContentPartPr>
+                <p14:cNvPr id="28" name="Ink 27">
+                  <a:extLst>
+                    <a:ext uri="{FF2B5EF4-FFF2-40B4-BE49-F238E27FC236}">
+                      <a16:creationId xmlns:a16="http://schemas.microsoft.com/office/drawing/2014/main" id="{9A8A7446-DEDD-4233-95B5-E0379AB16EF0}"/>
+                    </a:ext>
+                  </a:extLst>
+                </p14:cNvPr>
+                <p14:cNvContentPartPr/>
+                <p14:nvPr/>
+              </p14:nvContentPartPr>
+              <p14:xfrm>
+                <a:off x="5198689" y="3068899"/>
+                <a:ext cx="61560" cy="170280"/>
+              </p14:xfrm>
+            </p:contentPart>
+          </mc:Choice>
+          <mc:Fallback>
+            <p:pic>
+              <p:nvPicPr>
+                <p:cNvPr id="28" name="Ink 27">
+                  <a:extLst>
+                    <a:ext uri="{FF2B5EF4-FFF2-40B4-BE49-F238E27FC236}">
+                      <a16:creationId xmlns:a16="http://schemas.microsoft.com/office/drawing/2014/main" id="{9A8A7446-DEDD-4233-95B5-E0379AB16EF0}"/>
+                    </a:ext>
+                  </a:extLst>
+                </p:cNvPr>
+                <p:cNvPicPr/>
+                <p:nvPr/>
+              </p:nvPicPr>
+              <p:blipFill>
+                <a:blip r:embed="rId47"/>
+                <a:stretch>
+                  <a:fillRect/>
+                </a:stretch>
+              </p:blipFill>
+              <p:spPr>
+                <a:xfrm>
+                  <a:off x="5190049" y="3060259"/>
+                  <a:ext cx="79200" cy="187920"/>
+                </a:xfrm>
+                <a:prstGeom prst="rect">
+                  <a:avLst/>
+                </a:prstGeom>
+              </p:spPr>
+            </p:pic>
+          </mc:Fallback>
+        </mc:AlternateContent>
+        <mc:AlternateContent xmlns:mc="http://schemas.openxmlformats.org/markup-compatibility/2006">
+          <mc:Choice xmlns:p14="http://schemas.microsoft.com/office/powerpoint/2010/main" Requires="p14">
+            <p:contentPart p14:bwMode="auto" r:id="rId48">
+              <p14:nvContentPartPr>
+                <p14:cNvPr id="29" name="Ink 28">
+                  <a:extLst>
+                    <a:ext uri="{FF2B5EF4-FFF2-40B4-BE49-F238E27FC236}">
+                      <a16:creationId xmlns:a16="http://schemas.microsoft.com/office/drawing/2014/main" id="{4294BC6D-7E47-42C2-9F26-5C06425F2097}"/>
+                    </a:ext>
+                  </a:extLst>
+                </p14:cNvPr>
+                <p14:cNvContentPartPr/>
+                <p14:nvPr/>
+              </p14:nvContentPartPr>
+              <p14:xfrm>
+                <a:off x="5401009" y="3181219"/>
+                <a:ext cx="112680" cy="132840"/>
+              </p14:xfrm>
+            </p:contentPart>
+          </mc:Choice>
+          <mc:Fallback>
+            <p:pic>
+              <p:nvPicPr>
+                <p:cNvPr id="29" name="Ink 28">
+                  <a:extLst>
+                    <a:ext uri="{FF2B5EF4-FFF2-40B4-BE49-F238E27FC236}">
+                      <a16:creationId xmlns:a16="http://schemas.microsoft.com/office/drawing/2014/main" id="{4294BC6D-7E47-42C2-9F26-5C06425F2097}"/>
+                    </a:ext>
+                  </a:extLst>
+                </p:cNvPr>
+                <p:cNvPicPr/>
+                <p:nvPr/>
+              </p:nvPicPr>
+              <p:blipFill>
+                <a:blip r:embed="rId49"/>
+                <a:stretch>
+                  <a:fillRect/>
+                </a:stretch>
+              </p:blipFill>
+              <p:spPr>
+                <a:xfrm>
+                  <a:off x="5392009" y="3172579"/>
+                  <a:ext cx="130320" cy="150480"/>
+                </a:xfrm>
+                <a:prstGeom prst="rect">
+                  <a:avLst/>
+                </a:prstGeom>
+              </p:spPr>
+            </p:pic>
+          </mc:Fallback>
+        </mc:AlternateContent>
+        <mc:AlternateContent xmlns:mc="http://schemas.openxmlformats.org/markup-compatibility/2006">
+          <mc:Choice xmlns:p14="http://schemas.microsoft.com/office/powerpoint/2010/main" Requires="p14">
+            <p:contentPart p14:bwMode="auto" r:id="rId50">
+              <p14:nvContentPartPr>
+                <p14:cNvPr id="30" name="Ink 29">
+                  <a:extLst>
+                    <a:ext uri="{FF2B5EF4-FFF2-40B4-BE49-F238E27FC236}">
+                      <a16:creationId xmlns:a16="http://schemas.microsoft.com/office/drawing/2014/main" id="{D2A75859-97B7-4D04-95A2-CCA783F0A9F8}"/>
+                    </a:ext>
+                  </a:extLst>
+                </p14:cNvPr>
+                <p14:cNvContentPartPr/>
+                <p14:nvPr/>
+              </p14:nvContentPartPr>
+              <p14:xfrm>
+                <a:off x="5543209" y="3232699"/>
+                <a:ext cx="184680" cy="87840"/>
+              </p14:xfrm>
+            </p:contentPart>
+          </mc:Choice>
+          <mc:Fallback>
+            <p:pic>
+              <p:nvPicPr>
+                <p:cNvPr id="30" name="Ink 29">
+                  <a:extLst>
+                    <a:ext uri="{FF2B5EF4-FFF2-40B4-BE49-F238E27FC236}">
+                      <a16:creationId xmlns:a16="http://schemas.microsoft.com/office/drawing/2014/main" id="{D2A75859-97B7-4D04-95A2-CCA783F0A9F8}"/>
+                    </a:ext>
+                  </a:extLst>
+                </p:cNvPr>
+                <p:cNvPicPr/>
+                <p:nvPr/>
+              </p:nvPicPr>
+              <p:blipFill>
+                <a:blip r:embed="rId51"/>
+                <a:stretch>
+                  <a:fillRect/>
+                </a:stretch>
+              </p:blipFill>
+              <p:spPr>
+                <a:xfrm>
+                  <a:off x="5534209" y="3224059"/>
+                  <a:ext cx="202320" cy="105480"/>
+                </a:xfrm>
+                <a:prstGeom prst="rect">
+                  <a:avLst/>
+                </a:prstGeom>
+              </p:spPr>
+            </p:pic>
+          </mc:Fallback>
+        </mc:AlternateContent>
+      </p:grpSp>
+      <p:grpSp>
+        <p:nvGrpSpPr>
+          <p:cNvPr id="47" name="Group 46">
+            <a:extLst>
+              <a:ext uri="{FF2B5EF4-FFF2-40B4-BE49-F238E27FC236}">
+                <a16:creationId xmlns:a16="http://schemas.microsoft.com/office/drawing/2014/main" id="{F3ECADC0-449F-447A-ABC0-B6D5510E15E2}"/>
+              </a:ext>
+            </a:extLst>
+          </p:cNvPr>
+          <p:cNvGrpSpPr/>
+          <p:nvPr/>
+        </p:nvGrpSpPr>
+        <p:grpSpPr>
+          <a:xfrm>
+            <a:off x="1779409" y="3607099"/>
+            <a:ext cx="2314800" cy="554760"/>
+            <a:chOff x="1779409" y="3607099"/>
+            <a:chExt cx="2314800" cy="554760"/>
+          </a:xfrm>
+        </p:grpSpPr>
+        <mc:AlternateContent xmlns:mc="http://schemas.openxmlformats.org/markup-compatibility/2006">
+          <mc:Choice xmlns:p14="http://schemas.microsoft.com/office/powerpoint/2010/main" Requires="p14">
+            <p:contentPart p14:bwMode="auto" r:id="rId52">
+              <p14:nvContentPartPr>
+                <p14:cNvPr id="35" name="Ink 34">
+                  <a:extLst>
+                    <a:ext uri="{FF2B5EF4-FFF2-40B4-BE49-F238E27FC236}">
+                      <a16:creationId xmlns:a16="http://schemas.microsoft.com/office/drawing/2014/main" id="{9D5271C6-440C-4E22-B005-BEC50570C8B5}"/>
+                    </a:ext>
+                  </a:extLst>
+                </p14:cNvPr>
+                <p14:cNvContentPartPr/>
+                <p14:nvPr/>
+              </p14:nvContentPartPr>
+              <p14:xfrm>
+                <a:off x="1779409" y="3649939"/>
+                <a:ext cx="248040" cy="361800"/>
+              </p14:xfrm>
+            </p:contentPart>
+          </mc:Choice>
+          <mc:Fallback>
+            <p:pic>
+              <p:nvPicPr>
+                <p:cNvPr id="35" name="Ink 34">
+                  <a:extLst>
+                    <a:ext uri="{FF2B5EF4-FFF2-40B4-BE49-F238E27FC236}">
+                      <a16:creationId xmlns:a16="http://schemas.microsoft.com/office/drawing/2014/main" id="{9D5271C6-440C-4E22-B005-BEC50570C8B5}"/>
+                    </a:ext>
+                  </a:extLst>
+                </p:cNvPr>
+                <p:cNvPicPr/>
+                <p:nvPr/>
+              </p:nvPicPr>
+              <p:blipFill>
+                <a:blip r:embed="rId53"/>
+                <a:stretch>
+                  <a:fillRect/>
+                </a:stretch>
+              </p:blipFill>
+              <p:spPr>
+                <a:xfrm>
+                  <a:off x="1770409" y="3641299"/>
+                  <a:ext cx="265680" cy="379440"/>
+                </a:xfrm>
+                <a:prstGeom prst="rect">
+                  <a:avLst/>
+                </a:prstGeom>
+              </p:spPr>
+            </p:pic>
+          </mc:Fallback>
+        </mc:AlternateContent>
+        <mc:AlternateContent xmlns:mc="http://schemas.openxmlformats.org/markup-compatibility/2006">
+          <mc:Choice xmlns:p14="http://schemas.microsoft.com/office/powerpoint/2010/main" Requires="p14">
+            <p:contentPart p14:bwMode="auto" r:id="rId54">
+              <p14:nvContentPartPr>
+                <p14:cNvPr id="36" name="Ink 35">
+                  <a:extLst>
+                    <a:ext uri="{FF2B5EF4-FFF2-40B4-BE49-F238E27FC236}">
+                      <a16:creationId xmlns:a16="http://schemas.microsoft.com/office/drawing/2014/main" id="{C3F9A85E-2670-4EB2-A575-A6ED82CF0B84}"/>
+                    </a:ext>
+                  </a:extLst>
+                </p14:cNvPr>
+                <p14:cNvContentPartPr/>
+                <p14:nvPr/>
+              </p14:nvContentPartPr>
+              <p14:xfrm>
+                <a:off x="2224369" y="3728779"/>
+                <a:ext cx="166680" cy="289440"/>
+              </p14:xfrm>
+            </p:contentPart>
+          </mc:Choice>
+          <mc:Fallback>
+            <p:pic>
+              <p:nvPicPr>
+                <p:cNvPr id="36" name="Ink 35">
+                  <a:extLst>
+                    <a:ext uri="{FF2B5EF4-FFF2-40B4-BE49-F238E27FC236}">
+                      <a16:creationId xmlns:a16="http://schemas.microsoft.com/office/drawing/2014/main" id="{C3F9A85E-2670-4EB2-A575-A6ED82CF0B84}"/>
+                    </a:ext>
+                  </a:extLst>
+                </p:cNvPr>
+                <p:cNvPicPr/>
+                <p:nvPr/>
+              </p:nvPicPr>
+              <p:blipFill>
+                <a:blip r:embed="rId55"/>
+                <a:stretch>
+                  <a:fillRect/>
+                </a:stretch>
+              </p:blipFill>
+              <p:spPr>
+                <a:xfrm>
+                  <a:off x="2215369" y="3720139"/>
+                  <a:ext cx="184320" cy="307080"/>
+                </a:xfrm>
+                <a:prstGeom prst="rect">
+                  <a:avLst/>
+                </a:prstGeom>
+              </p:spPr>
+            </p:pic>
+          </mc:Fallback>
+        </mc:AlternateContent>
+        <mc:AlternateContent xmlns:mc="http://schemas.openxmlformats.org/markup-compatibility/2006">
+          <mc:Choice xmlns:p14="http://schemas.microsoft.com/office/powerpoint/2010/main" Requires="p14">
+            <p:contentPart p14:bwMode="auto" r:id="rId56">
+              <p14:nvContentPartPr>
+                <p14:cNvPr id="37" name="Ink 36">
+                  <a:extLst>
+                    <a:ext uri="{FF2B5EF4-FFF2-40B4-BE49-F238E27FC236}">
+                      <a16:creationId xmlns:a16="http://schemas.microsoft.com/office/drawing/2014/main" id="{0357BE9E-219C-4340-AAF1-2A820C6BDB39}"/>
+                    </a:ext>
+                  </a:extLst>
+                </p14:cNvPr>
+                <p14:cNvContentPartPr/>
+                <p14:nvPr/>
+              </p14:nvContentPartPr>
+              <p14:xfrm>
+                <a:off x="2366209" y="3759019"/>
+                <a:ext cx="163080" cy="263880"/>
+              </p14:xfrm>
+            </p:contentPart>
+          </mc:Choice>
+          <mc:Fallback>
+            <p:pic>
+              <p:nvPicPr>
+                <p:cNvPr id="37" name="Ink 36">
+                  <a:extLst>
+                    <a:ext uri="{FF2B5EF4-FFF2-40B4-BE49-F238E27FC236}">
+                      <a16:creationId xmlns:a16="http://schemas.microsoft.com/office/drawing/2014/main" id="{0357BE9E-219C-4340-AAF1-2A820C6BDB39}"/>
+                    </a:ext>
+                  </a:extLst>
+                </p:cNvPr>
+                <p:cNvPicPr/>
+                <p:nvPr/>
+              </p:nvPicPr>
+              <p:blipFill>
+                <a:blip r:embed="rId57"/>
+                <a:stretch>
+                  <a:fillRect/>
+                </a:stretch>
+              </p:blipFill>
+              <p:spPr>
+                <a:xfrm>
+                  <a:off x="2357209" y="3750379"/>
+                  <a:ext cx="180720" cy="281520"/>
+                </a:xfrm>
+                <a:prstGeom prst="rect">
+                  <a:avLst/>
+                </a:prstGeom>
+              </p:spPr>
+            </p:pic>
+          </mc:Fallback>
+        </mc:AlternateContent>
+        <mc:AlternateContent xmlns:mc="http://schemas.openxmlformats.org/markup-compatibility/2006">
+          <mc:Choice xmlns:p14="http://schemas.microsoft.com/office/powerpoint/2010/main" Requires="p14">
+            <p:contentPart p14:bwMode="auto" r:id="rId58">
+              <p14:nvContentPartPr>
+                <p14:cNvPr id="38" name="Ink 37">
+                  <a:extLst>
+                    <a:ext uri="{FF2B5EF4-FFF2-40B4-BE49-F238E27FC236}">
+                      <a16:creationId xmlns:a16="http://schemas.microsoft.com/office/drawing/2014/main" id="{461133BA-2C1F-41E9-A7CE-A9729D7A06AB}"/>
+                    </a:ext>
+                  </a:extLst>
+                </p14:cNvPr>
+                <p14:cNvContentPartPr/>
+                <p14:nvPr/>
+              </p14:nvContentPartPr>
+              <p14:xfrm>
+                <a:off x="2688769" y="3841819"/>
+                <a:ext cx="210240" cy="155160"/>
+              </p14:xfrm>
+            </p:contentPart>
+          </mc:Choice>
+          <mc:Fallback>
+            <p:pic>
+              <p:nvPicPr>
+                <p:cNvPr id="38" name="Ink 37">
+                  <a:extLst>
+                    <a:ext uri="{FF2B5EF4-FFF2-40B4-BE49-F238E27FC236}">
+                      <a16:creationId xmlns:a16="http://schemas.microsoft.com/office/drawing/2014/main" id="{461133BA-2C1F-41E9-A7CE-A9729D7A06AB}"/>
+                    </a:ext>
+                  </a:extLst>
+                </p:cNvPr>
+                <p:cNvPicPr/>
+                <p:nvPr/>
+              </p:nvPicPr>
+              <p:blipFill>
+                <a:blip r:embed="rId59"/>
+                <a:stretch>
+                  <a:fillRect/>
+                </a:stretch>
+              </p:blipFill>
+              <p:spPr>
+                <a:xfrm>
+                  <a:off x="2679769" y="3833179"/>
+                  <a:ext cx="227880" cy="172800"/>
+                </a:xfrm>
+                <a:prstGeom prst="rect">
+                  <a:avLst/>
+                </a:prstGeom>
+              </p:spPr>
+            </p:pic>
+          </mc:Fallback>
+        </mc:AlternateContent>
+        <mc:AlternateContent xmlns:mc="http://schemas.openxmlformats.org/markup-compatibility/2006">
+          <mc:Choice xmlns:p14="http://schemas.microsoft.com/office/powerpoint/2010/main" Requires="p14">
+            <p:contentPart p14:bwMode="auto" r:id="rId60">
+              <p14:nvContentPartPr>
+                <p14:cNvPr id="39" name="Ink 38">
+                  <a:extLst>
+                    <a:ext uri="{FF2B5EF4-FFF2-40B4-BE49-F238E27FC236}">
+                      <a16:creationId xmlns:a16="http://schemas.microsoft.com/office/drawing/2014/main" id="{AEEA0C55-5B2D-495A-8221-A8F911E711EF}"/>
+                    </a:ext>
+                  </a:extLst>
+                </p14:cNvPr>
+                <p14:cNvContentPartPr/>
+                <p14:nvPr/>
+              </p14:nvContentPartPr>
+              <p14:xfrm>
+                <a:off x="2969929" y="3726619"/>
+                <a:ext cx="77040" cy="273240"/>
+              </p14:xfrm>
+            </p:contentPart>
+          </mc:Choice>
+          <mc:Fallback>
+            <p:pic>
+              <p:nvPicPr>
+                <p:cNvPr id="39" name="Ink 38">
+                  <a:extLst>
+                    <a:ext uri="{FF2B5EF4-FFF2-40B4-BE49-F238E27FC236}">
+                      <a16:creationId xmlns:a16="http://schemas.microsoft.com/office/drawing/2014/main" id="{AEEA0C55-5B2D-495A-8221-A8F911E711EF}"/>
+                    </a:ext>
+                  </a:extLst>
+                </p:cNvPr>
+                <p:cNvPicPr/>
+                <p:nvPr/>
+              </p:nvPicPr>
+              <p:blipFill>
+                <a:blip r:embed="rId61"/>
+                <a:stretch>
+                  <a:fillRect/>
+                </a:stretch>
+              </p:blipFill>
+              <p:spPr>
+                <a:xfrm>
+                  <a:off x="2960929" y="3717979"/>
+                  <a:ext cx="94680" cy="290880"/>
+                </a:xfrm>
+                <a:prstGeom prst="rect">
+                  <a:avLst/>
+                </a:prstGeom>
+              </p:spPr>
+            </p:pic>
+          </mc:Fallback>
+        </mc:AlternateContent>
+        <mc:AlternateContent xmlns:mc="http://schemas.openxmlformats.org/markup-compatibility/2006">
+          <mc:Choice xmlns:p14="http://schemas.microsoft.com/office/powerpoint/2010/main" Requires="p14">
+            <p:contentPart p14:bwMode="auto" r:id="rId62">
+              <p14:nvContentPartPr>
+                <p14:cNvPr id="40" name="Ink 39">
+                  <a:extLst>
+                    <a:ext uri="{FF2B5EF4-FFF2-40B4-BE49-F238E27FC236}">
+                      <a16:creationId xmlns:a16="http://schemas.microsoft.com/office/drawing/2014/main" id="{314F12D3-BD40-4B0D-A4E8-E1C12ECF721B}"/>
+                    </a:ext>
+                  </a:extLst>
+                </p14:cNvPr>
+                <p14:cNvContentPartPr/>
+                <p14:nvPr/>
+              </p14:nvContentPartPr>
+              <p14:xfrm>
+                <a:off x="3095929" y="3840019"/>
+                <a:ext cx="135720" cy="151200"/>
+              </p14:xfrm>
+            </p:contentPart>
+          </mc:Choice>
+          <mc:Fallback>
+            <p:pic>
+              <p:nvPicPr>
+                <p:cNvPr id="40" name="Ink 39">
+                  <a:extLst>
+                    <a:ext uri="{FF2B5EF4-FFF2-40B4-BE49-F238E27FC236}">
+                      <a16:creationId xmlns:a16="http://schemas.microsoft.com/office/drawing/2014/main" id="{314F12D3-BD40-4B0D-A4E8-E1C12ECF721B}"/>
+                    </a:ext>
+                  </a:extLst>
+                </p:cNvPr>
+                <p:cNvPicPr/>
+                <p:nvPr/>
+              </p:nvPicPr>
+              <p:blipFill>
+                <a:blip r:embed="rId63"/>
+                <a:stretch>
+                  <a:fillRect/>
+                </a:stretch>
+              </p:blipFill>
+              <p:spPr>
+                <a:xfrm>
+                  <a:off x="3087289" y="3831019"/>
+                  <a:ext cx="153360" cy="168840"/>
+                </a:xfrm>
+                <a:prstGeom prst="rect">
+                  <a:avLst/>
+                </a:prstGeom>
+              </p:spPr>
+            </p:pic>
+          </mc:Fallback>
+        </mc:AlternateContent>
+        <mc:AlternateContent xmlns:mc="http://schemas.openxmlformats.org/markup-compatibility/2006">
+          <mc:Choice xmlns:p14="http://schemas.microsoft.com/office/powerpoint/2010/main" Requires="p14">
+            <p:contentPart p14:bwMode="auto" r:id="rId64">
+              <p14:nvContentPartPr>
+                <p14:cNvPr id="41" name="Ink 40">
+                  <a:extLst>
+                    <a:ext uri="{FF2B5EF4-FFF2-40B4-BE49-F238E27FC236}">
+                      <a16:creationId xmlns:a16="http://schemas.microsoft.com/office/drawing/2014/main" id="{19155D75-E495-40AF-AA55-2636297CBBF4}"/>
+                    </a:ext>
+                  </a:extLst>
+                </p14:cNvPr>
+                <p14:cNvContentPartPr/>
+                <p14:nvPr/>
+              </p14:nvContentPartPr>
+              <p14:xfrm>
+                <a:off x="3261529" y="3834619"/>
+                <a:ext cx="118800" cy="126720"/>
+              </p14:xfrm>
+            </p:contentPart>
+          </mc:Choice>
+          <mc:Fallback>
+            <p:pic>
+              <p:nvPicPr>
+                <p:cNvPr id="41" name="Ink 40">
+                  <a:extLst>
+                    <a:ext uri="{FF2B5EF4-FFF2-40B4-BE49-F238E27FC236}">
+                      <a16:creationId xmlns:a16="http://schemas.microsoft.com/office/drawing/2014/main" id="{19155D75-E495-40AF-AA55-2636297CBBF4}"/>
+                    </a:ext>
+                  </a:extLst>
+                </p:cNvPr>
+                <p:cNvPicPr/>
+                <p:nvPr/>
+              </p:nvPicPr>
+              <p:blipFill>
+                <a:blip r:embed="rId65"/>
+                <a:stretch>
+                  <a:fillRect/>
+                </a:stretch>
+              </p:blipFill>
+              <p:spPr>
+                <a:xfrm>
+                  <a:off x="3252889" y="3825619"/>
+                  <a:ext cx="136440" cy="144360"/>
+                </a:xfrm>
+                <a:prstGeom prst="rect">
+                  <a:avLst/>
+                </a:prstGeom>
+              </p:spPr>
+            </p:pic>
+          </mc:Fallback>
+        </mc:AlternateContent>
+        <mc:AlternateContent xmlns:mc="http://schemas.openxmlformats.org/markup-compatibility/2006">
+          <mc:Choice xmlns:p14="http://schemas.microsoft.com/office/powerpoint/2010/main" Requires="p14">
+            <p:contentPart p14:bwMode="auto" r:id="rId66">
+              <p14:nvContentPartPr>
+                <p14:cNvPr id="42" name="Ink 41">
+                  <a:extLst>
+                    <a:ext uri="{FF2B5EF4-FFF2-40B4-BE49-F238E27FC236}">
+                      <a16:creationId xmlns:a16="http://schemas.microsoft.com/office/drawing/2014/main" id="{D0E1AA6F-89E4-41B5-BC2B-D476C560829B}"/>
+                    </a:ext>
+                  </a:extLst>
+                </p14:cNvPr>
+                <p14:cNvContentPartPr/>
+                <p14:nvPr/>
+              </p14:nvContentPartPr>
+              <p14:xfrm>
+                <a:off x="3539089" y="3607099"/>
+                <a:ext cx="153720" cy="351720"/>
+              </p14:xfrm>
+            </p:contentPart>
+          </mc:Choice>
+          <mc:Fallback>
+            <p:pic>
+              <p:nvPicPr>
+                <p:cNvPr id="42" name="Ink 41">
+                  <a:extLst>
+                    <a:ext uri="{FF2B5EF4-FFF2-40B4-BE49-F238E27FC236}">
+                      <a16:creationId xmlns:a16="http://schemas.microsoft.com/office/drawing/2014/main" id="{D0E1AA6F-89E4-41B5-BC2B-D476C560829B}"/>
+                    </a:ext>
+                  </a:extLst>
+                </p:cNvPr>
+                <p:cNvPicPr/>
+                <p:nvPr/>
+              </p:nvPicPr>
+              <p:blipFill>
+                <a:blip r:embed="rId67"/>
+                <a:stretch>
+                  <a:fillRect/>
+                </a:stretch>
+              </p:blipFill>
+              <p:spPr>
+                <a:xfrm>
+                  <a:off x="3530449" y="3598099"/>
+                  <a:ext cx="171360" cy="369360"/>
+                </a:xfrm>
+                <a:prstGeom prst="rect">
+                  <a:avLst/>
+                </a:prstGeom>
+              </p:spPr>
+            </p:pic>
+          </mc:Fallback>
+        </mc:AlternateContent>
+        <mc:AlternateContent xmlns:mc="http://schemas.openxmlformats.org/markup-compatibility/2006">
+          <mc:Choice xmlns:p14="http://schemas.microsoft.com/office/powerpoint/2010/main" Requires="p14">
+            <p:contentPart p14:bwMode="auto" r:id="rId68">
+              <p14:nvContentPartPr>
+                <p14:cNvPr id="43" name="Ink 42">
+                  <a:extLst>
+                    <a:ext uri="{FF2B5EF4-FFF2-40B4-BE49-F238E27FC236}">
+                      <a16:creationId xmlns:a16="http://schemas.microsoft.com/office/drawing/2014/main" id="{F798BA8E-4754-4DA6-966B-5E2980E9C4A9}"/>
+                    </a:ext>
+                  </a:extLst>
+                </p14:cNvPr>
+                <p14:cNvContentPartPr/>
+                <p14:nvPr/>
+              </p14:nvContentPartPr>
+              <p14:xfrm>
+                <a:off x="3732769" y="3816619"/>
+                <a:ext cx="86400" cy="101520"/>
+              </p14:xfrm>
+            </p:contentPart>
+          </mc:Choice>
+          <mc:Fallback>
+            <p:pic>
+              <p:nvPicPr>
+                <p:cNvPr id="43" name="Ink 42">
+                  <a:extLst>
+                    <a:ext uri="{FF2B5EF4-FFF2-40B4-BE49-F238E27FC236}">
+                      <a16:creationId xmlns:a16="http://schemas.microsoft.com/office/drawing/2014/main" id="{F798BA8E-4754-4DA6-966B-5E2980E9C4A9}"/>
+                    </a:ext>
+                  </a:extLst>
+                </p:cNvPr>
+                <p:cNvPicPr/>
+                <p:nvPr/>
+              </p:nvPicPr>
+              <p:blipFill>
+                <a:blip r:embed="rId69"/>
+                <a:stretch>
+                  <a:fillRect/>
+                </a:stretch>
+              </p:blipFill>
+              <p:spPr>
+                <a:xfrm>
+                  <a:off x="3724129" y="3807979"/>
+                  <a:ext cx="104040" cy="119160"/>
+                </a:xfrm>
+                <a:prstGeom prst="rect">
+                  <a:avLst/>
+                </a:prstGeom>
+              </p:spPr>
+            </p:pic>
+          </mc:Fallback>
+        </mc:AlternateContent>
+        <mc:AlternateContent xmlns:mc="http://schemas.openxmlformats.org/markup-compatibility/2006">
+          <mc:Choice xmlns:p14="http://schemas.microsoft.com/office/powerpoint/2010/main" Requires="p14">
+            <p:contentPart p14:bwMode="auto" r:id="rId70">
+              <p14:nvContentPartPr>
+                <p14:cNvPr id="44" name="Ink 43">
+                  <a:extLst>
+                    <a:ext uri="{FF2B5EF4-FFF2-40B4-BE49-F238E27FC236}">
+                      <a16:creationId xmlns:a16="http://schemas.microsoft.com/office/drawing/2014/main" id="{680619F7-5B23-4460-AD69-439CBC1FEBF1}"/>
+                    </a:ext>
+                  </a:extLst>
+                </p14:cNvPr>
+                <p14:cNvContentPartPr/>
+                <p14:nvPr/>
+              </p14:nvContentPartPr>
+              <p14:xfrm>
+                <a:off x="3864889" y="3792499"/>
+                <a:ext cx="74520" cy="159840"/>
+              </p14:xfrm>
+            </p:contentPart>
+          </mc:Choice>
+          <mc:Fallback>
+            <p:pic>
+              <p:nvPicPr>
+                <p:cNvPr id="44" name="Ink 43">
+                  <a:extLst>
+                    <a:ext uri="{FF2B5EF4-FFF2-40B4-BE49-F238E27FC236}">
+                      <a16:creationId xmlns:a16="http://schemas.microsoft.com/office/drawing/2014/main" id="{680619F7-5B23-4460-AD69-439CBC1FEBF1}"/>
+                    </a:ext>
+                  </a:extLst>
+                </p:cNvPr>
+                <p:cNvPicPr/>
+                <p:nvPr/>
+              </p:nvPicPr>
+              <p:blipFill>
+                <a:blip r:embed="rId71"/>
+                <a:stretch>
+                  <a:fillRect/>
+                </a:stretch>
+              </p:blipFill>
+              <p:spPr>
+                <a:xfrm>
+                  <a:off x="3855889" y="3783499"/>
+                  <a:ext cx="92160" cy="177480"/>
+                </a:xfrm>
+                <a:prstGeom prst="rect">
+                  <a:avLst/>
+                </a:prstGeom>
+              </p:spPr>
+            </p:pic>
+          </mc:Fallback>
+        </mc:AlternateContent>
+        <mc:AlternateContent xmlns:mc="http://schemas.openxmlformats.org/markup-compatibility/2006">
+          <mc:Choice xmlns:p14="http://schemas.microsoft.com/office/powerpoint/2010/main" Requires="p14">
+            <p:contentPart p14:bwMode="auto" r:id="rId72">
+              <p14:nvContentPartPr>
+                <p14:cNvPr id="46" name="Ink 45">
+                  <a:extLst>
+                    <a:ext uri="{FF2B5EF4-FFF2-40B4-BE49-F238E27FC236}">
+                      <a16:creationId xmlns:a16="http://schemas.microsoft.com/office/drawing/2014/main" id="{C7A9D366-9302-4CF5-9E5F-6A1C2E55E880}"/>
+                    </a:ext>
+                  </a:extLst>
+                </p14:cNvPr>
+                <p14:cNvContentPartPr/>
+                <p14:nvPr/>
+              </p14:nvContentPartPr>
+              <p14:xfrm>
+                <a:off x="2147329" y="4095619"/>
+                <a:ext cx="1946880" cy="66240"/>
+              </p14:xfrm>
+            </p:contentPart>
+          </mc:Choice>
+          <mc:Fallback>
+            <p:pic>
+              <p:nvPicPr>
+                <p:cNvPr id="46" name="Ink 45">
+                  <a:extLst>
+                    <a:ext uri="{FF2B5EF4-FFF2-40B4-BE49-F238E27FC236}">
+                      <a16:creationId xmlns:a16="http://schemas.microsoft.com/office/drawing/2014/main" id="{C7A9D366-9302-4CF5-9E5F-6A1C2E55E880}"/>
+                    </a:ext>
+                  </a:extLst>
+                </p:cNvPr>
+                <p:cNvPicPr/>
+                <p:nvPr/>
+              </p:nvPicPr>
+              <p:blipFill>
+                <a:blip r:embed="rId73"/>
+                <a:stretch>
+                  <a:fillRect/>
+                </a:stretch>
+              </p:blipFill>
+              <p:spPr>
+                <a:xfrm>
+                  <a:off x="2138689" y="4086619"/>
+                  <a:ext cx="1964520" cy="83880"/>
+                </a:xfrm>
+                <a:prstGeom prst="rect">
+                  <a:avLst/>
+                </a:prstGeom>
+              </p:spPr>
+            </p:pic>
+          </mc:Fallback>
+        </mc:AlternateContent>
+      </p:grpSp>
+      <mc:AlternateContent xmlns:mc="http://schemas.openxmlformats.org/markup-compatibility/2006">
+        <mc:Choice xmlns:p14="http://schemas.microsoft.com/office/powerpoint/2010/main" Requires="p14">
+          <p:contentPart p14:bwMode="auto" r:id="rId74">
+            <p14:nvContentPartPr>
+              <p14:cNvPr id="48" name="Ink 47">
+                <a:extLst>
+                  <a:ext uri="{FF2B5EF4-FFF2-40B4-BE49-F238E27FC236}">
+                    <a16:creationId xmlns:a16="http://schemas.microsoft.com/office/drawing/2014/main" id="{6478E8C7-233C-493D-9E07-DB5A9867D4FB}"/>
+                  </a:ext>
+                </a:extLst>
+              </p14:cNvPr>
+              <p14:cNvContentPartPr/>
+              <p14:nvPr/>
+            </p14:nvContentPartPr>
+            <p14:xfrm>
+              <a:off x="2253169" y="3000139"/>
+              <a:ext cx="665640" cy="28440"/>
+            </p14:xfrm>
+          </p:contentPart>
+        </mc:Choice>
+        <mc:Fallback>
+          <p:pic>
+            <p:nvPicPr>
+              <p:cNvPr id="48" name="Ink 47">
+                <a:extLst>
+                  <a:ext uri="{FF2B5EF4-FFF2-40B4-BE49-F238E27FC236}">
+                    <a16:creationId xmlns:a16="http://schemas.microsoft.com/office/drawing/2014/main" id="{6478E8C7-233C-493D-9E07-DB5A9867D4FB}"/>
+                  </a:ext>
+                </a:extLst>
+              </p:cNvPr>
+              <p:cNvPicPr/>
+              <p:nvPr/>
+            </p:nvPicPr>
+            <p:blipFill>
+              <a:blip r:embed="rId75"/>
+              <a:stretch>
+                <a:fillRect/>
+              </a:stretch>
+            </p:blipFill>
+            <p:spPr>
+              <a:xfrm>
+                <a:off x="2244529" y="2991499"/>
+                <a:ext cx="683280" cy="46080"/>
+              </a:xfrm>
+              <a:prstGeom prst="rect">
+                <a:avLst/>
+              </a:prstGeom>
+            </p:spPr>
+          </p:pic>
+        </mc:Fallback>
+      </mc:AlternateContent>
     </p:spTree>
     <p:extLst>
       <p:ext uri="{BB962C8B-B14F-4D97-AF65-F5344CB8AC3E}">

</xml_diff>